<commit_message>
Add ppt | feat: language.ppt에 추가하였습니다
</commit_message>
<xml_diff>
--- a/_raw/language.pptx
+++ b/_raw/language.pptx
@@ -6,6 +6,9 @@
   </p:sldMasterIdLst>
   <p:sldIdLst>
     <p:sldId id="256" r:id="rId2"/>
+    <p:sldId id="257" r:id="rId3"/>
+    <p:sldId id="258" r:id="rId4"/>
+    <p:sldId id="259" r:id="rId5"/>
   </p:sldIdLst>
   <p:sldSz cx="12192000" cy="6858000"/>
   <p:notesSz cx="6858000" cy="9144000"/>
@@ -104,6 +107,11 @@
       </a:defRPr>
     </a:lvl9pPr>
   </p:defaultTextStyle>
+  <p:extLst>
+    <p:ext uri="{EFAFB233-063F-42B5-8137-9DF3F51BA10A}">
+      <p15:sldGuideLst xmlns:p15="http://schemas.microsoft.com/office/powerpoint/2012/main"/>
+    </p:ext>
+  </p:extLst>
 </p:presentation>
 </file>
 
@@ -254,7 +262,7 @@
           <a:p>
             <a:fld id="{55489922-ED5C-DE45-85F1-D26AC85B6B48}" type="datetimeFigureOut">
               <a:rPr kumimoji="1" lang="ko-KR" altLang="en-US" smtClean="0"/>
-              <a:t>2021. 3. 23.</a:t>
+              <a:t>2021. 3. 24.</a:t>
             </a:fld>
             <a:endParaRPr kumimoji="1" lang="ko-KR" altLang="en-US"/>
           </a:p>
@@ -452,7 +460,7 @@
           <a:p>
             <a:fld id="{55489922-ED5C-DE45-85F1-D26AC85B6B48}" type="datetimeFigureOut">
               <a:rPr kumimoji="1" lang="ko-KR" altLang="en-US" smtClean="0"/>
-              <a:t>2021. 3. 23.</a:t>
+              <a:t>2021. 3. 24.</a:t>
             </a:fld>
             <a:endParaRPr kumimoji="1" lang="ko-KR" altLang="en-US"/>
           </a:p>
@@ -660,7 +668,7 @@
           <a:p>
             <a:fld id="{55489922-ED5C-DE45-85F1-D26AC85B6B48}" type="datetimeFigureOut">
               <a:rPr kumimoji="1" lang="ko-KR" altLang="en-US" smtClean="0"/>
-              <a:t>2021. 3. 23.</a:t>
+              <a:t>2021. 3. 24.</a:t>
             </a:fld>
             <a:endParaRPr kumimoji="1" lang="ko-KR" altLang="en-US"/>
           </a:p>
@@ -858,7 +866,7 @@
           <a:p>
             <a:fld id="{55489922-ED5C-DE45-85F1-D26AC85B6B48}" type="datetimeFigureOut">
               <a:rPr kumimoji="1" lang="ko-KR" altLang="en-US" smtClean="0"/>
-              <a:t>2021. 3. 23.</a:t>
+              <a:t>2021. 3. 24.</a:t>
             </a:fld>
             <a:endParaRPr kumimoji="1" lang="ko-KR" altLang="en-US"/>
           </a:p>
@@ -1133,7 +1141,7 @@
           <a:p>
             <a:fld id="{55489922-ED5C-DE45-85F1-D26AC85B6B48}" type="datetimeFigureOut">
               <a:rPr kumimoji="1" lang="ko-KR" altLang="en-US" smtClean="0"/>
-              <a:t>2021. 3. 23.</a:t>
+              <a:t>2021. 3. 24.</a:t>
             </a:fld>
             <a:endParaRPr kumimoji="1" lang="ko-KR" altLang="en-US"/>
           </a:p>
@@ -1398,7 +1406,7 @@
           <a:p>
             <a:fld id="{55489922-ED5C-DE45-85F1-D26AC85B6B48}" type="datetimeFigureOut">
               <a:rPr kumimoji="1" lang="ko-KR" altLang="en-US" smtClean="0"/>
-              <a:t>2021. 3. 23.</a:t>
+              <a:t>2021. 3. 24.</a:t>
             </a:fld>
             <a:endParaRPr kumimoji="1" lang="ko-KR" altLang="en-US"/>
           </a:p>
@@ -1810,7 +1818,7 @@
           <a:p>
             <a:fld id="{55489922-ED5C-DE45-85F1-D26AC85B6B48}" type="datetimeFigureOut">
               <a:rPr kumimoji="1" lang="ko-KR" altLang="en-US" smtClean="0"/>
-              <a:t>2021. 3. 23.</a:t>
+              <a:t>2021. 3. 24.</a:t>
             </a:fld>
             <a:endParaRPr kumimoji="1" lang="ko-KR" altLang="en-US"/>
           </a:p>
@@ -1951,7 +1959,7 @@
           <a:p>
             <a:fld id="{55489922-ED5C-DE45-85F1-D26AC85B6B48}" type="datetimeFigureOut">
               <a:rPr kumimoji="1" lang="ko-KR" altLang="en-US" smtClean="0"/>
-              <a:t>2021. 3. 23.</a:t>
+              <a:t>2021. 3. 24.</a:t>
             </a:fld>
             <a:endParaRPr kumimoji="1" lang="ko-KR" altLang="en-US"/>
           </a:p>
@@ -2064,7 +2072,7 @@
           <a:p>
             <a:fld id="{55489922-ED5C-DE45-85F1-D26AC85B6B48}" type="datetimeFigureOut">
               <a:rPr kumimoji="1" lang="ko-KR" altLang="en-US" smtClean="0"/>
-              <a:t>2021. 3. 23.</a:t>
+              <a:t>2021. 3. 24.</a:t>
             </a:fld>
             <a:endParaRPr kumimoji="1" lang="ko-KR" altLang="en-US"/>
           </a:p>
@@ -2375,7 +2383,7 @@
           <a:p>
             <a:fld id="{55489922-ED5C-DE45-85F1-D26AC85B6B48}" type="datetimeFigureOut">
               <a:rPr kumimoji="1" lang="ko-KR" altLang="en-US" smtClean="0"/>
-              <a:t>2021. 3. 23.</a:t>
+              <a:t>2021. 3. 24.</a:t>
             </a:fld>
             <a:endParaRPr kumimoji="1" lang="ko-KR" altLang="en-US"/>
           </a:p>
@@ -2663,7 +2671,7 @@
           <a:p>
             <a:fld id="{55489922-ED5C-DE45-85F1-D26AC85B6B48}" type="datetimeFigureOut">
               <a:rPr kumimoji="1" lang="ko-KR" altLang="en-US" smtClean="0"/>
-              <a:t>2021. 3. 23.</a:t>
+              <a:t>2021. 3. 24.</a:t>
             </a:fld>
             <a:endParaRPr kumimoji="1" lang="ko-KR" altLang="en-US"/>
           </a:p>
@@ -2904,7 +2912,7 @@
           <a:p>
             <a:fld id="{55489922-ED5C-DE45-85F1-D26AC85B6B48}" type="datetimeFigureOut">
               <a:rPr kumimoji="1" lang="ko-KR" altLang="en-US" smtClean="0"/>
-              <a:t>2021. 3. 23.</a:t>
+              <a:t>2021. 3. 24.</a:t>
             </a:fld>
             <a:endParaRPr kumimoji="1" lang="ko-KR" altLang="en-US"/>
           </a:p>
@@ -3339,18 +3347,32 @@
         </p:nvSpPr>
         <p:spPr>
           <a:xfrm>
-            <a:off x="73573" y="123114"/>
+            <a:off x="1524000" y="3175246"/>
             <a:ext cx="9144000" cy="507507"/>
           </a:xfrm>
         </p:spPr>
         <p:txBody>
-          <a:bodyPr/>
+          <a:bodyPr>
+            <a:normAutofit fontScale="92500" lnSpcReduction="10000"/>
+          </a:bodyPr>
           <a:lstStyle/>
           <a:p>
             <a:pPr algn="l"/>
             <a:r>
-              <a:rPr kumimoji="1" lang="ko-KR" altLang="en-US" dirty="0"/>
-              <a:t>질문 이름 </a:t>
+              <a:rPr kumimoji="1" lang="en-US" altLang="ko-KR" sz="3600" dirty="0"/>
+              <a:t>Q. </a:t>
+            </a:r>
+            <a:r>
+              <a:rPr kumimoji="1" lang="en" altLang="ko-KR" sz="3600" dirty="0"/>
+              <a:t>HashMap </a:t>
+            </a:r>
+            <a:r>
+              <a:rPr kumimoji="1" lang="ko-KR" altLang="en-US" sz="3600" dirty="0"/>
+              <a:t>동작 방식에 대해서 설명하세요</a:t>
+            </a:r>
+            <a:r>
+              <a:rPr kumimoji="1" lang="en-US" altLang="ko-KR" sz="3600" dirty="0"/>
+              <a:t>.</a:t>
             </a:r>
           </a:p>
         </p:txBody>
@@ -3359,6 +3381,3495 @@
     <p:extLst>
       <p:ext uri="{BB962C8B-B14F-4D97-AF65-F5344CB8AC3E}">
         <p14:creationId xmlns:p14="http://schemas.microsoft.com/office/powerpoint/2010/main" val="1352221038"/>
+      </p:ext>
+    </p:extLst>
+  </p:cSld>
+  <p:clrMapOvr>
+    <a:masterClrMapping/>
+  </p:clrMapOvr>
+</p:sld>
+</file>
+
+<file path=ppt/slides/slide2.xml><?xml version="1.0" encoding="utf-8"?>
+<p:sld xmlns:a="http://schemas.openxmlformats.org/drawingml/2006/main" xmlns:r="http://schemas.openxmlformats.org/officeDocument/2006/relationships" xmlns:p="http://schemas.openxmlformats.org/presentationml/2006/main">
+  <p:cSld>
+    <p:spTree>
+      <p:nvGrpSpPr>
+        <p:cNvPr id="1" name=""/>
+        <p:cNvGrpSpPr/>
+        <p:nvPr/>
+      </p:nvGrpSpPr>
+      <p:grpSpPr>
+        <a:xfrm>
+          <a:off x="0" y="0"/>
+          <a:ext cx="0" cy="0"/>
+          <a:chOff x="0" y="0"/>
+          <a:chExt cx="0" cy="0"/>
+        </a:xfrm>
+      </p:grpSpPr>
+      <p:pic>
+        <p:nvPicPr>
+          <p:cNvPr id="33" name="그림 32">
+            <a:extLst>
+              <a:ext uri="{FF2B5EF4-FFF2-40B4-BE49-F238E27FC236}">
+                <a16:creationId xmlns:a16="http://schemas.microsoft.com/office/drawing/2014/main" id="{6F045463-56D4-0F43-8876-AA276DC60357}"/>
+              </a:ext>
+            </a:extLst>
+          </p:cNvPr>
+          <p:cNvPicPr>
+            <a:picLocks noChangeAspect="1"/>
+          </p:cNvPicPr>
+          <p:nvPr/>
+        </p:nvPicPr>
+        <p:blipFill>
+          <a:blip r:embed="rId2"/>
+          <a:stretch>
+            <a:fillRect/>
+          </a:stretch>
+        </p:blipFill>
+        <p:spPr>
+          <a:xfrm>
+            <a:off x="2974141" y="3658894"/>
+            <a:ext cx="5100914" cy="1428256"/>
+          </a:xfrm>
+          <a:prstGeom prst="rect">
+            <a:avLst/>
+          </a:prstGeom>
+        </p:spPr>
+      </p:pic>
+      <p:pic>
+        <p:nvPicPr>
+          <p:cNvPr id="4" name="그림 3">
+            <a:extLst>
+              <a:ext uri="{FF2B5EF4-FFF2-40B4-BE49-F238E27FC236}">
+                <a16:creationId xmlns:a16="http://schemas.microsoft.com/office/drawing/2014/main" id="{77023CD7-EDE0-C54B-90ED-609593694CEB}"/>
+              </a:ext>
+            </a:extLst>
+          </p:cNvPr>
+          <p:cNvPicPr>
+            <a:picLocks noChangeAspect="1"/>
+          </p:cNvPicPr>
+          <p:nvPr/>
+        </p:nvPicPr>
+        <p:blipFill>
+          <a:blip r:embed="rId3"/>
+          <a:stretch>
+            <a:fillRect/>
+          </a:stretch>
+        </p:blipFill>
+        <p:spPr>
+          <a:xfrm>
+            <a:off x="5818128" y="964929"/>
+            <a:ext cx="4864815" cy="1417944"/>
+          </a:xfrm>
+          <a:prstGeom prst="rect">
+            <a:avLst/>
+          </a:prstGeom>
+        </p:spPr>
+      </p:pic>
+      <p:grpSp>
+        <p:nvGrpSpPr>
+          <p:cNvPr id="12" name="그룹 11">
+            <a:extLst>
+              <a:ext uri="{FF2B5EF4-FFF2-40B4-BE49-F238E27FC236}">
+                <a16:creationId xmlns:a16="http://schemas.microsoft.com/office/drawing/2014/main" id="{7C1A2543-669E-4F40-834B-C615CB187B8F}"/>
+              </a:ext>
+            </a:extLst>
+          </p:cNvPr>
+          <p:cNvGrpSpPr/>
+          <p:nvPr/>
+        </p:nvGrpSpPr>
+        <p:grpSpPr>
+          <a:xfrm>
+            <a:off x="6875817" y="3970056"/>
+            <a:ext cx="784481" cy="804125"/>
+            <a:chOff x="1648496" y="1493949"/>
+            <a:chExt cx="978795" cy="978795"/>
+          </a:xfrm>
+        </p:grpSpPr>
+        <p:sp>
+          <p:nvSpPr>
+            <p:cNvPr id="5" name="타원 4">
+              <a:extLst>
+                <a:ext uri="{FF2B5EF4-FFF2-40B4-BE49-F238E27FC236}">
+                  <a16:creationId xmlns:a16="http://schemas.microsoft.com/office/drawing/2014/main" id="{04DDDF2F-8012-C64E-B4D6-6B46F7192912}"/>
+                </a:ext>
+              </a:extLst>
+            </p:cNvPr>
+            <p:cNvSpPr/>
+            <p:nvPr/>
+          </p:nvSpPr>
+          <p:spPr>
+            <a:xfrm>
+              <a:off x="1648496" y="1493949"/>
+              <a:ext cx="978795" cy="978795"/>
+            </a:xfrm>
+            <a:prstGeom prst="ellipse">
+              <a:avLst/>
+            </a:prstGeom>
+            <a:noFill/>
+          </p:spPr>
+          <p:style>
+            <a:lnRef idx="2">
+              <a:schemeClr val="accent1">
+                <a:shade val="50000"/>
+              </a:schemeClr>
+            </a:lnRef>
+            <a:fillRef idx="1">
+              <a:schemeClr val="accent1"/>
+            </a:fillRef>
+            <a:effectRef idx="0">
+              <a:schemeClr val="accent1"/>
+            </a:effectRef>
+            <a:fontRef idx="minor">
+              <a:schemeClr val="lt1"/>
+            </a:fontRef>
+          </p:style>
+          <p:txBody>
+            <a:bodyPr rtlCol="0" anchor="ctr"/>
+            <a:lstStyle/>
+            <a:p>
+              <a:pPr algn="ctr"/>
+              <a:endParaRPr kumimoji="1" lang="ko-KR" altLang="en-US" sz="1400" dirty="0">
+                <a:solidFill>
+                  <a:schemeClr val="accent1"/>
+                </a:solidFill>
+              </a:endParaRPr>
+            </a:p>
+          </p:txBody>
+        </p:sp>
+        <p:cxnSp>
+          <p:nvCxnSpPr>
+            <p:cNvPr id="6" name="직선 연결선[R] 5">
+              <a:extLst>
+                <a:ext uri="{FF2B5EF4-FFF2-40B4-BE49-F238E27FC236}">
+                  <a16:creationId xmlns:a16="http://schemas.microsoft.com/office/drawing/2014/main" id="{F78290FC-0FD1-614B-9709-B8C33F78EB0F}"/>
+                </a:ext>
+              </a:extLst>
+            </p:cNvPr>
+            <p:cNvCxnSpPr>
+              <a:cxnSpLocks/>
+            </p:cNvCxnSpPr>
+            <p:nvPr/>
+          </p:nvCxnSpPr>
+          <p:spPr>
+            <a:xfrm flipH="1">
+              <a:off x="1648497" y="1999482"/>
+              <a:ext cx="978794" cy="0"/>
+            </a:xfrm>
+            <a:prstGeom prst="line">
+              <a:avLst/>
+            </a:prstGeom>
+          </p:spPr>
+          <p:style>
+            <a:lnRef idx="1">
+              <a:schemeClr val="accent1"/>
+            </a:lnRef>
+            <a:fillRef idx="0">
+              <a:schemeClr val="accent1"/>
+            </a:fillRef>
+            <a:effectRef idx="0">
+              <a:schemeClr val="accent1"/>
+            </a:effectRef>
+            <a:fontRef idx="minor">
+              <a:schemeClr val="tx1"/>
+            </a:fontRef>
+          </p:style>
+        </p:cxnSp>
+        <p:sp>
+          <p:nvSpPr>
+            <p:cNvPr id="10" name="TextBox 9">
+              <a:extLst>
+                <a:ext uri="{FF2B5EF4-FFF2-40B4-BE49-F238E27FC236}">
+                  <a16:creationId xmlns:a16="http://schemas.microsoft.com/office/drawing/2014/main" id="{F265E4D7-3581-A745-AFAC-2B3EBD41206E}"/>
+                </a:ext>
+              </a:extLst>
+            </p:cNvPr>
+            <p:cNvSpPr txBox="1"/>
+            <p:nvPr/>
+          </p:nvSpPr>
+          <p:spPr>
+            <a:xfrm>
+              <a:off x="1867435" y="1584100"/>
+              <a:ext cx="551174" cy="350442"/>
+            </a:xfrm>
+            <a:prstGeom prst="rect">
+              <a:avLst/>
+            </a:prstGeom>
+            <a:noFill/>
+          </p:spPr>
+          <p:txBody>
+            <a:bodyPr wrap="none" rtlCol="0">
+              <a:spAutoFit/>
+            </a:bodyPr>
+            <a:lstStyle/>
+            <a:p>
+              <a:r>
+                <a:rPr kumimoji="1" lang="en-US" altLang="ko-KR" sz="1400" dirty="0">
+                  <a:solidFill>
+                    <a:schemeClr val="accent1"/>
+                  </a:solidFill>
+                </a:rPr>
+                <a:t>Key</a:t>
+              </a:r>
+              <a:endParaRPr kumimoji="1" lang="ko-KR" altLang="en-US" sz="1400" dirty="0">
+                <a:solidFill>
+                  <a:schemeClr val="accent1"/>
+                </a:solidFill>
+              </a:endParaRPr>
+            </a:p>
+          </p:txBody>
+        </p:sp>
+        <p:sp>
+          <p:nvSpPr>
+            <p:cNvPr id="11" name="TextBox 10">
+              <a:extLst>
+                <a:ext uri="{FF2B5EF4-FFF2-40B4-BE49-F238E27FC236}">
+                  <a16:creationId xmlns:a16="http://schemas.microsoft.com/office/drawing/2014/main" id="{67BA3E03-C1A0-3F4E-886A-936522FF9986}"/>
+                </a:ext>
+              </a:extLst>
+            </p:cNvPr>
+            <p:cNvSpPr txBox="1"/>
+            <p:nvPr/>
+          </p:nvSpPr>
+          <p:spPr>
+            <a:xfrm>
+              <a:off x="1772153" y="2043587"/>
+              <a:ext cx="726891" cy="350442"/>
+            </a:xfrm>
+            <a:prstGeom prst="rect">
+              <a:avLst/>
+            </a:prstGeom>
+            <a:noFill/>
+          </p:spPr>
+          <p:txBody>
+            <a:bodyPr wrap="none" rtlCol="0">
+              <a:spAutoFit/>
+            </a:bodyPr>
+            <a:lstStyle/>
+            <a:p>
+              <a:r>
+                <a:rPr kumimoji="1" lang="en-US" altLang="ko-KR" sz="1400" dirty="0">
+                  <a:solidFill>
+                    <a:schemeClr val="accent1"/>
+                  </a:solidFill>
+                </a:rPr>
+                <a:t>Value</a:t>
+              </a:r>
+              <a:endParaRPr kumimoji="1" lang="ko-KR" altLang="en-US" sz="1400" dirty="0">
+                <a:solidFill>
+                  <a:schemeClr val="accent1"/>
+                </a:solidFill>
+              </a:endParaRPr>
+            </a:p>
+          </p:txBody>
+        </p:sp>
+      </p:grpSp>
+      <p:grpSp>
+        <p:nvGrpSpPr>
+          <p:cNvPr id="13" name="그룹 12">
+            <a:extLst>
+              <a:ext uri="{FF2B5EF4-FFF2-40B4-BE49-F238E27FC236}">
+                <a16:creationId xmlns:a16="http://schemas.microsoft.com/office/drawing/2014/main" id="{65C05299-A684-A540-8AE5-0C7A635A80C7}"/>
+              </a:ext>
+            </a:extLst>
+          </p:cNvPr>
+          <p:cNvGrpSpPr/>
+          <p:nvPr/>
+        </p:nvGrpSpPr>
+        <p:grpSpPr>
+          <a:xfrm>
+            <a:off x="5716604" y="3978366"/>
+            <a:ext cx="784481" cy="804125"/>
+            <a:chOff x="1648496" y="1493949"/>
+            <a:chExt cx="978795" cy="978795"/>
+          </a:xfrm>
+        </p:grpSpPr>
+        <p:sp>
+          <p:nvSpPr>
+            <p:cNvPr id="14" name="타원 13">
+              <a:extLst>
+                <a:ext uri="{FF2B5EF4-FFF2-40B4-BE49-F238E27FC236}">
+                  <a16:creationId xmlns:a16="http://schemas.microsoft.com/office/drawing/2014/main" id="{9BFC5281-1B6C-7440-813C-8E6669AC6B2C}"/>
+                </a:ext>
+              </a:extLst>
+            </p:cNvPr>
+            <p:cNvSpPr/>
+            <p:nvPr/>
+          </p:nvSpPr>
+          <p:spPr>
+            <a:xfrm>
+              <a:off x="1648496" y="1493949"/>
+              <a:ext cx="978795" cy="978795"/>
+            </a:xfrm>
+            <a:prstGeom prst="ellipse">
+              <a:avLst/>
+            </a:prstGeom>
+            <a:noFill/>
+          </p:spPr>
+          <p:style>
+            <a:lnRef idx="2">
+              <a:schemeClr val="accent1">
+                <a:shade val="50000"/>
+              </a:schemeClr>
+            </a:lnRef>
+            <a:fillRef idx="1">
+              <a:schemeClr val="accent1"/>
+            </a:fillRef>
+            <a:effectRef idx="0">
+              <a:schemeClr val="accent1"/>
+            </a:effectRef>
+            <a:fontRef idx="minor">
+              <a:schemeClr val="lt1"/>
+            </a:fontRef>
+          </p:style>
+          <p:txBody>
+            <a:bodyPr rtlCol="0" anchor="ctr"/>
+            <a:lstStyle/>
+            <a:p>
+              <a:pPr algn="ctr"/>
+              <a:endParaRPr kumimoji="1" lang="ko-KR" altLang="en-US" sz="1400" dirty="0">
+                <a:solidFill>
+                  <a:schemeClr val="accent1"/>
+                </a:solidFill>
+              </a:endParaRPr>
+            </a:p>
+          </p:txBody>
+        </p:sp>
+        <p:cxnSp>
+          <p:nvCxnSpPr>
+            <p:cNvPr id="15" name="직선 연결선[R] 14">
+              <a:extLst>
+                <a:ext uri="{FF2B5EF4-FFF2-40B4-BE49-F238E27FC236}">
+                  <a16:creationId xmlns:a16="http://schemas.microsoft.com/office/drawing/2014/main" id="{AF453347-1F53-D148-BDDD-6C4C09081E7D}"/>
+                </a:ext>
+              </a:extLst>
+            </p:cNvPr>
+            <p:cNvCxnSpPr>
+              <a:cxnSpLocks/>
+            </p:cNvCxnSpPr>
+            <p:nvPr/>
+          </p:nvCxnSpPr>
+          <p:spPr>
+            <a:xfrm flipH="1">
+              <a:off x="1648497" y="1999482"/>
+              <a:ext cx="978794" cy="0"/>
+            </a:xfrm>
+            <a:prstGeom prst="line">
+              <a:avLst/>
+            </a:prstGeom>
+          </p:spPr>
+          <p:style>
+            <a:lnRef idx="1">
+              <a:schemeClr val="accent1"/>
+            </a:lnRef>
+            <a:fillRef idx="0">
+              <a:schemeClr val="accent1"/>
+            </a:fillRef>
+            <a:effectRef idx="0">
+              <a:schemeClr val="accent1"/>
+            </a:effectRef>
+            <a:fontRef idx="minor">
+              <a:schemeClr val="tx1"/>
+            </a:fontRef>
+          </p:style>
+        </p:cxnSp>
+        <p:sp>
+          <p:nvSpPr>
+            <p:cNvPr id="16" name="TextBox 15">
+              <a:extLst>
+                <a:ext uri="{FF2B5EF4-FFF2-40B4-BE49-F238E27FC236}">
+                  <a16:creationId xmlns:a16="http://schemas.microsoft.com/office/drawing/2014/main" id="{66574ECD-25DD-E945-9748-84E6C97BE5A7}"/>
+                </a:ext>
+              </a:extLst>
+            </p:cNvPr>
+            <p:cNvSpPr txBox="1"/>
+            <p:nvPr/>
+          </p:nvSpPr>
+          <p:spPr>
+            <a:xfrm>
+              <a:off x="1867435" y="1584100"/>
+              <a:ext cx="551174" cy="350442"/>
+            </a:xfrm>
+            <a:prstGeom prst="rect">
+              <a:avLst/>
+            </a:prstGeom>
+            <a:noFill/>
+          </p:spPr>
+          <p:txBody>
+            <a:bodyPr wrap="none" rtlCol="0">
+              <a:spAutoFit/>
+            </a:bodyPr>
+            <a:lstStyle/>
+            <a:p>
+              <a:r>
+                <a:rPr kumimoji="1" lang="en-US" altLang="ko-KR" sz="1400" dirty="0">
+                  <a:solidFill>
+                    <a:schemeClr val="accent1"/>
+                  </a:solidFill>
+                </a:rPr>
+                <a:t>Key</a:t>
+              </a:r>
+              <a:endParaRPr kumimoji="1" lang="ko-KR" altLang="en-US" sz="1400" dirty="0">
+                <a:solidFill>
+                  <a:schemeClr val="accent1"/>
+                </a:solidFill>
+              </a:endParaRPr>
+            </a:p>
+          </p:txBody>
+        </p:sp>
+        <p:sp>
+          <p:nvSpPr>
+            <p:cNvPr id="17" name="TextBox 16">
+              <a:extLst>
+                <a:ext uri="{FF2B5EF4-FFF2-40B4-BE49-F238E27FC236}">
+                  <a16:creationId xmlns:a16="http://schemas.microsoft.com/office/drawing/2014/main" id="{8788F96D-AB99-7646-BC24-7F3AEBA9E7BF}"/>
+                </a:ext>
+              </a:extLst>
+            </p:cNvPr>
+            <p:cNvSpPr txBox="1"/>
+            <p:nvPr/>
+          </p:nvSpPr>
+          <p:spPr>
+            <a:xfrm>
+              <a:off x="1772153" y="2043587"/>
+              <a:ext cx="726891" cy="350442"/>
+            </a:xfrm>
+            <a:prstGeom prst="rect">
+              <a:avLst/>
+            </a:prstGeom>
+            <a:noFill/>
+          </p:spPr>
+          <p:txBody>
+            <a:bodyPr wrap="none" rtlCol="0">
+              <a:spAutoFit/>
+            </a:bodyPr>
+            <a:lstStyle/>
+            <a:p>
+              <a:r>
+                <a:rPr kumimoji="1" lang="en-US" altLang="ko-KR" sz="1400" dirty="0">
+                  <a:solidFill>
+                    <a:schemeClr val="accent1"/>
+                  </a:solidFill>
+                </a:rPr>
+                <a:t>Value</a:t>
+              </a:r>
+              <a:endParaRPr kumimoji="1" lang="ko-KR" altLang="en-US" sz="1400" dirty="0">
+                <a:solidFill>
+                  <a:schemeClr val="accent1"/>
+                </a:solidFill>
+              </a:endParaRPr>
+            </a:p>
+          </p:txBody>
+        </p:sp>
+      </p:grpSp>
+      <p:grpSp>
+        <p:nvGrpSpPr>
+          <p:cNvPr id="18" name="그룹 17">
+            <a:extLst>
+              <a:ext uri="{FF2B5EF4-FFF2-40B4-BE49-F238E27FC236}">
+                <a16:creationId xmlns:a16="http://schemas.microsoft.com/office/drawing/2014/main" id="{EA1C4FDD-9FF4-E141-98DE-8380D75E8ED6}"/>
+              </a:ext>
+            </a:extLst>
+          </p:cNvPr>
+          <p:cNvGrpSpPr/>
+          <p:nvPr/>
+        </p:nvGrpSpPr>
+        <p:grpSpPr>
+          <a:xfrm>
+            <a:off x="4561534" y="3962507"/>
+            <a:ext cx="784481" cy="804125"/>
+            <a:chOff x="1648496" y="1493949"/>
+            <a:chExt cx="978795" cy="978795"/>
+          </a:xfrm>
+        </p:grpSpPr>
+        <p:sp>
+          <p:nvSpPr>
+            <p:cNvPr id="19" name="타원 18">
+              <a:extLst>
+                <a:ext uri="{FF2B5EF4-FFF2-40B4-BE49-F238E27FC236}">
+                  <a16:creationId xmlns:a16="http://schemas.microsoft.com/office/drawing/2014/main" id="{B1588992-936F-4B46-A6CA-0339AB984DCF}"/>
+                </a:ext>
+              </a:extLst>
+            </p:cNvPr>
+            <p:cNvSpPr/>
+            <p:nvPr/>
+          </p:nvSpPr>
+          <p:spPr>
+            <a:xfrm>
+              <a:off x="1648496" y="1493949"/>
+              <a:ext cx="978795" cy="978795"/>
+            </a:xfrm>
+            <a:prstGeom prst="ellipse">
+              <a:avLst/>
+            </a:prstGeom>
+            <a:noFill/>
+          </p:spPr>
+          <p:style>
+            <a:lnRef idx="2">
+              <a:schemeClr val="accent1">
+                <a:shade val="50000"/>
+              </a:schemeClr>
+            </a:lnRef>
+            <a:fillRef idx="1">
+              <a:schemeClr val="accent1"/>
+            </a:fillRef>
+            <a:effectRef idx="0">
+              <a:schemeClr val="accent1"/>
+            </a:effectRef>
+            <a:fontRef idx="minor">
+              <a:schemeClr val="lt1"/>
+            </a:fontRef>
+          </p:style>
+          <p:txBody>
+            <a:bodyPr rtlCol="0" anchor="ctr"/>
+            <a:lstStyle/>
+            <a:p>
+              <a:pPr algn="ctr"/>
+              <a:endParaRPr kumimoji="1" lang="ko-KR" altLang="en-US" sz="1400" dirty="0">
+                <a:solidFill>
+                  <a:schemeClr val="accent1"/>
+                </a:solidFill>
+              </a:endParaRPr>
+            </a:p>
+          </p:txBody>
+        </p:sp>
+        <p:cxnSp>
+          <p:nvCxnSpPr>
+            <p:cNvPr id="20" name="직선 연결선[R] 19">
+              <a:extLst>
+                <a:ext uri="{FF2B5EF4-FFF2-40B4-BE49-F238E27FC236}">
+                  <a16:creationId xmlns:a16="http://schemas.microsoft.com/office/drawing/2014/main" id="{8165B2EE-4465-4347-BBBA-4D9C37F90DB2}"/>
+                </a:ext>
+              </a:extLst>
+            </p:cNvPr>
+            <p:cNvCxnSpPr>
+              <a:cxnSpLocks/>
+            </p:cNvCxnSpPr>
+            <p:nvPr/>
+          </p:nvCxnSpPr>
+          <p:spPr>
+            <a:xfrm flipH="1">
+              <a:off x="1648497" y="1999482"/>
+              <a:ext cx="978794" cy="0"/>
+            </a:xfrm>
+            <a:prstGeom prst="line">
+              <a:avLst/>
+            </a:prstGeom>
+          </p:spPr>
+          <p:style>
+            <a:lnRef idx="1">
+              <a:schemeClr val="accent1"/>
+            </a:lnRef>
+            <a:fillRef idx="0">
+              <a:schemeClr val="accent1"/>
+            </a:fillRef>
+            <a:effectRef idx="0">
+              <a:schemeClr val="accent1"/>
+            </a:effectRef>
+            <a:fontRef idx="minor">
+              <a:schemeClr val="tx1"/>
+            </a:fontRef>
+          </p:style>
+        </p:cxnSp>
+        <p:sp>
+          <p:nvSpPr>
+            <p:cNvPr id="21" name="TextBox 20">
+              <a:extLst>
+                <a:ext uri="{FF2B5EF4-FFF2-40B4-BE49-F238E27FC236}">
+                  <a16:creationId xmlns:a16="http://schemas.microsoft.com/office/drawing/2014/main" id="{5DBEA383-02A9-2941-8E4E-99330BB446F3}"/>
+                </a:ext>
+              </a:extLst>
+            </p:cNvPr>
+            <p:cNvSpPr txBox="1"/>
+            <p:nvPr/>
+          </p:nvSpPr>
+          <p:spPr>
+            <a:xfrm>
+              <a:off x="1867435" y="1584100"/>
+              <a:ext cx="551174" cy="350442"/>
+            </a:xfrm>
+            <a:prstGeom prst="rect">
+              <a:avLst/>
+            </a:prstGeom>
+            <a:noFill/>
+          </p:spPr>
+          <p:txBody>
+            <a:bodyPr wrap="none" rtlCol="0">
+              <a:spAutoFit/>
+            </a:bodyPr>
+            <a:lstStyle/>
+            <a:p>
+              <a:r>
+                <a:rPr kumimoji="1" lang="en-US" altLang="ko-KR" sz="1400" dirty="0">
+                  <a:solidFill>
+                    <a:schemeClr val="accent1"/>
+                  </a:solidFill>
+                </a:rPr>
+                <a:t>Key</a:t>
+              </a:r>
+              <a:endParaRPr kumimoji="1" lang="ko-KR" altLang="en-US" sz="1400" dirty="0">
+                <a:solidFill>
+                  <a:schemeClr val="accent1"/>
+                </a:solidFill>
+              </a:endParaRPr>
+            </a:p>
+          </p:txBody>
+        </p:sp>
+        <p:sp>
+          <p:nvSpPr>
+            <p:cNvPr id="22" name="TextBox 21">
+              <a:extLst>
+                <a:ext uri="{FF2B5EF4-FFF2-40B4-BE49-F238E27FC236}">
+                  <a16:creationId xmlns:a16="http://schemas.microsoft.com/office/drawing/2014/main" id="{649385E1-0F3B-4B43-BDC1-1AA01CB43D13}"/>
+                </a:ext>
+              </a:extLst>
+            </p:cNvPr>
+            <p:cNvSpPr txBox="1"/>
+            <p:nvPr/>
+          </p:nvSpPr>
+          <p:spPr>
+            <a:xfrm>
+              <a:off x="1772153" y="2043587"/>
+              <a:ext cx="726891" cy="350442"/>
+            </a:xfrm>
+            <a:prstGeom prst="rect">
+              <a:avLst/>
+            </a:prstGeom>
+            <a:noFill/>
+          </p:spPr>
+          <p:txBody>
+            <a:bodyPr wrap="none" rtlCol="0">
+              <a:spAutoFit/>
+            </a:bodyPr>
+            <a:lstStyle/>
+            <a:p>
+              <a:r>
+                <a:rPr kumimoji="1" lang="en-US" altLang="ko-KR" sz="1400" dirty="0">
+                  <a:solidFill>
+                    <a:schemeClr val="accent1"/>
+                  </a:solidFill>
+                </a:rPr>
+                <a:t>Value</a:t>
+              </a:r>
+              <a:endParaRPr kumimoji="1" lang="ko-KR" altLang="en-US" sz="1400" dirty="0">
+                <a:solidFill>
+                  <a:schemeClr val="accent1"/>
+                </a:solidFill>
+              </a:endParaRPr>
+            </a:p>
+          </p:txBody>
+        </p:sp>
+      </p:grpSp>
+      <p:sp>
+        <p:nvSpPr>
+          <p:cNvPr id="28" name="TextBox 27">
+            <a:extLst>
+              <a:ext uri="{FF2B5EF4-FFF2-40B4-BE49-F238E27FC236}">
+                <a16:creationId xmlns:a16="http://schemas.microsoft.com/office/drawing/2014/main" id="{E8E9AFE1-B71C-A646-885D-E19981DECD78}"/>
+              </a:ext>
+            </a:extLst>
+          </p:cNvPr>
+          <p:cNvSpPr txBox="1"/>
+          <p:nvPr/>
+        </p:nvSpPr>
+        <p:spPr>
+          <a:xfrm>
+            <a:off x="1617256" y="4055307"/>
+            <a:ext cx="1399742" cy="584775"/>
+          </a:xfrm>
+          <a:prstGeom prst="rect">
+            <a:avLst/>
+          </a:prstGeom>
+          <a:noFill/>
+        </p:spPr>
+        <p:txBody>
+          <a:bodyPr wrap="none" rtlCol="0">
+            <a:spAutoFit/>
+          </a:bodyPr>
+          <a:lstStyle/>
+          <a:p>
+            <a:r>
+              <a:rPr kumimoji="1" lang="en-US" altLang="ko-KR" sz="3200" dirty="0">
+                <a:solidFill>
+                  <a:schemeClr val="accent1"/>
+                </a:solidFill>
+              </a:rPr>
+              <a:t>Map : </a:t>
+            </a:r>
+            <a:endParaRPr kumimoji="1" lang="ko-KR" altLang="en-US" sz="3200" dirty="0">
+              <a:solidFill>
+                <a:schemeClr val="accent1"/>
+              </a:solidFill>
+            </a:endParaRPr>
+          </a:p>
+        </p:txBody>
+      </p:sp>
+      <p:cxnSp>
+        <p:nvCxnSpPr>
+          <p:cNvPr id="30" name="직선 화살표 연결선 29">
+            <a:extLst>
+              <a:ext uri="{FF2B5EF4-FFF2-40B4-BE49-F238E27FC236}">
+                <a16:creationId xmlns:a16="http://schemas.microsoft.com/office/drawing/2014/main" id="{EFC39481-EF03-C849-86BB-F27B72821A1B}"/>
+              </a:ext>
+            </a:extLst>
+          </p:cNvPr>
+          <p:cNvCxnSpPr>
+            <a:cxnSpLocks/>
+          </p:cNvCxnSpPr>
+          <p:nvPr/>
+        </p:nvCxnSpPr>
+        <p:spPr>
+          <a:xfrm>
+            <a:off x="4069281" y="4900858"/>
+            <a:ext cx="218688" cy="804131"/>
+          </a:xfrm>
+          <a:prstGeom prst="straightConnector1">
+            <a:avLst/>
+          </a:prstGeom>
+          <a:ln w="28575">
+            <a:solidFill>
+              <a:schemeClr val="accent2"/>
+            </a:solidFill>
+            <a:tailEnd type="triangle"/>
+          </a:ln>
+        </p:spPr>
+        <p:style>
+          <a:lnRef idx="1">
+            <a:schemeClr val="accent1"/>
+          </a:lnRef>
+          <a:fillRef idx="0">
+            <a:schemeClr val="accent1"/>
+          </a:fillRef>
+          <a:effectRef idx="0">
+            <a:schemeClr val="accent1"/>
+          </a:effectRef>
+          <a:fontRef idx="minor">
+            <a:schemeClr val="tx1"/>
+          </a:fontRef>
+        </p:style>
+      </p:cxnSp>
+      <p:sp>
+        <p:nvSpPr>
+          <p:cNvPr id="31" name="TextBox 30">
+            <a:extLst>
+              <a:ext uri="{FF2B5EF4-FFF2-40B4-BE49-F238E27FC236}">
+                <a16:creationId xmlns:a16="http://schemas.microsoft.com/office/drawing/2014/main" id="{2FA8721D-BC7D-E344-8EB6-2C1C771CA0EA}"/>
+              </a:ext>
+            </a:extLst>
+          </p:cNvPr>
+          <p:cNvSpPr txBox="1"/>
+          <p:nvPr/>
+        </p:nvSpPr>
+        <p:spPr>
+          <a:xfrm>
+            <a:off x="3891926" y="5594327"/>
+            <a:ext cx="880241" cy="369332"/>
+          </a:xfrm>
+          <a:prstGeom prst="rect">
+            <a:avLst/>
+          </a:prstGeom>
+          <a:noFill/>
+        </p:spPr>
+        <p:txBody>
+          <a:bodyPr wrap="none" rtlCol="0">
+            <a:spAutoFit/>
+          </a:bodyPr>
+          <a:lstStyle/>
+          <a:p>
+            <a:r>
+              <a:rPr kumimoji="1" lang="en-US" altLang="ko-KR" dirty="0">
+                <a:solidFill>
+                  <a:schemeClr val="accent2"/>
+                </a:solidFill>
+              </a:rPr>
+              <a:t>bucket</a:t>
+            </a:r>
+            <a:endParaRPr kumimoji="1" lang="ko-KR" altLang="en-US" dirty="0">
+              <a:solidFill>
+                <a:schemeClr val="accent2"/>
+              </a:solidFill>
+            </a:endParaRPr>
+          </a:p>
+        </p:txBody>
+      </p:sp>
+      <p:grpSp>
+        <p:nvGrpSpPr>
+          <p:cNvPr id="34" name="그룹 33">
+            <a:extLst>
+              <a:ext uri="{FF2B5EF4-FFF2-40B4-BE49-F238E27FC236}">
+                <a16:creationId xmlns:a16="http://schemas.microsoft.com/office/drawing/2014/main" id="{7BEC081F-B5FF-384E-A9FC-48FA69DA6735}"/>
+              </a:ext>
+            </a:extLst>
+          </p:cNvPr>
+          <p:cNvGrpSpPr/>
+          <p:nvPr/>
+        </p:nvGrpSpPr>
+        <p:grpSpPr>
+          <a:xfrm>
+            <a:off x="3387587" y="3991622"/>
+            <a:ext cx="784481" cy="804125"/>
+            <a:chOff x="1648496" y="1493949"/>
+            <a:chExt cx="978795" cy="978795"/>
+          </a:xfrm>
+        </p:grpSpPr>
+        <p:sp>
+          <p:nvSpPr>
+            <p:cNvPr id="35" name="타원 34">
+              <a:extLst>
+                <a:ext uri="{FF2B5EF4-FFF2-40B4-BE49-F238E27FC236}">
+                  <a16:creationId xmlns:a16="http://schemas.microsoft.com/office/drawing/2014/main" id="{19C49CDB-9158-2045-BCA4-AB256B03ED8A}"/>
+                </a:ext>
+              </a:extLst>
+            </p:cNvPr>
+            <p:cNvSpPr/>
+            <p:nvPr/>
+          </p:nvSpPr>
+          <p:spPr>
+            <a:xfrm>
+              <a:off x="1648496" y="1493949"/>
+              <a:ext cx="978795" cy="978795"/>
+            </a:xfrm>
+            <a:prstGeom prst="ellipse">
+              <a:avLst/>
+            </a:prstGeom>
+            <a:noFill/>
+          </p:spPr>
+          <p:style>
+            <a:lnRef idx="2">
+              <a:schemeClr val="accent1">
+                <a:shade val="50000"/>
+              </a:schemeClr>
+            </a:lnRef>
+            <a:fillRef idx="1">
+              <a:schemeClr val="accent1"/>
+            </a:fillRef>
+            <a:effectRef idx="0">
+              <a:schemeClr val="accent1"/>
+            </a:effectRef>
+            <a:fontRef idx="minor">
+              <a:schemeClr val="lt1"/>
+            </a:fontRef>
+          </p:style>
+          <p:txBody>
+            <a:bodyPr rtlCol="0" anchor="ctr"/>
+            <a:lstStyle/>
+            <a:p>
+              <a:pPr algn="ctr"/>
+              <a:endParaRPr kumimoji="1" lang="ko-KR" altLang="en-US" sz="1400" dirty="0">
+                <a:solidFill>
+                  <a:schemeClr val="accent1"/>
+                </a:solidFill>
+              </a:endParaRPr>
+            </a:p>
+          </p:txBody>
+        </p:sp>
+        <p:cxnSp>
+          <p:nvCxnSpPr>
+            <p:cNvPr id="36" name="직선 연결선[R] 35">
+              <a:extLst>
+                <a:ext uri="{FF2B5EF4-FFF2-40B4-BE49-F238E27FC236}">
+                  <a16:creationId xmlns:a16="http://schemas.microsoft.com/office/drawing/2014/main" id="{C598145F-F28D-2348-906C-53C922C66B4E}"/>
+                </a:ext>
+              </a:extLst>
+            </p:cNvPr>
+            <p:cNvCxnSpPr>
+              <a:cxnSpLocks/>
+            </p:cNvCxnSpPr>
+            <p:nvPr/>
+          </p:nvCxnSpPr>
+          <p:spPr>
+            <a:xfrm flipH="1">
+              <a:off x="1648497" y="1999482"/>
+              <a:ext cx="978794" cy="0"/>
+            </a:xfrm>
+            <a:prstGeom prst="line">
+              <a:avLst/>
+            </a:prstGeom>
+          </p:spPr>
+          <p:style>
+            <a:lnRef idx="1">
+              <a:schemeClr val="accent1"/>
+            </a:lnRef>
+            <a:fillRef idx="0">
+              <a:schemeClr val="accent1"/>
+            </a:fillRef>
+            <a:effectRef idx="0">
+              <a:schemeClr val="accent1"/>
+            </a:effectRef>
+            <a:fontRef idx="minor">
+              <a:schemeClr val="tx1"/>
+            </a:fontRef>
+          </p:style>
+        </p:cxnSp>
+        <p:sp>
+          <p:nvSpPr>
+            <p:cNvPr id="37" name="TextBox 36">
+              <a:extLst>
+                <a:ext uri="{FF2B5EF4-FFF2-40B4-BE49-F238E27FC236}">
+                  <a16:creationId xmlns:a16="http://schemas.microsoft.com/office/drawing/2014/main" id="{CE294F43-3C59-244D-9E52-8EE25853C3E5}"/>
+                </a:ext>
+              </a:extLst>
+            </p:cNvPr>
+            <p:cNvSpPr txBox="1"/>
+            <p:nvPr/>
+          </p:nvSpPr>
+          <p:spPr>
+            <a:xfrm>
+              <a:off x="1867435" y="1584100"/>
+              <a:ext cx="551174" cy="350442"/>
+            </a:xfrm>
+            <a:prstGeom prst="rect">
+              <a:avLst/>
+            </a:prstGeom>
+            <a:noFill/>
+          </p:spPr>
+          <p:txBody>
+            <a:bodyPr wrap="none" rtlCol="0">
+              <a:spAutoFit/>
+            </a:bodyPr>
+            <a:lstStyle/>
+            <a:p>
+              <a:r>
+                <a:rPr kumimoji="1" lang="en-US" altLang="ko-KR" sz="1400" dirty="0">
+                  <a:solidFill>
+                    <a:schemeClr val="accent1"/>
+                  </a:solidFill>
+                </a:rPr>
+                <a:t>Key</a:t>
+              </a:r>
+              <a:endParaRPr kumimoji="1" lang="ko-KR" altLang="en-US" sz="1400" dirty="0">
+                <a:solidFill>
+                  <a:schemeClr val="accent1"/>
+                </a:solidFill>
+              </a:endParaRPr>
+            </a:p>
+          </p:txBody>
+        </p:sp>
+        <p:sp>
+          <p:nvSpPr>
+            <p:cNvPr id="38" name="TextBox 37">
+              <a:extLst>
+                <a:ext uri="{FF2B5EF4-FFF2-40B4-BE49-F238E27FC236}">
+                  <a16:creationId xmlns:a16="http://schemas.microsoft.com/office/drawing/2014/main" id="{32CA119A-BA20-4B44-84FD-9BE3EC061B70}"/>
+                </a:ext>
+              </a:extLst>
+            </p:cNvPr>
+            <p:cNvSpPr txBox="1"/>
+            <p:nvPr/>
+          </p:nvSpPr>
+          <p:spPr>
+            <a:xfrm>
+              <a:off x="1772153" y="2043587"/>
+              <a:ext cx="726891" cy="350442"/>
+            </a:xfrm>
+            <a:prstGeom prst="rect">
+              <a:avLst/>
+            </a:prstGeom>
+            <a:noFill/>
+          </p:spPr>
+          <p:txBody>
+            <a:bodyPr wrap="none" rtlCol="0">
+              <a:spAutoFit/>
+            </a:bodyPr>
+            <a:lstStyle/>
+            <a:p>
+              <a:r>
+                <a:rPr kumimoji="1" lang="en-US" altLang="ko-KR" sz="1400" dirty="0">
+                  <a:solidFill>
+                    <a:schemeClr val="accent1"/>
+                  </a:solidFill>
+                </a:rPr>
+                <a:t>Value</a:t>
+              </a:r>
+              <a:endParaRPr kumimoji="1" lang="ko-KR" altLang="en-US" sz="1400" dirty="0">
+                <a:solidFill>
+                  <a:schemeClr val="accent1"/>
+                </a:solidFill>
+              </a:endParaRPr>
+            </a:p>
+          </p:txBody>
+        </p:sp>
+      </p:grpSp>
+      <p:pic>
+        <p:nvPicPr>
+          <p:cNvPr id="39" name="그림 38">
+            <a:extLst>
+              <a:ext uri="{FF2B5EF4-FFF2-40B4-BE49-F238E27FC236}">
+                <a16:creationId xmlns:a16="http://schemas.microsoft.com/office/drawing/2014/main" id="{DEE73250-054F-E244-9F31-D98C0C4DE975}"/>
+              </a:ext>
+            </a:extLst>
+          </p:cNvPr>
+          <p:cNvPicPr>
+            <a:picLocks noChangeAspect="1"/>
+          </p:cNvPicPr>
+          <p:nvPr/>
+        </p:nvPicPr>
+        <p:blipFill>
+          <a:blip r:embed="rId4">
+            <a:extLst>
+              <a:ext uri="{BEBA8EAE-BF5A-486C-A8C5-ECC9F3942E4B}">
+                <a14:imgProps xmlns:a14="http://schemas.microsoft.com/office/drawing/2010/main">
+                  <a14:imgLayer r:embed="rId5">
+                    <a14:imgEffect>
+                      <a14:backgroundRemoval t="9896" b="91667" l="9794" r="94845">
+                        <a14:foregroundMark x1="59794" y1="91667" x2="59794" y2="91667"/>
+                        <a14:foregroundMark x1="90722" y1="91667" x2="90722" y2="91667"/>
+                        <a14:foregroundMark x1="94845" y1="90104" x2="94845" y2="90104"/>
+                        <a14:foregroundMark x1="94845" y1="37500" x2="94845" y2="37500"/>
+                      </a14:backgroundRemoval>
+                    </a14:imgEffect>
+                  </a14:imgLayer>
+                </a14:imgProps>
+              </a:ext>
+            </a:extLst>
+          </a:blip>
+          <a:stretch>
+            <a:fillRect/>
+          </a:stretch>
+        </p:blipFill>
+        <p:spPr>
+          <a:xfrm>
+            <a:off x="2966273" y="3632020"/>
+            <a:ext cx="1422952" cy="1408283"/>
+          </a:xfrm>
+          <a:prstGeom prst="rect">
+            <a:avLst/>
+          </a:prstGeom>
+        </p:spPr>
+      </p:pic>
+      <p:cxnSp>
+        <p:nvCxnSpPr>
+          <p:cNvPr id="40" name="직선 연결선[R] 39">
+            <a:extLst>
+              <a:ext uri="{FF2B5EF4-FFF2-40B4-BE49-F238E27FC236}">
+                <a16:creationId xmlns:a16="http://schemas.microsoft.com/office/drawing/2014/main" id="{74A1BAC6-31A9-7741-8A8C-80DBBFD674E6}"/>
+              </a:ext>
+            </a:extLst>
+          </p:cNvPr>
+          <p:cNvCxnSpPr>
+            <a:cxnSpLocks/>
+          </p:cNvCxnSpPr>
+          <p:nvPr/>
+        </p:nvCxnSpPr>
+        <p:spPr>
+          <a:xfrm>
+            <a:off x="4329641" y="3836560"/>
+            <a:ext cx="0" cy="1064298"/>
+          </a:xfrm>
+          <a:prstGeom prst="line">
+            <a:avLst/>
+          </a:prstGeom>
+          <a:ln w="28575">
+            <a:solidFill>
+              <a:schemeClr val="accent2"/>
+            </a:solidFill>
+          </a:ln>
+        </p:spPr>
+        <p:style>
+          <a:lnRef idx="1">
+            <a:schemeClr val="accent1"/>
+          </a:lnRef>
+          <a:fillRef idx="0">
+            <a:schemeClr val="accent1"/>
+          </a:fillRef>
+          <a:effectRef idx="0">
+            <a:schemeClr val="accent1"/>
+          </a:effectRef>
+          <a:fontRef idx="minor">
+            <a:schemeClr val="tx1"/>
+          </a:fontRef>
+        </p:style>
+      </p:cxnSp>
+      <p:sp>
+        <p:nvSpPr>
+          <p:cNvPr id="29" name="부제목 2">
+            <a:extLst>
+              <a:ext uri="{FF2B5EF4-FFF2-40B4-BE49-F238E27FC236}">
+                <a16:creationId xmlns:a16="http://schemas.microsoft.com/office/drawing/2014/main" id="{860215C1-D213-7345-AAB5-E41C94D8FB31}"/>
+              </a:ext>
+            </a:extLst>
+          </p:cNvPr>
+          <p:cNvSpPr txBox="1">
+            <a:spLocks/>
+          </p:cNvSpPr>
+          <p:nvPr/>
+        </p:nvSpPr>
+        <p:spPr>
+          <a:xfrm>
+            <a:off x="73573" y="123114"/>
+            <a:ext cx="9144000" cy="507507"/>
+          </a:xfrm>
+          <a:prstGeom prst="rect">
+            <a:avLst/>
+          </a:prstGeom>
+        </p:spPr>
+        <p:txBody>
+          <a:bodyPr vert="horz" lIns="91440" tIns="45720" rIns="91440" bIns="45720" rtlCol="0">
+            <a:normAutofit/>
+          </a:bodyPr>
+          <a:lstStyle>
+            <a:lvl1pPr marL="228600" indent="-228600" algn="l" defTabSz="914400" rtl="0" eaLnBrk="1" latinLnBrk="1" hangingPunct="1">
+              <a:lnSpc>
+                <a:spcPct val="90000"/>
+              </a:lnSpc>
+              <a:spcBef>
+                <a:spcPts val="1000"/>
+              </a:spcBef>
+              <a:buFont typeface="Arial" panose="020B0604020202020204" pitchFamily="34" charset="0"/>
+              <a:buChar char="•"/>
+              <a:defRPr sz="2800" kern="1200">
+                <a:solidFill>
+                  <a:schemeClr val="tx1"/>
+                </a:solidFill>
+                <a:latin typeface="+mn-lt"/>
+                <a:ea typeface="+mn-ea"/>
+                <a:cs typeface="+mn-cs"/>
+              </a:defRPr>
+            </a:lvl1pPr>
+            <a:lvl2pPr marL="685800" indent="-228600" algn="l" defTabSz="914400" rtl="0" eaLnBrk="1" latinLnBrk="1" hangingPunct="1">
+              <a:lnSpc>
+                <a:spcPct val="90000"/>
+              </a:lnSpc>
+              <a:spcBef>
+                <a:spcPts val="500"/>
+              </a:spcBef>
+              <a:buFont typeface="Arial" panose="020B0604020202020204" pitchFamily="34" charset="0"/>
+              <a:buChar char="•"/>
+              <a:defRPr sz="2400" kern="1200">
+                <a:solidFill>
+                  <a:schemeClr val="tx1"/>
+                </a:solidFill>
+                <a:latin typeface="+mn-lt"/>
+                <a:ea typeface="+mn-ea"/>
+                <a:cs typeface="+mn-cs"/>
+              </a:defRPr>
+            </a:lvl2pPr>
+            <a:lvl3pPr marL="1143000" indent="-228600" algn="l" defTabSz="914400" rtl="0" eaLnBrk="1" latinLnBrk="1" hangingPunct="1">
+              <a:lnSpc>
+                <a:spcPct val="90000"/>
+              </a:lnSpc>
+              <a:spcBef>
+                <a:spcPts val="500"/>
+              </a:spcBef>
+              <a:buFont typeface="Arial" panose="020B0604020202020204" pitchFamily="34" charset="0"/>
+              <a:buChar char="•"/>
+              <a:defRPr sz="2000" kern="1200">
+                <a:solidFill>
+                  <a:schemeClr val="tx1"/>
+                </a:solidFill>
+                <a:latin typeface="+mn-lt"/>
+                <a:ea typeface="+mn-ea"/>
+                <a:cs typeface="+mn-cs"/>
+              </a:defRPr>
+            </a:lvl3pPr>
+            <a:lvl4pPr marL="1600200" indent="-228600" algn="l" defTabSz="914400" rtl="0" eaLnBrk="1" latinLnBrk="1" hangingPunct="1">
+              <a:lnSpc>
+                <a:spcPct val="90000"/>
+              </a:lnSpc>
+              <a:spcBef>
+                <a:spcPts val="500"/>
+              </a:spcBef>
+              <a:buFont typeface="Arial" panose="020B0604020202020204" pitchFamily="34" charset="0"/>
+              <a:buChar char="•"/>
+              <a:defRPr sz="1800" kern="1200">
+                <a:solidFill>
+                  <a:schemeClr val="tx1"/>
+                </a:solidFill>
+                <a:latin typeface="+mn-lt"/>
+                <a:ea typeface="+mn-ea"/>
+                <a:cs typeface="+mn-cs"/>
+              </a:defRPr>
+            </a:lvl4pPr>
+            <a:lvl5pPr marL="2057400" indent="-228600" algn="l" defTabSz="914400" rtl="0" eaLnBrk="1" latinLnBrk="1" hangingPunct="1">
+              <a:lnSpc>
+                <a:spcPct val="90000"/>
+              </a:lnSpc>
+              <a:spcBef>
+                <a:spcPts val="500"/>
+              </a:spcBef>
+              <a:buFont typeface="Arial" panose="020B0604020202020204" pitchFamily="34" charset="0"/>
+              <a:buChar char="•"/>
+              <a:defRPr sz="1800" kern="1200">
+                <a:solidFill>
+                  <a:schemeClr val="tx1"/>
+                </a:solidFill>
+                <a:latin typeface="+mn-lt"/>
+                <a:ea typeface="+mn-ea"/>
+                <a:cs typeface="+mn-cs"/>
+              </a:defRPr>
+            </a:lvl5pPr>
+            <a:lvl6pPr marL="2514600" indent="-228600" algn="l" defTabSz="914400" rtl="0" eaLnBrk="1" latinLnBrk="1" hangingPunct="1">
+              <a:lnSpc>
+                <a:spcPct val="90000"/>
+              </a:lnSpc>
+              <a:spcBef>
+                <a:spcPts val="500"/>
+              </a:spcBef>
+              <a:buFont typeface="Arial" panose="020B0604020202020204" pitchFamily="34" charset="0"/>
+              <a:buChar char="•"/>
+              <a:defRPr sz="1800" kern="1200">
+                <a:solidFill>
+                  <a:schemeClr val="tx1"/>
+                </a:solidFill>
+                <a:latin typeface="+mn-lt"/>
+                <a:ea typeface="+mn-ea"/>
+                <a:cs typeface="+mn-cs"/>
+              </a:defRPr>
+            </a:lvl6pPr>
+            <a:lvl7pPr marL="2971800" indent="-228600" algn="l" defTabSz="914400" rtl="0" eaLnBrk="1" latinLnBrk="1" hangingPunct="1">
+              <a:lnSpc>
+                <a:spcPct val="90000"/>
+              </a:lnSpc>
+              <a:spcBef>
+                <a:spcPts val="500"/>
+              </a:spcBef>
+              <a:buFont typeface="Arial" panose="020B0604020202020204" pitchFamily="34" charset="0"/>
+              <a:buChar char="•"/>
+              <a:defRPr sz="1800" kern="1200">
+                <a:solidFill>
+                  <a:schemeClr val="tx1"/>
+                </a:solidFill>
+                <a:latin typeface="+mn-lt"/>
+                <a:ea typeface="+mn-ea"/>
+                <a:cs typeface="+mn-cs"/>
+              </a:defRPr>
+            </a:lvl7pPr>
+            <a:lvl8pPr marL="3429000" indent="-228600" algn="l" defTabSz="914400" rtl="0" eaLnBrk="1" latinLnBrk="1" hangingPunct="1">
+              <a:lnSpc>
+                <a:spcPct val="90000"/>
+              </a:lnSpc>
+              <a:spcBef>
+                <a:spcPts val="500"/>
+              </a:spcBef>
+              <a:buFont typeface="Arial" panose="020B0604020202020204" pitchFamily="34" charset="0"/>
+              <a:buChar char="•"/>
+              <a:defRPr sz="1800" kern="1200">
+                <a:solidFill>
+                  <a:schemeClr val="tx1"/>
+                </a:solidFill>
+                <a:latin typeface="+mn-lt"/>
+                <a:ea typeface="+mn-ea"/>
+                <a:cs typeface="+mn-cs"/>
+              </a:defRPr>
+            </a:lvl8pPr>
+            <a:lvl9pPr marL="3886200" indent="-228600" algn="l" defTabSz="914400" rtl="0" eaLnBrk="1" latinLnBrk="1" hangingPunct="1">
+              <a:lnSpc>
+                <a:spcPct val="90000"/>
+              </a:lnSpc>
+              <a:spcBef>
+                <a:spcPts val="500"/>
+              </a:spcBef>
+              <a:buFont typeface="Arial" panose="020B0604020202020204" pitchFamily="34" charset="0"/>
+              <a:buChar char="•"/>
+              <a:defRPr sz="1800" kern="1200">
+                <a:solidFill>
+                  <a:schemeClr val="tx1"/>
+                </a:solidFill>
+                <a:latin typeface="+mn-lt"/>
+                <a:ea typeface="+mn-ea"/>
+                <a:cs typeface="+mn-cs"/>
+              </a:defRPr>
+            </a:lvl9pPr>
+          </a:lstStyle>
+          <a:p>
+            <a:r>
+              <a:rPr kumimoji="1" lang="en-US" altLang="ko-KR"/>
+              <a:t>Q. </a:t>
+            </a:r>
+            <a:r>
+              <a:rPr kumimoji="1" lang="en" altLang="ko-KR"/>
+              <a:t>HashMap </a:t>
+            </a:r>
+            <a:r>
+              <a:rPr kumimoji="1" lang="ko-KR" altLang="en-US"/>
+              <a:t>동작 방식에 대해서 설명하세요</a:t>
+            </a:r>
+            <a:r>
+              <a:rPr kumimoji="1" lang="en-US" altLang="ko-KR"/>
+              <a:t>.</a:t>
+            </a:r>
+            <a:endParaRPr kumimoji="1" lang="en-US" altLang="ko-KR" dirty="0"/>
+          </a:p>
+        </p:txBody>
+      </p:sp>
+    </p:spTree>
+    <p:extLst>
+      <p:ext uri="{BB962C8B-B14F-4D97-AF65-F5344CB8AC3E}">
+        <p14:creationId xmlns:p14="http://schemas.microsoft.com/office/powerpoint/2010/main" val="4011612806"/>
+      </p:ext>
+    </p:extLst>
+  </p:cSld>
+  <p:clrMapOvr>
+    <a:masterClrMapping/>
+  </p:clrMapOvr>
+</p:sld>
+</file>
+
+<file path=ppt/slides/slide3.xml><?xml version="1.0" encoding="utf-8"?>
+<p:sld xmlns:a="http://schemas.openxmlformats.org/drawingml/2006/main" xmlns:r="http://schemas.openxmlformats.org/officeDocument/2006/relationships" xmlns:p="http://schemas.openxmlformats.org/presentationml/2006/main">
+  <p:cSld>
+    <p:spTree>
+      <p:nvGrpSpPr>
+        <p:cNvPr id="1" name=""/>
+        <p:cNvGrpSpPr/>
+        <p:nvPr/>
+      </p:nvGrpSpPr>
+      <p:grpSpPr>
+        <a:xfrm>
+          <a:off x="0" y="0"/>
+          <a:ext cx="0" cy="0"/>
+          <a:chOff x="0" y="0"/>
+          <a:chExt cx="0" cy="0"/>
+        </a:xfrm>
+      </p:grpSpPr>
+      <p:pic>
+        <p:nvPicPr>
+          <p:cNvPr id="4" name="그림 3">
+            <a:extLst>
+              <a:ext uri="{FF2B5EF4-FFF2-40B4-BE49-F238E27FC236}">
+                <a16:creationId xmlns:a16="http://schemas.microsoft.com/office/drawing/2014/main" id="{6DA11F0E-7F4D-474A-BD1D-4AA579EC220A}"/>
+              </a:ext>
+            </a:extLst>
+          </p:cNvPr>
+          <p:cNvPicPr>
+            <a:picLocks noChangeAspect="1"/>
+          </p:cNvPicPr>
+          <p:nvPr/>
+        </p:nvPicPr>
+        <p:blipFill>
+          <a:blip r:embed="rId2"/>
+          <a:stretch>
+            <a:fillRect/>
+          </a:stretch>
+        </p:blipFill>
+        <p:spPr>
+          <a:xfrm>
+            <a:off x="1079153" y="3429000"/>
+            <a:ext cx="2719759" cy="792726"/>
+          </a:xfrm>
+          <a:prstGeom prst="rect">
+            <a:avLst/>
+          </a:prstGeom>
+        </p:spPr>
+      </p:pic>
+      <p:sp>
+        <p:nvSpPr>
+          <p:cNvPr id="5" name="타원 4">
+            <a:extLst>
+              <a:ext uri="{FF2B5EF4-FFF2-40B4-BE49-F238E27FC236}">
+                <a16:creationId xmlns:a16="http://schemas.microsoft.com/office/drawing/2014/main" id="{923F5081-3288-AF40-923F-F98732AE7DBD}"/>
+              </a:ext>
+            </a:extLst>
+          </p:cNvPr>
+          <p:cNvSpPr/>
+          <p:nvPr/>
+        </p:nvSpPr>
+        <p:spPr>
+          <a:xfrm>
+            <a:off x="1249250" y="3618963"/>
+            <a:ext cx="463639" cy="463639"/>
+          </a:xfrm>
+          <a:prstGeom prst="ellipse">
+            <a:avLst/>
+          </a:prstGeom>
+          <a:solidFill>
+            <a:schemeClr val="accent5">
+              <a:lumMod val="75000"/>
+            </a:schemeClr>
+          </a:solidFill>
+          <a:ln>
+            <a:noFill/>
+          </a:ln>
+        </p:spPr>
+        <p:style>
+          <a:lnRef idx="2">
+            <a:schemeClr val="accent1">
+              <a:shade val="50000"/>
+            </a:schemeClr>
+          </a:lnRef>
+          <a:fillRef idx="1">
+            <a:schemeClr val="accent1"/>
+          </a:fillRef>
+          <a:effectRef idx="0">
+            <a:schemeClr val="accent1"/>
+          </a:effectRef>
+          <a:fontRef idx="minor">
+            <a:schemeClr val="lt1"/>
+          </a:fontRef>
+        </p:style>
+        <p:txBody>
+          <a:bodyPr rtlCol="0" anchor="ctr"/>
+          <a:lstStyle/>
+          <a:p>
+            <a:pPr algn="ctr"/>
+            <a:endParaRPr kumimoji="1" lang="ko-KR" altLang="en-US" dirty="0"/>
+          </a:p>
+        </p:txBody>
+      </p:sp>
+      <p:sp>
+        <p:nvSpPr>
+          <p:cNvPr id="6" name="타원 5">
+            <a:extLst>
+              <a:ext uri="{FF2B5EF4-FFF2-40B4-BE49-F238E27FC236}">
+                <a16:creationId xmlns:a16="http://schemas.microsoft.com/office/drawing/2014/main" id="{76D67736-A677-E34C-ACAF-04B70A44F18F}"/>
+              </a:ext>
+            </a:extLst>
+          </p:cNvPr>
+          <p:cNvSpPr/>
+          <p:nvPr/>
+        </p:nvSpPr>
+        <p:spPr>
+          <a:xfrm>
+            <a:off x="1882986" y="3618963"/>
+            <a:ext cx="463639" cy="463639"/>
+          </a:xfrm>
+          <a:prstGeom prst="ellipse">
+            <a:avLst/>
+          </a:prstGeom>
+          <a:solidFill>
+            <a:schemeClr val="accent5">
+              <a:lumMod val="75000"/>
+            </a:schemeClr>
+          </a:solidFill>
+          <a:ln>
+            <a:noFill/>
+          </a:ln>
+        </p:spPr>
+        <p:style>
+          <a:lnRef idx="2">
+            <a:schemeClr val="accent1">
+              <a:shade val="50000"/>
+            </a:schemeClr>
+          </a:lnRef>
+          <a:fillRef idx="1">
+            <a:schemeClr val="accent1"/>
+          </a:fillRef>
+          <a:effectRef idx="0">
+            <a:schemeClr val="accent1"/>
+          </a:effectRef>
+          <a:fontRef idx="minor">
+            <a:schemeClr val="lt1"/>
+          </a:fontRef>
+        </p:style>
+        <p:txBody>
+          <a:bodyPr rtlCol="0" anchor="ctr"/>
+          <a:lstStyle/>
+          <a:p>
+            <a:pPr algn="ctr"/>
+            <a:endParaRPr kumimoji="1" lang="ko-KR" altLang="en-US" dirty="0"/>
+          </a:p>
+        </p:txBody>
+      </p:sp>
+      <p:cxnSp>
+        <p:nvCxnSpPr>
+          <p:cNvPr id="7" name="직선 화살표 연결선 6">
+            <a:extLst>
+              <a:ext uri="{FF2B5EF4-FFF2-40B4-BE49-F238E27FC236}">
+                <a16:creationId xmlns:a16="http://schemas.microsoft.com/office/drawing/2014/main" id="{018A1FE2-5C07-B745-A2DD-BA62CBEA9D9F}"/>
+              </a:ext>
+            </a:extLst>
+          </p:cNvPr>
+          <p:cNvCxnSpPr>
+            <a:cxnSpLocks/>
+          </p:cNvCxnSpPr>
+          <p:nvPr/>
+        </p:nvCxnSpPr>
+        <p:spPr>
+          <a:xfrm>
+            <a:off x="2758749" y="2859109"/>
+            <a:ext cx="0" cy="672242"/>
+          </a:xfrm>
+          <a:prstGeom prst="straightConnector1">
+            <a:avLst/>
+          </a:prstGeom>
+          <a:ln w="28575">
+            <a:solidFill>
+              <a:schemeClr val="accent2"/>
+            </a:solidFill>
+            <a:tailEnd type="triangle"/>
+          </a:ln>
+        </p:spPr>
+        <p:style>
+          <a:lnRef idx="1">
+            <a:schemeClr val="accent1"/>
+          </a:lnRef>
+          <a:fillRef idx="0">
+            <a:schemeClr val="accent1"/>
+          </a:fillRef>
+          <a:effectRef idx="0">
+            <a:schemeClr val="accent1"/>
+          </a:effectRef>
+          <a:fontRef idx="minor">
+            <a:schemeClr val="tx1"/>
+          </a:fontRef>
+        </p:style>
+      </p:cxnSp>
+      <p:sp>
+        <p:nvSpPr>
+          <p:cNvPr id="9" name="TextBox 8">
+            <a:extLst>
+              <a:ext uri="{FF2B5EF4-FFF2-40B4-BE49-F238E27FC236}">
+                <a16:creationId xmlns:a16="http://schemas.microsoft.com/office/drawing/2014/main" id="{BD4EDFEC-0C71-C247-B434-66A53D834192}"/>
+              </a:ext>
+            </a:extLst>
+          </p:cNvPr>
+          <p:cNvSpPr txBox="1"/>
+          <p:nvPr/>
+        </p:nvSpPr>
+        <p:spPr>
+          <a:xfrm>
+            <a:off x="2459864" y="2382592"/>
+            <a:ext cx="535724" cy="369332"/>
+          </a:xfrm>
+          <a:prstGeom prst="rect">
+            <a:avLst/>
+          </a:prstGeom>
+          <a:noFill/>
+          <a:ln>
+            <a:noFill/>
+          </a:ln>
+        </p:spPr>
+        <p:txBody>
+          <a:bodyPr wrap="none" rtlCol="0">
+            <a:spAutoFit/>
+          </a:bodyPr>
+          <a:lstStyle/>
+          <a:p>
+            <a:r>
+              <a:rPr kumimoji="1" lang="en-US" altLang="ko-KR" dirty="0">
+                <a:solidFill>
+                  <a:schemeClr val="accent2"/>
+                </a:solidFill>
+              </a:rPr>
+              <a:t>put</a:t>
+            </a:r>
+            <a:endParaRPr kumimoji="1" lang="ko-KR" altLang="en-US" dirty="0">
+              <a:solidFill>
+                <a:schemeClr val="accent2"/>
+              </a:solidFill>
+            </a:endParaRPr>
+          </a:p>
+        </p:txBody>
+      </p:sp>
+      <p:sp>
+        <p:nvSpPr>
+          <p:cNvPr id="10" name="타원 9">
+            <a:extLst>
+              <a:ext uri="{FF2B5EF4-FFF2-40B4-BE49-F238E27FC236}">
+                <a16:creationId xmlns:a16="http://schemas.microsoft.com/office/drawing/2014/main" id="{FA587507-055C-3D4C-BE09-F7997C360B70}"/>
+              </a:ext>
+            </a:extLst>
+          </p:cNvPr>
+          <p:cNvSpPr/>
+          <p:nvPr/>
+        </p:nvSpPr>
+        <p:spPr>
+          <a:xfrm>
+            <a:off x="2526929" y="3618962"/>
+            <a:ext cx="463639" cy="463639"/>
+          </a:xfrm>
+          <a:prstGeom prst="ellipse">
+            <a:avLst/>
+          </a:prstGeom>
+          <a:noFill/>
+          <a:ln w="28575">
+            <a:solidFill>
+              <a:schemeClr val="accent2"/>
+            </a:solidFill>
+            <a:prstDash val="dash"/>
+          </a:ln>
+        </p:spPr>
+        <p:style>
+          <a:lnRef idx="2">
+            <a:schemeClr val="accent1">
+              <a:shade val="50000"/>
+            </a:schemeClr>
+          </a:lnRef>
+          <a:fillRef idx="1">
+            <a:schemeClr val="accent1"/>
+          </a:fillRef>
+          <a:effectRef idx="0">
+            <a:schemeClr val="accent1"/>
+          </a:effectRef>
+          <a:fontRef idx="minor">
+            <a:schemeClr val="lt1"/>
+          </a:fontRef>
+        </p:style>
+        <p:txBody>
+          <a:bodyPr rtlCol="0" anchor="ctr"/>
+          <a:lstStyle/>
+          <a:p>
+            <a:pPr algn="ctr"/>
+            <a:endParaRPr kumimoji="1" lang="ko-KR" altLang="en-US" dirty="0">
+              <a:solidFill>
+                <a:schemeClr val="accent2"/>
+              </a:solidFill>
+            </a:endParaRPr>
+          </a:p>
+        </p:txBody>
+      </p:sp>
+      <p:sp>
+        <p:nvSpPr>
+          <p:cNvPr id="11" name="오른쪽 화살표[R] 10">
+            <a:extLst>
+              <a:ext uri="{FF2B5EF4-FFF2-40B4-BE49-F238E27FC236}">
+                <a16:creationId xmlns:a16="http://schemas.microsoft.com/office/drawing/2014/main" id="{DC79CB2E-B15C-7146-8E21-A9CDD4A5806E}"/>
+              </a:ext>
+            </a:extLst>
+          </p:cNvPr>
+          <p:cNvSpPr/>
+          <p:nvPr/>
+        </p:nvSpPr>
+        <p:spPr>
+          <a:xfrm>
+            <a:off x="4612952" y="3531351"/>
+            <a:ext cx="656823" cy="602764"/>
+          </a:xfrm>
+          <a:prstGeom prst="rightArrow">
+            <a:avLst/>
+          </a:prstGeom>
+        </p:spPr>
+        <p:style>
+          <a:lnRef idx="2">
+            <a:schemeClr val="accent1">
+              <a:shade val="50000"/>
+            </a:schemeClr>
+          </a:lnRef>
+          <a:fillRef idx="1">
+            <a:schemeClr val="accent1"/>
+          </a:fillRef>
+          <a:effectRef idx="0">
+            <a:schemeClr val="accent1"/>
+          </a:effectRef>
+          <a:fontRef idx="minor">
+            <a:schemeClr val="lt1"/>
+          </a:fontRef>
+        </p:style>
+        <p:txBody>
+          <a:bodyPr rtlCol="0" anchor="ctr"/>
+          <a:lstStyle/>
+          <a:p>
+            <a:pPr algn="ctr"/>
+            <a:endParaRPr kumimoji="1" lang="ko-KR" altLang="en-US" dirty="0"/>
+          </a:p>
+        </p:txBody>
+      </p:sp>
+      <p:sp>
+        <p:nvSpPr>
+          <p:cNvPr id="13" name="타원 12">
+            <a:extLst>
+              <a:ext uri="{FF2B5EF4-FFF2-40B4-BE49-F238E27FC236}">
+                <a16:creationId xmlns:a16="http://schemas.microsoft.com/office/drawing/2014/main" id="{17C8653C-50CA-AF4B-8FC2-E4C341CA32AD}"/>
+              </a:ext>
+            </a:extLst>
+          </p:cNvPr>
+          <p:cNvSpPr/>
+          <p:nvPr/>
+        </p:nvSpPr>
+        <p:spPr>
+          <a:xfrm>
+            <a:off x="5871273" y="3606083"/>
+            <a:ext cx="463639" cy="463639"/>
+          </a:xfrm>
+          <a:prstGeom prst="ellipse">
+            <a:avLst/>
+          </a:prstGeom>
+          <a:solidFill>
+            <a:schemeClr val="accent5">
+              <a:lumMod val="75000"/>
+            </a:schemeClr>
+          </a:solidFill>
+          <a:ln>
+            <a:noFill/>
+          </a:ln>
+        </p:spPr>
+        <p:style>
+          <a:lnRef idx="2">
+            <a:schemeClr val="accent1">
+              <a:shade val="50000"/>
+            </a:schemeClr>
+          </a:lnRef>
+          <a:fillRef idx="1">
+            <a:schemeClr val="accent1"/>
+          </a:fillRef>
+          <a:effectRef idx="0">
+            <a:schemeClr val="accent1"/>
+          </a:effectRef>
+          <a:fontRef idx="minor">
+            <a:schemeClr val="lt1"/>
+          </a:fontRef>
+        </p:style>
+        <p:txBody>
+          <a:bodyPr rtlCol="0" anchor="ctr"/>
+          <a:lstStyle/>
+          <a:p>
+            <a:pPr algn="ctr"/>
+            <a:endParaRPr kumimoji="1" lang="ko-KR" altLang="en-US" dirty="0"/>
+          </a:p>
+        </p:txBody>
+      </p:sp>
+      <p:sp>
+        <p:nvSpPr>
+          <p:cNvPr id="14" name="타원 13">
+            <a:extLst>
+              <a:ext uri="{FF2B5EF4-FFF2-40B4-BE49-F238E27FC236}">
+                <a16:creationId xmlns:a16="http://schemas.microsoft.com/office/drawing/2014/main" id="{17EACA15-DE7D-BF49-8D3A-DA11390F3407}"/>
+              </a:ext>
+            </a:extLst>
+          </p:cNvPr>
+          <p:cNvSpPr/>
+          <p:nvPr/>
+        </p:nvSpPr>
+        <p:spPr>
+          <a:xfrm>
+            <a:off x="6569404" y="3606083"/>
+            <a:ext cx="463639" cy="463639"/>
+          </a:xfrm>
+          <a:prstGeom prst="ellipse">
+            <a:avLst/>
+          </a:prstGeom>
+          <a:solidFill>
+            <a:schemeClr val="accent5">
+              <a:lumMod val="75000"/>
+            </a:schemeClr>
+          </a:solidFill>
+          <a:ln>
+            <a:noFill/>
+          </a:ln>
+        </p:spPr>
+        <p:style>
+          <a:lnRef idx="2">
+            <a:schemeClr val="accent1">
+              <a:shade val="50000"/>
+            </a:schemeClr>
+          </a:lnRef>
+          <a:fillRef idx="1">
+            <a:schemeClr val="accent1"/>
+          </a:fillRef>
+          <a:effectRef idx="0">
+            <a:schemeClr val="accent1"/>
+          </a:effectRef>
+          <a:fontRef idx="minor">
+            <a:schemeClr val="lt1"/>
+          </a:fontRef>
+        </p:style>
+        <p:txBody>
+          <a:bodyPr rtlCol="0" anchor="ctr"/>
+          <a:lstStyle/>
+          <a:p>
+            <a:pPr algn="ctr"/>
+            <a:endParaRPr kumimoji="1" lang="ko-KR" altLang="en-US" dirty="0"/>
+          </a:p>
+        </p:txBody>
+      </p:sp>
+      <p:sp>
+        <p:nvSpPr>
+          <p:cNvPr id="15" name="타원 14">
+            <a:extLst>
+              <a:ext uri="{FF2B5EF4-FFF2-40B4-BE49-F238E27FC236}">
+                <a16:creationId xmlns:a16="http://schemas.microsoft.com/office/drawing/2014/main" id="{3F3C8CDA-99D2-3B49-A798-A00A093A4A25}"/>
+              </a:ext>
+            </a:extLst>
+          </p:cNvPr>
+          <p:cNvSpPr/>
+          <p:nvPr/>
+        </p:nvSpPr>
+        <p:spPr>
+          <a:xfrm>
+            <a:off x="7303500" y="3618961"/>
+            <a:ext cx="463639" cy="463639"/>
+          </a:xfrm>
+          <a:prstGeom prst="ellipse">
+            <a:avLst/>
+          </a:prstGeom>
+          <a:solidFill>
+            <a:schemeClr val="accent5">
+              <a:lumMod val="75000"/>
+            </a:schemeClr>
+          </a:solidFill>
+          <a:ln>
+            <a:noFill/>
+          </a:ln>
+        </p:spPr>
+        <p:style>
+          <a:lnRef idx="2">
+            <a:schemeClr val="accent1">
+              <a:shade val="50000"/>
+            </a:schemeClr>
+          </a:lnRef>
+          <a:fillRef idx="1">
+            <a:schemeClr val="accent1"/>
+          </a:fillRef>
+          <a:effectRef idx="0">
+            <a:schemeClr val="accent1"/>
+          </a:effectRef>
+          <a:fontRef idx="minor">
+            <a:schemeClr val="lt1"/>
+          </a:fontRef>
+        </p:style>
+        <p:txBody>
+          <a:bodyPr rtlCol="0" anchor="ctr"/>
+          <a:lstStyle/>
+          <a:p>
+            <a:pPr algn="ctr"/>
+            <a:endParaRPr kumimoji="1" lang="ko-KR" altLang="en-US" dirty="0"/>
+          </a:p>
+        </p:txBody>
+      </p:sp>
+      <p:sp>
+        <p:nvSpPr>
+          <p:cNvPr id="20" name="모서리가 둥근 직사각형 19">
+            <a:extLst>
+              <a:ext uri="{FF2B5EF4-FFF2-40B4-BE49-F238E27FC236}">
+                <a16:creationId xmlns:a16="http://schemas.microsoft.com/office/drawing/2014/main" id="{27BF6821-C920-E64D-BE1E-D5126E444177}"/>
+              </a:ext>
+            </a:extLst>
+          </p:cNvPr>
+          <p:cNvSpPr/>
+          <p:nvPr/>
+        </p:nvSpPr>
+        <p:spPr>
+          <a:xfrm>
+            <a:off x="5729173" y="3534553"/>
+            <a:ext cx="5745893" cy="599562"/>
+          </a:xfrm>
+          <a:prstGeom prst="roundRect">
+            <a:avLst/>
+          </a:prstGeom>
+          <a:noFill/>
+        </p:spPr>
+        <p:style>
+          <a:lnRef idx="2">
+            <a:schemeClr val="accent1">
+              <a:shade val="50000"/>
+            </a:schemeClr>
+          </a:lnRef>
+          <a:fillRef idx="1">
+            <a:schemeClr val="accent1"/>
+          </a:fillRef>
+          <a:effectRef idx="0">
+            <a:schemeClr val="accent1"/>
+          </a:effectRef>
+          <a:fontRef idx="minor">
+            <a:schemeClr val="lt1"/>
+          </a:fontRef>
+        </p:style>
+        <p:txBody>
+          <a:bodyPr rtlCol="0" anchor="ctr"/>
+          <a:lstStyle/>
+          <a:p>
+            <a:pPr algn="ctr"/>
+            <a:endParaRPr kumimoji="1" lang="ko-KR" altLang="en-US" dirty="0"/>
+          </a:p>
+        </p:txBody>
+      </p:sp>
+      <p:cxnSp>
+        <p:nvCxnSpPr>
+          <p:cNvPr id="21" name="직선 연결선[R] 20">
+            <a:extLst>
+              <a:ext uri="{FF2B5EF4-FFF2-40B4-BE49-F238E27FC236}">
+                <a16:creationId xmlns:a16="http://schemas.microsoft.com/office/drawing/2014/main" id="{AAE12DDA-10AA-F142-9699-F287F7B14157}"/>
+              </a:ext>
+            </a:extLst>
+          </p:cNvPr>
+          <p:cNvCxnSpPr>
+            <a:cxnSpLocks/>
+            <a:stCxn id="20" idx="0"/>
+            <a:endCxn id="20" idx="2"/>
+          </p:cNvCxnSpPr>
+          <p:nvPr/>
+        </p:nvCxnSpPr>
+        <p:spPr>
+          <a:xfrm>
+            <a:off x="8602120" y="3534553"/>
+            <a:ext cx="0" cy="599562"/>
+          </a:xfrm>
+          <a:prstGeom prst="line">
+            <a:avLst/>
+          </a:prstGeom>
+        </p:spPr>
+        <p:style>
+          <a:lnRef idx="1">
+            <a:schemeClr val="accent1"/>
+          </a:lnRef>
+          <a:fillRef idx="0">
+            <a:schemeClr val="accent1"/>
+          </a:fillRef>
+          <a:effectRef idx="0">
+            <a:schemeClr val="accent1"/>
+          </a:effectRef>
+          <a:fontRef idx="minor">
+            <a:schemeClr val="tx1"/>
+          </a:fontRef>
+        </p:style>
+      </p:cxnSp>
+      <p:cxnSp>
+        <p:nvCxnSpPr>
+          <p:cNvPr id="27" name="직선 연결선[R] 26">
+            <a:extLst>
+              <a:ext uri="{FF2B5EF4-FFF2-40B4-BE49-F238E27FC236}">
+                <a16:creationId xmlns:a16="http://schemas.microsoft.com/office/drawing/2014/main" id="{56F459E0-4D39-6C4C-BFE6-BA9FD9C5F144}"/>
+              </a:ext>
+            </a:extLst>
+          </p:cNvPr>
+          <p:cNvCxnSpPr>
+            <a:cxnSpLocks/>
+          </p:cNvCxnSpPr>
+          <p:nvPr/>
+        </p:nvCxnSpPr>
+        <p:spPr>
+          <a:xfrm>
+            <a:off x="7187589" y="3534553"/>
+            <a:ext cx="0" cy="599562"/>
+          </a:xfrm>
+          <a:prstGeom prst="line">
+            <a:avLst/>
+          </a:prstGeom>
+        </p:spPr>
+        <p:style>
+          <a:lnRef idx="1">
+            <a:schemeClr val="accent1"/>
+          </a:lnRef>
+          <a:fillRef idx="0">
+            <a:schemeClr val="accent1"/>
+          </a:fillRef>
+          <a:effectRef idx="0">
+            <a:schemeClr val="accent1"/>
+          </a:effectRef>
+          <a:fontRef idx="minor">
+            <a:schemeClr val="tx1"/>
+          </a:fontRef>
+        </p:style>
+      </p:cxnSp>
+      <p:cxnSp>
+        <p:nvCxnSpPr>
+          <p:cNvPr id="28" name="직선 연결선[R] 27">
+            <a:extLst>
+              <a:ext uri="{FF2B5EF4-FFF2-40B4-BE49-F238E27FC236}">
+                <a16:creationId xmlns:a16="http://schemas.microsoft.com/office/drawing/2014/main" id="{643023CF-A82F-A04D-A495-BE25C93E4864}"/>
+              </a:ext>
+            </a:extLst>
+          </p:cNvPr>
+          <p:cNvCxnSpPr>
+            <a:cxnSpLocks/>
+          </p:cNvCxnSpPr>
+          <p:nvPr/>
+        </p:nvCxnSpPr>
+        <p:spPr>
+          <a:xfrm>
+            <a:off x="10016650" y="3534553"/>
+            <a:ext cx="0" cy="599562"/>
+          </a:xfrm>
+          <a:prstGeom prst="line">
+            <a:avLst/>
+          </a:prstGeom>
+        </p:spPr>
+        <p:style>
+          <a:lnRef idx="1">
+            <a:schemeClr val="accent1"/>
+          </a:lnRef>
+          <a:fillRef idx="0">
+            <a:schemeClr val="accent1"/>
+          </a:fillRef>
+          <a:effectRef idx="0">
+            <a:schemeClr val="accent1"/>
+          </a:effectRef>
+          <a:fontRef idx="minor">
+            <a:schemeClr val="tx1"/>
+          </a:fontRef>
+        </p:style>
+      </p:cxnSp>
+      <p:cxnSp>
+        <p:nvCxnSpPr>
+          <p:cNvPr id="29" name="직선 연결선[R] 28">
+            <a:extLst>
+              <a:ext uri="{FF2B5EF4-FFF2-40B4-BE49-F238E27FC236}">
+                <a16:creationId xmlns:a16="http://schemas.microsoft.com/office/drawing/2014/main" id="{ABA90930-7250-6E45-B298-8E7B4BC38D8A}"/>
+              </a:ext>
+            </a:extLst>
+          </p:cNvPr>
+          <p:cNvCxnSpPr>
+            <a:cxnSpLocks/>
+          </p:cNvCxnSpPr>
+          <p:nvPr/>
+        </p:nvCxnSpPr>
+        <p:spPr>
+          <a:xfrm>
+            <a:off x="10724987" y="3534553"/>
+            <a:ext cx="0" cy="599562"/>
+          </a:xfrm>
+          <a:prstGeom prst="line">
+            <a:avLst/>
+          </a:prstGeom>
+        </p:spPr>
+        <p:style>
+          <a:lnRef idx="1">
+            <a:schemeClr val="accent1"/>
+          </a:lnRef>
+          <a:fillRef idx="0">
+            <a:schemeClr val="accent1"/>
+          </a:fillRef>
+          <a:effectRef idx="0">
+            <a:schemeClr val="accent1"/>
+          </a:effectRef>
+          <a:fontRef idx="minor">
+            <a:schemeClr val="tx1"/>
+          </a:fontRef>
+        </p:style>
+      </p:cxnSp>
+      <p:cxnSp>
+        <p:nvCxnSpPr>
+          <p:cNvPr id="30" name="직선 연결선[R] 29">
+            <a:extLst>
+              <a:ext uri="{FF2B5EF4-FFF2-40B4-BE49-F238E27FC236}">
+                <a16:creationId xmlns:a16="http://schemas.microsoft.com/office/drawing/2014/main" id="{9495049B-58FB-DF42-B2AC-02E69A351B0B}"/>
+              </a:ext>
+            </a:extLst>
+          </p:cNvPr>
+          <p:cNvCxnSpPr>
+            <a:cxnSpLocks/>
+          </p:cNvCxnSpPr>
+          <p:nvPr/>
+        </p:nvCxnSpPr>
+        <p:spPr>
+          <a:xfrm>
+            <a:off x="9308312" y="3534553"/>
+            <a:ext cx="0" cy="599562"/>
+          </a:xfrm>
+          <a:prstGeom prst="line">
+            <a:avLst/>
+          </a:prstGeom>
+        </p:spPr>
+        <p:style>
+          <a:lnRef idx="1">
+            <a:schemeClr val="accent1"/>
+          </a:lnRef>
+          <a:fillRef idx="0">
+            <a:schemeClr val="accent1"/>
+          </a:fillRef>
+          <a:effectRef idx="0">
+            <a:schemeClr val="accent1"/>
+          </a:effectRef>
+          <a:fontRef idx="minor">
+            <a:schemeClr val="tx1"/>
+          </a:fontRef>
+        </p:style>
+      </p:cxnSp>
+      <p:cxnSp>
+        <p:nvCxnSpPr>
+          <p:cNvPr id="31" name="직선 연결선[R] 30">
+            <a:extLst>
+              <a:ext uri="{FF2B5EF4-FFF2-40B4-BE49-F238E27FC236}">
+                <a16:creationId xmlns:a16="http://schemas.microsoft.com/office/drawing/2014/main" id="{47B48FB5-F702-074F-BC4F-FBDDA14910DC}"/>
+              </a:ext>
+            </a:extLst>
+          </p:cNvPr>
+          <p:cNvCxnSpPr>
+            <a:cxnSpLocks/>
+          </p:cNvCxnSpPr>
+          <p:nvPr/>
+        </p:nvCxnSpPr>
+        <p:spPr>
+          <a:xfrm>
+            <a:off x="7904514" y="3534553"/>
+            <a:ext cx="0" cy="599562"/>
+          </a:xfrm>
+          <a:prstGeom prst="line">
+            <a:avLst/>
+          </a:prstGeom>
+        </p:spPr>
+        <p:style>
+          <a:lnRef idx="1">
+            <a:schemeClr val="accent1"/>
+          </a:lnRef>
+          <a:fillRef idx="0">
+            <a:schemeClr val="accent1"/>
+          </a:fillRef>
+          <a:effectRef idx="0">
+            <a:schemeClr val="accent1"/>
+          </a:effectRef>
+          <a:fontRef idx="minor">
+            <a:schemeClr val="tx1"/>
+          </a:fontRef>
+        </p:style>
+      </p:cxnSp>
+      <p:cxnSp>
+        <p:nvCxnSpPr>
+          <p:cNvPr id="32" name="직선 연결선[R] 31">
+            <a:extLst>
+              <a:ext uri="{FF2B5EF4-FFF2-40B4-BE49-F238E27FC236}">
+                <a16:creationId xmlns:a16="http://schemas.microsoft.com/office/drawing/2014/main" id="{23BA2D4E-B1B9-5046-A1B0-60F956F87255}"/>
+              </a:ext>
+            </a:extLst>
+          </p:cNvPr>
+          <p:cNvCxnSpPr>
+            <a:cxnSpLocks/>
+          </p:cNvCxnSpPr>
+          <p:nvPr/>
+        </p:nvCxnSpPr>
+        <p:spPr>
+          <a:xfrm>
+            <a:off x="6449202" y="3521679"/>
+            <a:ext cx="0" cy="599562"/>
+          </a:xfrm>
+          <a:prstGeom prst="line">
+            <a:avLst/>
+          </a:prstGeom>
+        </p:spPr>
+        <p:style>
+          <a:lnRef idx="1">
+            <a:schemeClr val="accent1"/>
+          </a:lnRef>
+          <a:fillRef idx="0">
+            <a:schemeClr val="accent1"/>
+          </a:fillRef>
+          <a:effectRef idx="0">
+            <a:schemeClr val="accent1"/>
+          </a:effectRef>
+          <a:fontRef idx="minor">
+            <a:schemeClr val="tx1"/>
+          </a:fontRef>
+        </p:style>
+      </p:cxnSp>
+      <p:sp>
+        <p:nvSpPr>
+          <p:cNvPr id="37" name="왼쪽 대괄호[L] 36">
+            <a:extLst>
+              <a:ext uri="{FF2B5EF4-FFF2-40B4-BE49-F238E27FC236}">
+                <a16:creationId xmlns:a16="http://schemas.microsoft.com/office/drawing/2014/main" id="{AAEA78EC-7D2E-424E-BE91-BD7FBB1586D9}"/>
+              </a:ext>
+            </a:extLst>
+          </p:cNvPr>
+          <p:cNvSpPr/>
+          <p:nvPr/>
+        </p:nvSpPr>
+        <p:spPr>
+          <a:xfrm rot="16200000">
+            <a:off x="2040492" y="3393323"/>
+            <a:ext cx="148627" cy="1822361"/>
+          </a:xfrm>
+          <a:prstGeom prst="leftBracket">
+            <a:avLst/>
+          </a:prstGeom>
+          <a:ln w="28575"/>
+        </p:spPr>
+        <p:style>
+          <a:lnRef idx="1">
+            <a:schemeClr val="accent2"/>
+          </a:lnRef>
+          <a:fillRef idx="0">
+            <a:schemeClr val="accent2"/>
+          </a:fillRef>
+          <a:effectRef idx="0">
+            <a:schemeClr val="accent2"/>
+          </a:effectRef>
+          <a:fontRef idx="minor">
+            <a:schemeClr val="tx1"/>
+          </a:fontRef>
+        </p:style>
+        <p:txBody>
+          <a:bodyPr rtlCol="0" anchor="ctr"/>
+          <a:lstStyle/>
+          <a:p>
+            <a:pPr algn="ctr"/>
+            <a:endParaRPr kumimoji="1" lang="ko-KR" altLang="en-US" dirty="0"/>
+          </a:p>
+        </p:txBody>
+      </p:sp>
+      <p:sp>
+        <p:nvSpPr>
+          <p:cNvPr id="38" name="TextBox 37">
+            <a:extLst>
+              <a:ext uri="{FF2B5EF4-FFF2-40B4-BE49-F238E27FC236}">
+                <a16:creationId xmlns:a16="http://schemas.microsoft.com/office/drawing/2014/main" id="{302F1CED-10FC-2341-989A-C2AA88A9BA2A}"/>
+              </a:ext>
+            </a:extLst>
+          </p:cNvPr>
+          <p:cNvSpPr txBox="1"/>
+          <p:nvPr/>
+        </p:nvSpPr>
+        <p:spPr>
+          <a:xfrm>
+            <a:off x="1237831" y="4563953"/>
+            <a:ext cx="2979790" cy="1700787"/>
+          </a:xfrm>
+          <a:prstGeom prst="rect">
+            <a:avLst/>
+          </a:prstGeom>
+          <a:noFill/>
+        </p:spPr>
+        <p:txBody>
+          <a:bodyPr wrap="none" rtlCol="0">
+            <a:spAutoFit/>
+          </a:bodyPr>
+          <a:lstStyle/>
+          <a:p>
+            <a:pPr>
+              <a:lnSpc>
+                <a:spcPct val="150000"/>
+              </a:lnSpc>
+            </a:pPr>
+            <a:r>
+              <a:rPr kumimoji="1" lang="en-US" altLang="ko-KR" dirty="0">
+                <a:solidFill>
+                  <a:schemeClr val="accent2"/>
+                </a:solidFill>
+              </a:rPr>
+              <a:t>capacity</a:t>
+            </a:r>
+          </a:p>
+          <a:p>
+            <a:pPr>
+              <a:lnSpc>
+                <a:spcPct val="150000"/>
+              </a:lnSpc>
+            </a:pPr>
+            <a:r>
+              <a:rPr kumimoji="1" lang="en-US" altLang="ko-KR" dirty="0">
+                <a:solidFill>
+                  <a:schemeClr val="accent2"/>
+                </a:solidFill>
+              </a:rPr>
+              <a:t>= bucket</a:t>
+            </a:r>
+            <a:r>
+              <a:rPr kumimoji="1" lang="ko-KR" altLang="en-US" dirty="0">
+                <a:solidFill>
+                  <a:schemeClr val="accent2"/>
+                </a:solidFill>
+              </a:rPr>
+              <a:t>개수 * </a:t>
+            </a:r>
+            <a:r>
+              <a:rPr kumimoji="1" lang="en-US" altLang="ko-KR" dirty="0">
+                <a:solidFill>
+                  <a:schemeClr val="accent2"/>
+                </a:solidFill>
+              </a:rPr>
+              <a:t>load factor</a:t>
+            </a:r>
+          </a:p>
+          <a:p>
+            <a:pPr>
+              <a:lnSpc>
+                <a:spcPct val="150000"/>
+              </a:lnSpc>
+            </a:pPr>
+            <a:r>
+              <a:rPr kumimoji="1" lang="en-US" altLang="ko-KR" dirty="0">
+                <a:solidFill>
+                  <a:schemeClr val="accent2"/>
+                </a:solidFill>
+              </a:rPr>
+              <a:t>= 4 * 0.75</a:t>
+            </a:r>
+          </a:p>
+          <a:p>
+            <a:pPr>
+              <a:lnSpc>
+                <a:spcPct val="150000"/>
+              </a:lnSpc>
+            </a:pPr>
+            <a:r>
+              <a:rPr kumimoji="1" lang="en-US" altLang="ko-KR" dirty="0">
+                <a:solidFill>
+                  <a:schemeClr val="accent2"/>
+                </a:solidFill>
+              </a:rPr>
+              <a:t>= 3</a:t>
+            </a:r>
+            <a:endParaRPr kumimoji="1" lang="ko-KR" altLang="en-US" dirty="0">
+              <a:solidFill>
+                <a:schemeClr val="accent2"/>
+              </a:solidFill>
+            </a:endParaRPr>
+          </a:p>
+        </p:txBody>
+      </p:sp>
+      <p:sp>
+        <p:nvSpPr>
+          <p:cNvPr id="39" name="TextBox 38">
+            <a:extLst>
+              <a:ext uri="{FF2B5EF4-FFF2-40B4-BE49-F238E27FC236}">
+                <a16:creationId xmlns:a16="http://schemas.microsoft.com/office/drawing/2014/main" id="{94B467EC-1719-034F-A752-7AAC75C80A0B}"/>
+              </a:ext>
+            </a:extLst>
+          </p:cNvPr>
+          <p:cNvSpPr txBox="1"/>
+          <p:nvPr/>
+        </p:nvSpPr>
+        <p:spPr>
+          <a:xfrm>
+            <a:off x="8486207" y="4563953"/>
+            <a:ext cx="3204660" cy="454292"/>
+          </a:xfrm>
+          <a:prstGeom prst="rect">
+            <a:avLst/>
+          </a:prstGeom>
+          <a:noFill/>
+        </p:spPr>
+        <p:txBody>
+          <a:bodyPr wrap="none" rtlCol="0">
+            <a:spAutoFit/>
+          </a:bodyPr>
+          <a:lstStyle/>
+          <a:p>
+            <a:pPr>
+              <a:lnSpc>
+                <a:spcPct val="150000"/>
+              </a:lnSpc>
+            </a:pPr>
+            <a:r>
+              <a:rPr kumimoji="1" lang="en-US" altLang="ko-KR" dirty="0">
+                <a:solidFill>
+                  <a:schemeClr val="accent2"/>
+                </a:solidFill>
+              </a:rPr>
+              <a:t>Map</a:t>
+            </a:r>
+            <a:r>
+              <a:rPr kumimoji="1" lang="ko-KR" altLang="en-US" dirty="0">
+                <a:solidFill>
+                  <a:schemeClr val="accent2"/>
+                </a:solidFill>
+              </a:rPr>
+              <a:t>의 공간을 </a:t>
+            </a:r>
+            <a:r>
+              <a:rPr kumimoji="1" lang="en-US" altLang="ko-KR" dirty="0">
+                <a:solidFill>
+                  <a:schemeClr val="accent2"/>
+                </a:solidFill>
+              </a:rPr>
+              <a:t>2</a:t>
+            </a:r>
+            <a:r>
+              <a:rPr kumimoji="1" lang="ko-KR" altLang="en-US" dirty="0">
+                <a:solidFill>
+                  <a:schemeClr val="accent2"/>
+                </a:solidFill>
+              </a:rPr>
+              <a:t>배로 </a:t>
+            </a:r>
+            <a:r>
+              <a:rPr kumimoji="1" lang="en-US" altLang="ko-KR" dirty="0">
+                <a:solidFill>
+                  <a:schemeClr val="accent2"/>
+                </a:solidFill>
+              </a:rPr>
+              <a:t>resizing</a:t>
+            </a:r>
+            <a:endParaRPr kumimoji="1" lang="ko-KR" altLang="en-US" dirty="0">
+              <a:solidFill>
+                <a:schemeClr val="accent2"/>
+              </a:solidFill>
+            </a:endParaRPr>
+          </a:p>
+        </p:txBody>
+      </p:sp>
+      <p:sp>
+        <p:nvSpPr>
+          <p:cNvPr id="40" name="왼쪽 대괄호[L] 39">
+            <a:extLst>
+              <a:ext uri="{FF2B5EF4-FFF2-40B4-BE49-F238E27FC236}">
+                <a16:creationId xmlns:a16="http://schemas.microsoft.com/office/drawing/2014/main" id="{05AEC9A7-C140-BE4E-A107-C6C56D91F431}"/>
+              </a:ext>
+            </a:extLst>
+          </p:cNvPr>
+          <p:cNvSpPr/>
+          <p:nvPr/>
+        </p:nvSpPr>
+        <p:spPr>
+          <a:xfrm rot="16200000">
+            <a:off x="9964274" y="2942347"/>
+            <a:ext cx="148627" cy="2872938"/>
+          </a:xfrm>
+          <a:prstGeom prst="leftBracket">
+            <a:avLst/>
+          </a:prstGeom>
+          <a:ln w="28575"/>
+        </p:spPr>
+        <p:style>
+          <a:lnRef idx="1">
+            <a:schemeClr val="accent2"/>
+          </a:lnRef>
+          <a:fillRef idx="0">
+            <a:schemeClr val="accent2"/>
+          </a:fillRef>
+          <a:effectRef idx="0">
+            <a:schemeClr val="accent2"/>
+          </a:effectRef>
+          <a:fontRef idx="minor">
+            <a:schemeClr val="tx1"/>
+          </a:fontRef>
+        </p:style>
+        <p:txBody>
+          <a:bodyPr rtlCol="0" anchor="ctr"/>
+          <a:lstStyle/>
+          <a:p>
+            <a:pPr algn="ctr"/>
+            <a:endParaRPr kumimoji="1" lang="ko-KR" altLang="en-US" dirty="0"/>
+          </a:p>
+        </p:txBody>
+      </p:sp>
+      <p:sp>
+        <p:nvSpPr>
+          <p:cNvPr id="24" name="부제목 2">
+            <a:extLst>
+              <a:ext uri="{FF2B5EF4-FFF2-40B4-BE49-F238E27FC236}">
+                <a16:creationId xmlns:a16="http://schemas.microsoft.com/office/drawing/2014/main" id="{6B55F71F-D05D-2A42-ABF4-2D3AB816D832}"/>
+              </a:ext>
+            </a:extLst>
+          </p:cNvPr>
+          <p:cNvSpPr txBox="1">
+            <a:spLocks/>
+          </p:cNvSpPr>
+          <p:nvPr/>
+        </p:nvSpPr>
+        <p:spPr>
+          <a:xfrm>
+            <a:off x="73573" y="123114"/>
+            <a:ext cx="9144000" cy="507507"/>
+          </a:xfrm>
+          <a:prstGeom prst="rect">
+            <a:avLst/>
+          </a:prstGeom>
+        </p:spPr>
+        <p:txBody>
+          <a:bodyPr vert="horz" lIns="91440" tIns="45720" rIns="91440" bIns="45720" rtlCol="0">
+            <a:normAutofit/>
+          </a:bodyPr>
+          <a:lstStyle>
+            <a:lvl1pPr marL="228600" indent="-228600" algn="l" defTabSz="914400" rtl="0" eaLnBrk="1" latinLnBrk="1" hangingPunct="1">
+              <a:lnSpc>
+                <a:spcPct val="90000"/>
+              </a:lnSpc>
+              <a:spcBef>
+                <a:spcPts val="1000"/>
+              </a:spcBef>
+              <a:buFont typeface="Arial" panose="020B0604020202020204" pitchFamily="34" charset="0"/>
+              <a:buChar char="•"/>
+              <a:defRPr sz="2800" kern="1200">
+                <a:solidFill>
+                  <a:schemeClr val="tx1"/>
+                </a:solidFill>
+                <a:latin typeface="+mn-lt"/>
+                <a:ea typeface="+mn-ea"/>
+                <a:cs typeface="+mn-cs"/>
+              </a:defRPr>
+            </a:lvl1pPr>
+            <a:lvl2pPr marL="685800" indent="-228600" algn="l" defTabSz="914400" rtl="0" eaLnBrk="1" latinLnBrk="1" hangingPunct="1">
+              <a:lnSpc>
+                <a:spcPct val="90000"/>
+              </a:lnSpc>
+              <a:spcBef>
+                <a:spcPts val="500"/>
+              </a:spcBef>
+              <a:buFont typeface="Arial" panose="020B0604020202020204" pitchFamily="34" charset="0"/>
+              <a:buChar char="•"/>
+              <a:defRPr sz="2400" kern="1200">
+                <a:solidFill>
+                  <a:schemeClr val="tx1"/>
+                </a:solidFill>
+                <a:latin typeface="+mn-lt"/>
+                <a:ea typeface="+mn-ea"/>
+                <a:cs typeface="+mn-cs"/>
+              </a:defRPr>
+            </a:lvl2pPr>
+            <a:lvl3pPr marL="1143000" indent="-228600" algn="l" defTabSz="914400" rtl="0" eaLnBrk="1" latinLnBrk="1" hangingPunct="1">
+              <a:lnSpc>
+                <a:spcPct val="90000"/>
+              </a:lnSpc>
+              <a:spcBef>
+                <a:spcPts val="500"/>
+              </a:spcBef>
+              <a:buFont typeface="Arial" panose="020B0604020202020204" pitchFamily="34" charset="0"/>
+              <a:buChar char="•"/>
+              <a:defRPr sz="2000" kern="1200">
+                <a:solidFill>
+                  <a:schemeClr val="tx1"/>
+                </a:solidFill>
+                <a:latin typeface="+mn-lt"/>
+                <a:ea typeface="+mn-ea"/>
+                <a:cs typeface="+mn-cs"/>
+              </a:defRPr>
+            </a:lvl3pPr>
+            <a:lvl4pPr marL="1600200" indent="-228600" algn="l" defTabSz="914400" rtl="0" eaLnBrk="1" latinLnBrk="1" hangingPunct="1">
+              <a:lnSpc>
+                <a:spcPct val="90000"/>
+              </a:lnSpc>
+              <a:spcBef>
+                <a:spcPts val="500"/>
+              </a:spcBef>
+              <a:buFont typeface="Arial" panose="020B0604020202020204" pitchFamily="34" charset="0"/>
+              <a:buChar char="•"/>
+              <a:defRPr sz="1800" kern="1200">
+                <a:solidFill>
+                  <a:schemeClr val="tx1"/>
+                </a:solidFill>
+                <a:latin typeface="+mn-lt"/>
+                <a:ea typeface="+mn-ea"/>
+                <a:cs typeface="+mn-cs"/>
+              </a:defRPr>
+            </a:lvl4pPr>
+            <a:lvl5pPr marL="2057400" indent="-228600" algn="l" defTabSz="914400" rtl="0" eaLnBrk="1" latinLnBrk="1" hangingPunct="1">
+              <a:lnSpc>
+                <a:spcPct val="90000"/>
+              </a:lnSpc>
+              <a:spcBef>
+                <a:spcPts val="500"/>
+              </a:spcBef>
+              <a:buFont typeface="Arial" panose="020B0604020202020204" pitchFamily="34" charset="0"/>
+              <a:buChar char="•"/>
+              <a:defRPr sz="1800" kern="1200">
+                <a:solidFill>
+                  <a:schemeClr val="tx1"/>
+                </a:solidFill>
+                <a:latin typeface="+mn-lt"/>
+                <a:ea typeface="+mn-ea"/>
+                <a:cs typeface="+mn-cs"/>
+              </a:defRPr>
+            </a:lvl5pPr>
+            <a:lvl6pPr marL="2514600" indent="-228600" algn="l" defTabSz="914400" rtl="0" eaLnBrk="1" latinLnBrk="1" hangingPunct="1">
+              <a:lnSpc>
+                <a:spcPct val="90000"/>
+              </a:lnSpc>
+              <a:spcBef>
+                <a:spcPts val="500"/>
+              </a:spcBef>
+              <a:buFont typeface="Arial" panose="020B0604020202020204" pitchFamily="34" charset="0"/>
+              <a:buChar char="•"/>
+              <a:defRPr sz="1800" kern="1200">
+                <a:solidFill>
+                  <a:schemeClr val="tx1"/>
+                </a:solidFill>
+                <a:latin typeface="+mn-lt"/>
+                <a:ea typeface="+mn-ea"/>
+                <a:cs typeface="+mn-cs"/>
+              </a:defRPr>
+            </a:lvl6pPr>
+            <a:lvl7pPr marL="2971800" indent="-228600" algn="l" defTabSz="914400" rtl="0" eaLnBrk="1" latinLnBrk="1" hangingPunct="1">
+              <a:lnSpc>
+                <a:spcPct val="90000"/>
+              </a:lnSpc>
+              <a:spcBef>
+                <a:spcPts val="500"/>
+              </a:spcBef>
+              <a:buFont typeface="Arial" panose="020B0604020202020204" pitchFamily="34" charset="0"/>
+              <a:buChar char="•"/>
+              <a:defRPr sz="1800" kern="1200">
+                <a:solidFill>
+                  <a:schemeClr val="tx1"/>
+                </a:solidFill>
+                <a:latin typeface="+mn-lt"/>
+                <a:ea typeface="+mn-ea"/>
+                <a:cs typeface="+mn-cs"/>
+              </a:defRPr>
+            </a:lvl7pPr>
+            <a:lvl8pPr marL="3429000" indent="-228600" algn="l" defTabSz="914400" rtl="0" eaLnBrk="1" latinLnBrk="1" hangingPunct="1">
+              <a:lnSpc>
+                <a:spcPct val="90000"/>
+              </a:lnSpc>
+              <a:spcBef>
+                <a:spcPts val="500"/>
+              </a:spcBef>
+              <a:buFont typeface="Arial" panose="020B0604020202020204" pitchFamily="34" charset="0"/>
+              <a:buChar char="•"/>
+              <a:defRPr sz="1800" kern="1200">
+                <a:solidFill>
+                  <a:schemeClr val="tx1"/>
+                </a:solidFill>
+                <a:latin typeface="+mn-lt"/>
+                <a:ea typeface="+mn-ea"/>
+                <a:cs typeface="+mn-cs"/>
+              </a:defRPr>
+            </a:lvl8pPr>
+            <a:lvl9pPr marL="3886200" indent="-228600" algn="l" defTabSz="914400" rtl="0" eaLnBrk="1" latinLnBrk="1" hangingPunct="1">
+              <a:lnSpc>
+                <a:spcPct val="90000"/>
+              </a:lnSpc>
+              <a:spcBef>
+                <a:spcPts val="500"/>
+              </a:spcBef>
+              <a:buFont typeface="Arial" panose="020B0604020202020204" pitchFamily="34" charset="0"/>
+              <a:buChar char="•"/>
+              <a:defRPr sz="1800" kern="1200">
+                <a:solidFill>
+                  <a:schemeClr val="tx1"/>
+                </a:solidFill>
+                <a:latin typeface="+mn-lt"/>
+                <a:ea typeface="+mn-ea"/>
+                <a:cs typeface="+mn-cs"/>
+              </a:defRPr>
+            </a:lvl9pPr>
+          </a:lstStyle>
+          <a:p>
+            <a:r>
+              <a:rPr kumimoji="1" lang="en-US" altLang="ko-KR"/>
+              <a:t>Q. </a:t>
+            </a:r>
+            <a:r>
+              <a:rPr kumimoji="1" lang="en" altLang="ko-KR"/>
+              <a:t>HashMap </a:t>
+            </a:r>
+            <a:r>
+              <a:rPr kumimoji="1" lang="ko-KR" altLang="en-US"/>
+              <a:t>동작 방식에 대해서 설명하세요</a:t>
+            </a:r>
+            <a:r>
+              <a:rPr kumimoji="1" lang="en-US" altLang="ko-KR"/>
+              <a:t>.</a:t>
+            </a:r>
+            <a:endParaRPr kumimoji="1" lang="en-US" altLang="ko-KR" dirty="0"/>
+          </a:p>
+        </p:txBody>
+      </p:sp>
+    </p:spTree>
+    <p:extLst>
+      <p:ext uri="{BB962C8B-B14F-4D97-AF65-F5344CB8AC3E}">
+        <p14:creationId xmlns:p14="http://schemas.microsoft.com/office/powerpoint/2010/main" val="2121367046"/>
+      </p:ext>
+    </p:extLst>
+  </p:cSld>
+  <p:clrMapOvr>
+    <a:masterClrMapping/>
+  </p:clrMapOvr>
+</p:sld>
+</file>
+
+<file path=ppt/slides/slide4.xml><?xml version="1.0" encoding="utf-8"?>
+<p:sld xmlns:a="http://schemas.openxmlformats.org/drawingml/2006/main" xmlns:r="http://schemas.openxmlformats.org/officeDocument/2006/relationships" xmlns:p="http://schemas.openxmlformats.org/presentationml/2006/main">
+  <p:cSld>
+    <p:spTree>
+      <p:nvGrpSpPr>
+        <p:cNvPr id="1" name=""/>
+        <p:cNvGrpSpPr/>
+        <p:nvPr/>
+      </p:nvGrpSpPr>
+      <p:grpSpPr>
+        <a:xfrm>
+          <a:off x="0" y="0"/>
+          <a:ext cx="0" cy="0"/>
+          <a:chOff x="0" y="0"/>
+          <a:chExt cx="0" cy="0"/>
+        </a:xfrm>
+      </p:grpSpPr>
+      <p:sp>
+        <p:nvSpPr>
+          <p:cNvPr id="4" name="모서리가 둥근 직사각형 3">
+            <a:extLst>
+              <a:ext uri="{FF2B5EF4-FFF2-40B4-BE49-F238E27FC236}">
+                <a16:creationId xmlns:a16="http://schemas.microsoft.com/office/drawing/2014/main" id="{E9B8B096-5C54-8D4E-ACF7-75496F225D07}"/>
+              </a:ext>
+            </a:extLst>
+          </p:cNvPr>
+          <p:cNvSpPr/>
+          <p:nvPr/>
+        </p:nvSpPr>
+        <p:spPr>
+          <a:xfrm>
+            <a:off x="901521" y="2228045"/>
+            <a:ext cx="2446986" cy="656823"/>
+          </a:xfrm>
+          <a:prstGeom prst="roundRect">
+            <a:avLst/>
+          </a:prstGeom>
+          <a:solidFill>
+            <a:schemeClr val="bg2"/>
+          </a:solidFill>
+          <a:ln>
+            <a:solidFill>
+              <a:schemeClr val="bg2">
+                <a:lumMod val="75000"/>
+              </a:schemeClr>
+            </a:solidFill>
+          </a:ln>
+        </p:spPr>
+        <p:style>
+          <a:lnRef idx="2">
+            <a:schemeClr val="accent1">
+              <a:shade val="50000"/>
+            </a:schemeClr>
+          </a:lnRef>
+          <a:fillRef idx="1">
+            <a:schemeClr val="accent1"/>
+          </a:fillRef>
+          <a:effectRef idx="0">
+            <a:schemeClr val="accent1"/>
+          </a:effectRef>
+          <a:fontRef idx="minor">
+            <a:schemeClr val="lt1"/>
+          </a:fontRef>
+        </p:style>
+        <p:txBody>
+          <a:bodyPr rtlCol="0" anchor="ctr"/>
+          <a:lstStyle/>
+          <a:p>
+            <a:pPr algn="ctr"/>
+            <a:r>
+              <a:rPr kumimoji="1" lang="en-US" altLang="ko-KR" dirty="0">
+                <a:solidFill>
+                  <a:schemeClr val="tx1"/>
+                </a:solidFill>
+              </a:rPr>
+              <a:t>hashCode()</a:t>
+            </a:r>
+            <a:r>
+              <a:rPr kumimoji="1" lang="ko-KR" altLang="en-US" dirty="0">
+                <a:solidFill>
+                  <a:schemeClr val="tx1"/>
+                </a:solidFill>
+              </a:rPr>
+              <a:t> 리턴값</a:t>
+            </a:r>
+          </a:p>
+        </p:txBody>
+      </p:sp>
+      <p:sp>
+        <p:nvSpPr>
+          <p:cNvPr id="5" name="모서리가 둥근 직사각형 4">
+            <a:extLst>
+              <a:ext uri="{FF2B5EF4-FFF2-40B4-BE49-F238E27FC236}">
+                <a16:creationId xmlns:a16="http://schemas.microsoft.com/office/drawing/2014/main" id="{E2262F9D-CAD2-2D45-92D3-9F905881E0B4}"/>
+              </a:ext>
+            </a:extLst>
+          </p:cNvPr>
+          <p:cNvSpPr/>
+          <p:nvPr/>
+        </p:nvSpPr>
+        <p:spPr>
+          <a:xfrm>
+            <a:off x="4531217" y="2228045"/>
+            <a:ext cx="2446986" cy="656823"/>
+          </a:xfrm>
+          <a:prstGeom prst="roundRect">
+            <a:avLst/>
+          </a:prstGeom>
+          <a:solidFill>
+            <a:schemeClr val="bg2"/>
+          </a:solidFill>
+          <a:ln>
+            <a:solidFill>
+              <a:schemeClr val="bg2">
+                <a:lumMod val="75000"/>
+              </a:schemeClr>
+            </a:solidFill>
+          </a:ln>
+        </p:spPr>
+        <p:style>
+          <a:lnRef idx="2">
+            <a:schemeClr val="accent1">
+              <a:shade val="50000"/>
+            </a:schemeClr>
+          </a:lnRef>
+          <a:fillRef idx="1">
+            <a:schemeClr val="accent1"/>
+          </a:fillRef>
+          <a:effectRef idx="0">
+            <a:schemeClr val="accent1"/>
+          </a:effectRef>
+          <a:fontRef idx="minor">
+            <a:schemeClr val="lt1"/>
+          </a:fontRef>
+        </p:style>
+        <p:txBody>
+          <a:bodyPr rtlCol="0" anchor="ctr"/>
+          <a:lstStyle/>
+          <a:p>
+            <a:pPr algn="ctr"/>
+            <a:r>
+              <a:rPr kumimoji="1" lang="en-US" altLang="ko-KR" dirty="0">
+                <a:solidFill>
+                  <a:schemeClr val="tx1"/>
+                </a:solidFill>
+              </a:rPr>
+              <a:t>equals()</a:t>
+            </a:r>
+            <a:r>
+              <a:rPr kumimoji="1" lang="ko-KR" altLang="en-US" dirty="0">
+                <a:solidFill>
+                  <a:schemeClr val="tx1"/>
+                </a:solidFill>
+              </a:rPr>
+              <a:t> 리턴값</a:t>
+            </a:r>
+          </a:p>
+        </p:txBody>
+      </p:sp>
+      <p:sp>
+        <p:nvSpPr>
+          <p:cNvPr id="7" name="TextBox 6">
+            <a:extLst>
+              <a:ext uri="{FF2B5EF4-FFF2-40B4-BE49-F238E27FC236}">
+                <a16:creationId xmlns:a16="http://schemas.microsoft.com/office/drawing/2014/main" id="{8DFAFF94-0CDD-E04D-99DA-5474F44C1F73}"/>
+              </a:ext>
+            </a:extLst>
+          </p:cNvPr>
+          <p:cNvSpPr txBox="1"/>
+          <p:nvPr/>
+        </p:nvSpPr>
+        <p:spPr>
+          <a:xfrm>
+            <a:off x="8210282" y="2386885"/>
+            <a:ext cx="1098314" cy="369332"/>
+          </a:xfrm>
+          <a:prstGeom prst="rect">
+            <a:avLst/>
+          </a:prstGeom>
+          <a:noFill/>
+        </p:spPr>
+        <p:txBody>
+          <a:bodyPr wrap="none" rtlCol="0">
+            <a:spAutoFit/>
+          </a:bodyPr>
+          <a:lstStyle/>
+          <a:p>
+            <a:r>
+              <a:rPr kumimoji="1" lang="ko-KR" altLang="en-US" dirty="0"/>
+              <a:t>같은 </a:t>
+            </a:r>
+            <a:r>
+              <a:rPr kumimoji="1" lang="en-US" altLang="ko-KR" dirty="0"/>
+              <a:t>Key</a:t>
+            </a:r>
+            <a:endParaRPr kumimoji="1" lang="ko-KR" altLang="en-US" dirty="0"/>
+          </a:p>
+        </p:txBody>
+      </p:sp>
+      <p:sp>
+        <p:nvSpPr>
+          <p:cNvPr id="8" name="TextBox 7">
+            <a:extLst>
+              <a:ext uri="{FF2B5EF4-FFF2-40B4-BE49-F238E27FC236}">
+                <a16:creationId xmlns:a16="http://schemas.microsoft.com/office/drawing/2014/main" id="{78A2D89E-5861-2742-8EA7-5A9FD0204F46}"/>
+              </a:ext>
+            </a:extLst>
+          </p:cNvPr>
+          <p:cNvSpPr txBox="1"/>
+          <p:nvPr/>
+        </p:nvSpPr>
+        <p:spPr>
+          <a:xfrm>
+            <a:off x="5205553" y="4213470"/>
+            <a:ext cx="1098314" cy="369332"/>
+          </a:xfrm>
+          <a:prstGeom prst="rect">
+            <a:avLst/>
+          </a:prstGeom>
+          <a:noFill/>
+        </p:spPr>
+        <p:txBody>
+          <a:bodyPr wrap="none" rtlCol="0">
+            <a:spAutoFit/>
+          </a:bodyPr>
+          <a:lstStyle/>
+          <a:p>
+            <a:r>
+              <a:rPr kumimoji="1" lang="ko-KR" altLang="en-US" dirty="0"/>
+              <a:t>다른 </a:t>
+            </a:r>
+            <a:r>
+              <a:rPr kumimoji="1" lang="en-US" altLang="ko-KR" dirty="0"/>
+              <a:t>Key</a:t>
+            </a:r>
+            <a:endParaRPr kumimoji="1" lang="ko-KR" altLang="en-US" dirty="0"/>
+          </a:p>
+        </p:txBody>
+      </p:sp>
+      <p:cxnSp>
+        <p:nvCxnSpPr>
+          <p:cNvPr id="10" name="직선 화살표 연결선 9">
+            <a:extLst>
+              <a:ext uri="{FF2B5EF4-FFF2-40B4-BE49-F238E27FC236}">
+                <a16:creationId xmlns:a16="http://schemas.microsoft.com/office/drawing/2014/main" id="{988C5E97-582F-A545-8F60-E8627ED43E72}"/>
+              </a:ext>
+            </a:extLst>
+          </p:cNvPr>
+          <p:cNvCxnSpPr>
+            <a:stCxn id="4" idx="3"/>
+            <a:endCxn id="5" idx="1"/>
+          </p:cNvCxnSpPr>
+          <p:nvPr/>
+        </p:nvCxnSpPr>
+        <p:spPr>
+          <a:xfrm>
+            <a:off x="3348507" y="2556457"/>
+            <a:ext cx="1182710" cy="0"/>
+          </a:xfrm>
+          <a:prstGeom prst="straightConnector1">
+            <a:avLst/>
+          </a:prstGeom>
+          <a:ln>
+            <a:tailEnd type="triangle"/>
+          </a:ln>
+        </p:spPr>
+        <p:style>
+          <a:lnRef idx="1">
+            <a:schemeClr val="dk1"/>
+          </a:lnRef>
+          <a:fillRef idx="0">
+            <a:schemeClr val="dk1"/>
+          </a:fillRef>
+          <a:effectRef idx="0">
+            <a:schemeClr val="dk1"/>
+          </a:effectRef>
+          <a:fontRef idx="minor">
+            <a:schemeClr val="tx1"/>
+          </a:fontRef>
+        </p:style>
+      </p:cxnSp>
+      <p:cxnSp>
+        <p:nvCxnSpPr>
+          <p:cNvPr id="11" name="직선 화살표 연결선 10">
+            <a:extLst>
+              <a:ext uri="{FF2B5EF4-FFF2-40B4-BE49-F238E27FC236}">
+                <a16:creationId xmlns:a16="http://schemas.microsoft.com/office/drawing/2014/main" id="{0AA6C779-1BF5-F44E-A06C-6E64967CB1C2}"/>
+              </a:ext>
+            </a:extLst>
+          </p:cNvPr>
+          <p:cNvCxnSpPr/>
+          <p:nvPr/>
+        </p:nvCxnSpPr>
+        <p:spPr>
+          <a:xfrm>
+            <a:off x="6978203" y="2571551"/>
+            <a:ext cx="1182710" cy="0"/>
+          </a:xfrm>
+          <a:prstGeom prst="straightConnector1">
+            <a:avLst/>
+          </a:prstGeom>
+          <a:ln>
+            <a:tailEnd type="triangle"/>
+          </a:ln>
+        </p:spPr>
+        <p:style>
+          <a:lnRef idx="1">
+            <a:schemeClr val="dk1"/>
+          </a:lnRef>
+          <a:fillRef idx="0">
+            <a:schemeClr val="dk1"/>
+          </a:fillRef>
+          <a:effectRef idx="0">
+            <a:schemeClr val="dk1"/>
+          </a:effectRef>
+          <a:fontRef idx="minor">
+            <a:schemeClr val="tx1"/>
+          </a:fontRef>
+        </p:style>
+      </p:cxnSp>
+      <p:cxnSp>
+        <p:nvCxnSpPr>
+          <p:cNvPr id="12" name="직선 화살표 연결선 11">
+            <a:extLst>
+              <a:ext uri="{FF2B5EF4-FFF2-40B4-BE49-F238E27FC236}">
+                <a16:creationId xmlns:a16="http://schemas.microsoft.com/office/drawing/2014/main" id="{DF12F92B-2E8A-AA48-A9B9-78F5C843C3C6}"/>
+              </a:ext>
+            </a:extLst>
+          </p:cNvPr>
+          <p:cNvCxnSpPr>
+            <a:cxnSpLocks/>
+          </p:cNvCxnSpPr>
+          <p:nvPr/>
+        </p:nvCxnSpPr>
+        <p:spPr>
+          <a:xfrm>
+            <a:off x="5754710" y="2884868"/>
+            <a:ext cx="0" cy="1165469"/>
+          </a:xfrm>
+          <a:prstGeom prst="straightConnector1">
+            <a:avLst/>
+          </a:prstGeom>
+          <a:ln>
+            <a:tailEnd type="triangle"/>
+          </a:ln>
+        </p:spPr>
+        <p:style>
+          <a:lnRef idx="1">
+            <a:schemeClr val="dk1"/>
+          </a:lnRef>
+          <a:fillRef idx="0">
+            <a:schemeClr val="dk1"/>
+          </a:fillRef>
+          <a:effectRef idx="0">
+            <a:schemeClr val="dk1"/>
+          </a:effectRef>
+          <a:fontRef idx="minor">
+            <a:schemeClr val="tx1"/>
+          </a:fontRef>
+        </p:style>
+      </p:cxnSp>
+      <p:cxnSp>
+        <p:nvCxnSpPr>
+          <p:cNvPr id="14" name="직선 화살표 연결선 13">
+            <a:extLst>
+              <a:ext uri="{FF2B5EF4-FFF2-40B4-BE49-F238E27FC236}">
+                <a16:creationId xmlns:a16="http://schemas.microsoft.com/office/drawing/2014/main" id="{E25F9291-2F36-CD45-9BBF-B19D92CE6AEA}"/>
+              </a:ext>
+            </a:extLst>
+          </p:cNvPr>
+          <p:cNvCxnSpPr>
+            <a:cxnSpLocks/>
+          </p:cNvCxnSpPr>
+          <p:nvPr/>
+        </p:nvCxnSpPr>
+        <p:spPr>
+          <a:xfrm>
+            <a:off x="2125014" y="4389551"/>
+            <a:ext cx="2968581" cy="0"/>
+          </a:xfrm>
+          <a:prstGeom prst="straightConnector1">
+            <a:avLst/>
+          </a:prstGeom>
+          <a:ln>
+            <a:tailEnd type="triangle"/>
+          </a:ln>
+        </p:spPr>
+        <p:style>
+          <a:lnRef idx="1">
+            <a:schemeClr val="dk1"/>
+          </a:lnRef>
+          <a:fillRef idx="0">
+            <a:schemeClr val="dk1"/>
+          </a:fillRef>
+          <a:effectRef idx="0">
+            <a:schemeClr val="dk1"/>
+          </a:effectRef>
+          <a:fontRef idx="minor">
+            <a:schemeClr val="tx1"/>
+          </a:fontRef>
+        </p:style>
+      </p:cxnSp>
+      <p:cxnSp>
+        <p:nvCxnSpPr>
+          <p:cNvPr id="17" name="직선 연결선[R] 16">
+            <a:extLst>
+              <a:ext uri="{FF2B5EF4-FFF2-40B4-BE49-F238E27FC236}">
+                <a16:creationId xmlns:a16="http://schemas.microsoft.com/office/drawing/2014/main" id="{8E380AF3-188F-1F44-A3F3-683F795606E8}"/>
+              </a:ext>
+            </a:extLst>
+          </p:cNvPr>
+          <p:cNvCxnSpPr>
+            <a:stCxn id="4" idx="2"/>
+          </p:cNvCxnSpPr>
+          <p:nvPr/>
+        </p:nvCxnSpPr>
+        <p:spPr>
+          <a:xfrm>
+            <a:off x="2125014" y="2884868"/>
+            <a:ext cx="0" cy="1513268"/>
+          </a:xfrm>
+          <a:prstGeom prst="line">
+            <a:avLst/>
+          </a:prstGeom>
+        </p:spPr>
+        <p:style>
+          <a:lnRef idx="1">
+            <a:schemeClr val="dk1"/>
+          </a:lnRef>
+          <a:fillRef idx="0">
+            <a:schemeClr val="dk1"/>
+          </a:fillRef>
+          <a:effectRef idx="0">
+            <a:schemeClr val="dk1"/>
+          </a:effectRef>
+          <a:fontRef idx="minor">
+            <a:schemeClr val="tx1"/>
+          </a:fontRef>
+        </p:style>
+      </p:cxnSp>
+      <p:sp>
+        <p:nvSpPr>
+          <p:cNvPr id="18" name="TextBox 17">
+            <a:extLst>
+              <a:ext uri="{FF2B5EF4-FFF2-40B4-BE49-F238E27FC236}">
+                <a16:creationId xmlns:a16="http://schemas.microsoft.com/office/drawing/2014/main" id="{1E29F1EB-A2C5-6041-9DFE-E62BD81CCE60}"/>
+              </a:ext>
+            </a:extLst>
+          </p:cNvPr>
+          <p:cNvSpPr txBox="1"/>
+          <p:nvPr/>
+        </p:nvSpPr>
+        <p:spPr>
+          <a:xfrm>
+            <a:off x="3627533" y="2178541"/>
+            <a:ext cx="624658" cy="369332"/>
+          </a:xfrm>
+          <a:prstGeom prst="rect">
+            <a:avLst/>
+          </a:prstGeom>
+          <a:noFill/>
+        </p:spPr>
+        <p:txBody>
+          <a:bodyPr wrap="none" rtlCol="0">
+            <a:spAutoFit/>
+          </a:bodyPr>
+          <a:lstStyle/>
+          <a:p>
+            <a:r>
+              <a:rPr kumimoji="1" lang="en-US" altLang="ko-KR" dirty="0">
+                <a:solidFill>
+                  <a:schemeClr val="accent2"/>
+                </a:solidFill>
+              </a:rPr>
+              <a:t>True</a:t>
+            </a:r>
+            <a:endParaRPr kumimoji="1" lang="ko-KR" altLang="en-US" dirty="0">
+              <a:solidFill>
+                <a:schemeClr val="accent2"/>
+              </a:solidFill>
+            </a:endParaRPr>
+          </a:p>
+        </p:txBody>
+      </p:sp>
+      <p:sp>
+        <p:nvSpPr>
+          <p:cNvPr id="19" name="TextBox 18">
+            <a:extLst>
+              <a:ext uri="{FF2B5EF4-FFF2-40B4-BE49-F238E27FC236}">
+                <a16:creationId xmlns:a16="http://schemas.microsoft.com/office/drawing/2014/main" id="{A2D7A412-64FE-B04A-ADB4-CA3B2573A91C}"/>
+              </a:ext>
+            </a:extLst>
+          </p:cNvPr>
+          <p:cNvSpPr txBox="1"/>
+          <p:nvPr/>
+        </p:nvSpPr>
+        <p:spPr>
+          <a:xfrm>
+            <a:off x="7257229" y="2174212"/>
+            <a:ext cx="624658" cy="369332"/>
+          </a:xfrm>
+          <a:prstGeom prst="rect">
+            <a:avLst/>
+          </a:prstGeom>
+          <a:noFill/>
+        </p:spPr>
+        <p:txBody>
+          <a:bodyPr wrap="none" rtlCol="0">
+            <a:spAutoFit/>
+          </a:bodyPr>
+          <a:lstStyle/>
+          <a:p>
+            <a:r>
+              <a:rPr kumimoji="1" lang="en-US" altLang="ko-KR" dirty="0">
+                <a:solidFill>
+                  <a:schemeClr val="accent2"/>
+                </a:solidFill>
+              </a:rPr>
+              <a:t>True</a:t>
+            </a:r>
+            <a:endParaRPr kumimoji="1" lang="ko-KR" altLang="en-US" dirty="0">
+              <a:solidFill>
+                <a:schemeClr val="accent2"/>
+              </a:solidFill>
+            </a:endParaRPr>
+          </a:p>
+        </p:txBody>
+      </p:sp>
+      <p:sp>
+        <p:nvSpPr>
+          <p:cNvPr id="20" name="TextBox 19">
+            <a:extLst>
+              <a:ext uri="{FF2B5EF4-FFF2-40B4-BE49-F238E27FC236}">
+                <a16:creationId xmlns:a16="http://schemas.microsoft.com/office/drawing/2014/main" id="{71D81C08-8831-FB41-A6C2-3D49B7C17E55}"/>
+              </a:ext>
+            </a:extLst>
+          </p:cNvPr>
+          <p:cNvSpPr txBox="1"/>
+          <p:nvPr/>
+        </p:nvSpPr>
+        <p:spPr>
+          <a:xfrm>
+            <a:off x="5812633" y="3282936"/>
+            <a:ext cx="689997" cy="369332"/>
+          </a:xfrm>
+          <a:prstGeom prst="rect">
+            <a:avLst/>
+          </a:prstGeom>
+          <a:noFill/>
+        </p:spPr>
+        <p:txBody>
+          <a:bodyPr wrap="none" rtlCol="0">
+            <a:spAutoFit/>
+          </a:bodyPr>
+          <a:lstStyle/>
+          <a:p>
+            <a:r>
+              <a:rPr kumimoji="1" lang="en-US" altLang="ko-KR" dirty="0">
+                <a:solidFill>
+                  <a:schemeClr val="accent2"/>
+                </a:solidFill>
+              </a:rPr>
+              <a:t>False</a:t>
+            </a:r>
+            <a:endParaRPr kumimoji="1" lang="ko-KR" altLang="en-US" dirty="0">
+              <a:solidFill>
+                <a:schemeClr val="accent2"/>
+              </a:solidFill>
+            </a:endParaRPr>
+          </a:p>
+        </p:txBody>
+      </p:sp>
+      <p:sp>
+        <p:nvSpPr>
+          <p:cNvPr id="21" name="TextBox 20">
+            <a:extLst>
+              <a:ext uri="{FF2B5EF4-FFF2-40B4-BE49-F238E27FC236}">
+                <a16:creationId xmlns:a16="http://schemas.microsoft.com/office/drawing/2014/main" id="{B142931D-6C4C-BB43-8586-552667DBF15F}"/>
+              </a:ext>
+            </a:extLst>
+          </p:cNvPr>
+          <p:cNvSpPr txBox="1"/>
+          <p:nvPr/>
+        </p:nvSpPr>
+        <p:spPr>
+          <a:xfrm>
+            <a:off x="1453101" y="3456836"/>
+            <a:ext cx="689997" cy="369332"/>
+          </a:xfrm>
+          <a:prstGeom prst="rect">
+            <a:avLst/>
+          </a:prstGeom>
+          <a:noFill/>
+        </p:spPr>
+        <p:txBody>
+          <a:bodyPr wrap="none" rtlCol="0">
+            <a:spAutoFit/>
+          </a:bodyPr>
+          <a:lstStyle/>
+          <a:p>
+            <a:r>
+              <a:rPr kumimoji="1" lang="en-US" altLang="ko-KR" dirty="0">
+                <a:solidFill>
+                  <a:schemeClr val="accent2"/>
+                </a:solidFill>
+              </a:rPr>
+              <a:t>False</a:t>
+            </a:r>
+            <a:endParaRPr kumimoji="1" lang="ko-KR" altLang="en-US" dirty="0">
+              <a:solidFill>
+                <a:schemeClr val="accent2"/>
+              </a:solidFill>
+            </a:endParaRPr>
+          </a:p>
+        </p:txBody>
+      </p:sp>
+      <p:sp>
+        <p:nvSpPr>
+          <p:cNvPr id="15" name="부제목 2">
+            <a:extLst>
+              <a:ext uri="{FF2B5EF4-FFF2-40B4-BE49-F238E27FC236}">
+                <a16:creationId xmlns:a16="http://schemas.microsoft.com/office/drawing/2014/main" id="{68E16BBA-AFBE-774A-87EB-93FB5A7409F1}"/>
+              </a:ext>
+            </a:extLst>
+          </p:cNvPr>
+          <p:cNvSpPr txBox="1">
+            <a:spLocks/>
+          </p:cNvSpPr>
+          <p:nvPr/>
+        </p:nvSpPr>
+        <p:spPr>
+          <a:xfrm>
+            <a:off x="73573" y="123114"/>
+            <a:ext cx="9144000" cy="507507"/>
+          </a:xfrm>
+          <a:prstGeom prst="rect">
+            <a:avLst/>
+          </a:prstGeom>
+        </p:spPr>
+        <p:txBody>
+          <a:bodyPr vert="horz" lIns="91440" tIns="45720" rIns="91440" bIns="45720" rtlCol="0">
+            <a:normAutofit/>
+          </a:bodyPr>
+          <a:lstStyle>
+            <a:lvl1pPr marL="228600" indent="-228600" algn="l" defTabSz="914400" rtl="0" eaLnBrk="1" latinLnBrk="1" hangingPunct="1">
+              <a:lnSpc>
+                <a:spcPct val="90000"/>
+              </a:lnSpc>
+              <a:spcBef>
+                <a:spcPts val="1000"/>
+              </a:spcBef>
+              <a:buFont typeface="Arial" panose="020B0604020202020204" pitchFamily="34" charset="0"/>
+              <a:buChar char="•"/>
+              <a:defRPr sz="2800" kern="1200">
+                <a:solidFill>
+                  <a:schemeClr val="tx1"/>
+                </a:solidFill>
+                <a:latin typeface="+mn-lt"/>
+                <a:ea typeface="+mn-ea"/>
+                <a:cs typeface="+mn-cs"/>
+              </a:defRPr>
+            </a:lvl1pPr>
+            <a:lvl2pPr marL="685800" indent="-228600" algn="l" defTabSz="914400" rtl="0" eaLnBrk="1" latinLnBrk="1" hangingPunct="1">
+              <a:lnSpc>
+                <a:spcPct val="90000"/>
+              </a:lnSpc>
+              <a:spcBef>
+                <a:spcPts val="500"/>
+              </a:spcBef>
+              <a:buFont typeface="Arial" panose="020B0604020202020204" pitchFamily="34" charset="0"/>
+              <a:buChar char="•"/>
+              <a:defRPr sz="2400" kern="1200">
+                <a:solidFill>
+                  <a:schemeClr val="tx1"/>
+                </a:solidFill>
+                <a:latin typeface="+mn-lt"/>
+                <a:ea typeface="+mn-ea"/>
+                <a:cs typeface="+mn-cs"/>
+              </a:defRPr>
+            </a:lvl2pPr>
+            <a:lvl3pPr marL="1143000" indent="-228600" algn="l" defTabSz="914400" rtl="0" eaLnBrk="1" latinLnBrk="1" hangingPunct="1">
+              <a:lnSpc>
+                <a:spcPct val="90000"/>
+              </a:lnSpc>
+              <a:spcBef>
+                <a:spcPts val="500"/>
+              </a:spcBef>
+              <a:buFont typeface="Arial" panose="020B0604020202020204" pitchFamily="34" charset="0"/>
+              <a:buChar char="•"/>
+              <a:defRPr sz="2000" kern="1200">
+                <a:solidFill>
+                  <a:schemeClr val="tx1"/>
+                </a:solidFill>
+                <a:latin typeface="+mn-lt"/>
+                <a:ea typeface="+mn-ea"/>
+                <a:cs typeface="+mn-cs"/>
+              </a:defRPr>
+            </a:lvl3pPr>
+            <a:lvl4pPr marL="1600200" indent="-228600" algn="l" defTabSz="914400" rtl="0" eaLnBrk="1" latinLnBrk="1" hangingPunct="1">
+              <a:lnSpc>
+                <a:spcPct val="90000"/>
+              </a:lnSpc>
+              <a:spcBef>
+                <a:spcPts val="500"/>
+              </a:spcBef>
+              <a:buFont typeface="Arial" panose="020B0604020202020204" pitchFamily="34" charset="0"/>
+              <a:buChar char="•"/>
+              <a:defRPr sz="1800" kern="1200">
+                <a:solidFill>
+                  <a:schemeClr val="tx1"/>
+                </a:solidFill>
+                <a:latin typeface="+mn-lt"/>
+                <a:ea typeface="+mn-ea"/>
+                <a:cs typeface="+mn-cs"/>
+              </a:defRPr>
+            </a:lvl4pPr>
+            <a:lvl5pPr marL="2057400" indent="-228600" algn="l" defTabSz="914400" rtl="0" eaLnBrk="1" latinLnBrk="1" hangingPunct="1">
+              <a:lnSpc>
+                <a:spcPct val="90000"/>
+              </a:lnSpc>
+              <a:spcBef>
+                <a:spcPts val="500"/>
+              </a:spcBef>
+              <a:buFont typeface="Arial" panose="020B0604020202020204" pitchFamily="34" charset="0"/>
+              <a:buChar char="•"/>
+              <a:defRPr sz="1800" kern="1200">
+                <a:solidFill>
+                  <a:schemeClr val="tx1"/>
+                </a:solidFill>
+                <a:latin typeface="+mn-lt"/>
+                <a:ea typeface="+mn-ea"/>
+                <a:cs typeface="+mn-cs"/>
+              </a:defRPr>
+            </a:lvl5pPr>
+            <a:lvl6pPr marL="2514600" indent="-228600" algn="l" defTabSz="914400" rtl="0" eaLnBrk="1" latinLnBrk="1" hangingPunct="1">
+              <a:lnSpc>
+                <a:spcPct val="90000"/>
+              </a:lnSpc>
+              <a:spcBef>
+                <a:spcPts val="500"/>
+              </a:spcBef>
+              <a:buFont typeface="Arial" panose="020B0604020202020204" pitchFamily="34" charset="0"/>
+              <a:buChar char="•"/>
+              <a:defRPr sz="1800" kern="1200">
+                <a:solidFill>
+                  <a:schemeClr val="tx1"/>
+                </a:solidFill>
+                <a:latin typeface="+mn-lt"/>
+                <a:ea typeface="+mn-ea"/>
+                <a:cs typeface="+mn-cs"/>
+              </a:defRPr>
+            </a:lvl6pPr>
+            <a:lvl7pPr marL="2971800" indent="-228600" algn="l" defTabSz="914400" rtl="0" eaLnBrk="1" latinLnBrk="1" hangingPunct="1">
+              <a:lnSpc>
+                <a:spcPct val="90000"/>
+              </a:lnSpc>
+              <a:spcBef>
+                <a:spcPts val="500"/>
+              </a:spcBef>
+              <a:buFont typeface="Arial" panose="020B0604020202020204" pitchFamily="34" charset="0"/>
+              <a:buChar char="•"/>
+              <a:defRPr sz="1800" kern="1200">
+                <a:solidFill>
+                  <a:schemeClr val="tx1"/>
+                </a:solidFill>
+                <a:latin typeface="+mn-lt"/>
+                <a:ea typeface="+mn-ea"/>
+                <a:cs typeface="+mn-cs"/>
+              </a:defRPr>
+            </a:lvl7pPr>
+            <a:lvl8pPr marL="3429000" indent="-228600" algn="l" defTabSz="914400" rtl="0" eaLnBrk="1" latinLnBrk="1" hangingPunct="1">
+              <a:lnSpc>
+                <a:spcPct val="90000"/>
+              </a:lnSpc>
+              <a:spcBef>
+                <a:spcPts val="500"/>
+              </a:spcBef>
+              <a:buFont typeface="Arial" panose="020B0604020202020204" pitchFamily="34" charset="0"/>
+              <a:buChar char="•"/>
+              <a:defRPr sz="1800" kern="1200">
+                <a:solidFill>
+                  <a:schemeClr val="tx1"/>
+                </a:solidFill>
+                <a:latin typeface="+mn-lt"/>
+                <a:ea typeface="+mn-ea"/>
+                <a:cs typeface="+mn-cs"/>
+              </a:defRPr>
+            </a:lvl8pPr>
+            <a:lvl9pPr marL="3886200" indent="-228600" algn="l" defTabSz="914400" rtl="0" eaLnBrk="1" latinLnBrk="1" hangingPunct="1">
+              <a:lnSpc>
+                <a:spcPct val="90000"/>
+              </a:lnSpc>
+              <a:spcBef>
+                <a:spcPts val="500"/>
+              </a:spcBef>
+              <a:buFont typeface="Arial" panose="020B0604020202020204" pitchFamily="34" charset="0"/>
+              <a:buChar char="•"/>
+              <a:defRPr sz="1800" kern="1200">
+                <a:solidFill>
+                  <a:schemeClr val="tx1"/>
+                </a:solidFill>
+                <a:latin typeface="+mn-lt"/>
+                <a:ea typeface="+mn-ea"/>
+                <a:cs typeface="+mn-cs"/>
+              </a:defRPr>
+            </a:lvl9pPr>
+          </a:lstStyle>
+          <a:p>
+            <a:r>
+              <a:rPr kumimoji="1" lang="en-US" altLang="ko-KR"/>
+              <a:t>Q. </a:t>
+            </a:r>
+            <a:r>
+              <a:rPr kumimoji="1" lang="en" altLang="ko-KR"/>
+              <a:t>HashMap </a:t>
+            </a:r>
+            <a:r>
+              <a:rPr kumimoji="1" lang="ko-KR" altLang="en-US"/>
+              <a:t>동작 방식에 대해서 설명하세요</a:t>
+            </a:r>
+            <a:r>
+              <a:rPr kumimoji="1" lang="en-US" altLang="ko-KR"/>
+              <a:t>.</a:t>
+            </a:r>
+            <a:endParaRPr kumimoji="1" lang="en-US" altLang="ko-KR" dirty="0"/>
+          </a:p>
+        </p:txBody>
+      </p:sp>
+    </p:spTree>
+    <p:extLst>
+      <p:ext uri="{BB962C8B-B14F-4D97-AF65-F5344CB8AC3E}">
+        <p14:creationId xmlns:p14="http://schemas.microsoft.com/office/powerpoint/2010/main" val="2006350717"/>
       </p:ext>
     </p:extLst>
   </p:cSld>

</xml_diff>

<commit_message>
[language] exception, error update
</commit_message>
<xml_diff>
--- a/_raw/language.pptx
+++ b/_raw/language.pptx
@@ -9,6 +9,8 @@
     <p:sldId id="257" r:id="rId3"/>
     <p:sldId id="258" r:id="rId4"/>
     <p:sldId id="259" r:id="rId5"/>
+    <p:sldId id="260" r:id="rId6"/>
+    <p:sldId id="261" r:id="rId7"/>
   </p:sldIdLst>
   <p:sldSz cx="12192000" cy="6858000"/>
   <p:notesSz cx="6858000" cy="9144000"/>
@@ -262,7 +264,7 @@
           <a:p>
             <a:fld id="{55489922-ED5C-DE45-85F1-D26AC85B6B48}" type="datetimeFigureOut">
               <a:rPr kumimoji="1" lang="ko-KR" altLang="en-US" smtClean="0"/>
-              <a:t>2021. 3. 24.</a:t>
+              <a:t>2021. 5. 12.</a:t>
             </a:fld>
             <a:endParaRPr kumimoji="1" lang="ko-KR" altLang="en-US"/>
           </a:p>
@@ -460,7 +462,7 @@
           <a:p>
             <a:fld id="{55489922-ED5C-DE45-85F1-D26AC85B6B48}" type="datetimeFigureOut">
               <a:rPr kumimoji="1" lang="ko-KR" altLang="en-US" smtClean="0"/>
-              <a:t>2021. 3. 24.</a:t>
+              <a:t>2021. 5. 12.</a:t>
             </a:fld>
             <a:endParaRPr kumimoji="1" lang="ko-KR" altLang="en-US"/>
           </a:p>
@@ -668,7 +670,7 @@
           <a:p>
             <a:fld id="{55489922-ED5C-DE45-85F1-D26AC85B6B48}" type="datetimeFigureOut">
               <a:rPr kumimoji="1" lang="ko-KR" altLang="en-US" smtClean="0"/>
-              <a:t>2021. 3. 24.</a:t>
+              <a:t>2021. 5. 12.</a:t>
             </a:fld>
             <a:endParaRPr kumimoji="1" lang="ko-KR" altLang="en-US"/>
           </a:p>
@@ -866,7 +868,7 @@
           <a:p>
             <a:fld id="{55489922-ED5C-DE45-85F1-D26AC85B6B48}" type="datetimeFigureOut">
               <a:rPr kumimoji="1" lang="ko-KR" altLang="en-US" smtClean="0"/>
-              <a:t>2021. 3. 24.</a:t>
+              <a:t>2021. 5. 12.</a:t>
             </a:fld>
             <a:endParaRPr kumimoji="1" lang="ko-KR" altLang="en-US"/>
           </a:p>
@@ -1141,7 +1143,7 @@
           <a:p>
             <a:fld id="{55489922-ED5C-DE45-85F1-D26AC85B6B48}" type="datetimeFigureOut">
               <a:rPr kumimoji="1" lang="ko-KR" altLang="en-US" smtClean="0"/>
-              <a:t>2021. 3. 24.</a:t>
+              <a:t>2021. 5. 12.</a:t>
             </a:fld>
             <a:endParaRPr kumimoji="1" lang="ko-KR" altLang="en-US"/>
           </a:p>
@@ -1406,7 +1408,7 @@
           <a:p>
             <a:fld id="{55489922-ED5C-DE45-85F1-D26AC85B6B48}" type="datetimeFigureOut">
               <a:rPr kumimoji="1" lang="ko-KR" altLang="en-US" smtClean="0"/>
-              <a:t>2021. 3. 24.</a:t>
+              <a:t>2021. 5. 12.</a:t>
             </a:fld>
             <a:endParaRPr kumimoji="1" lang="ko-KR" altLang="en-US"/>
           </a:p>
@@ -1818,7 +1820,7 @@
           <a:p>
             <a:fld id="{55489922-ED5C-DE45-85F1-D26AC85B6B48}" type="datetimeFigureOut">
               <a:rPr kumimoji="1" lang="ko-KR" altLang="en-US" smtClean="0"/>
-              <a:t>2021. 3. 24.</a:t>
+              <a:t>2021. 5. 12.</a:t>
             </a:fld>
             <a:endParaRPr kumimoji="1" lang="ko-KR" altLang="en-US"/>
           </a:p>
@@ -1959,7 +1961,7 @@
           <a:p>
             <a:fld id="{55489922-ED5C-DE45-85F1-D26AC85B6B48}" type="datetimeFigureOut">
               <a:rPr kumimoji="1" lang="ko-KR" altLang="en-US" smtClean="0"/>
-              <a:t>2021. 3. 24.</a:t>
+              <a:t>2021. 5. 12.</a:t>
             </a:fld>
             <a:endParaRPr kumimoji="1" lang="ko-KR" altLang="en-US"/>
           </a:p>
@@ -2072,7 +2074,7 @@
           <a:p>
             <a:fld id="{55489922-ED5C-DE45-85F1-D26AC85B6B48}" type="datetimeFigureOut">
               <a:rPr kumimoji="1" lang="ko-KR" altLang="en-US" smtClean="0"/>
-              <a:t>2021. 3. 24.</a:t>
+              <a:t>2021. 5. 12.</a:t>
             </a:fld>
             <a:endParaRPr kumimoji="1" lang="ko-KR" altLang="en-US"/>
           </a:p>
@@ -2383,7 +2385,7 @@
           <a:p>
             <a:fld id="{55489922-ED5C-DE45-85F1-D26AC85B6B48}" type="datetimeFigureOut">
               <a:rPr kumimoji="1" lang="ko-KR" altLang="en-US" smtClean="0"/>
-              <a:t>2021. 3. 24.</a:t>
+              <a:t>2021. 5. 12.</a:t>
             </a:fld>
             <a:endParaRPr kumimoji="1" lang="ko-KR" altLang="en-US"/>
           </a:p>
@@ -2671,7 +2673,7 @@
           <a:p>
             <a:fld id="{55489922-ED5C-DE45-85F1-D26AC85B6B48}" type="datetimeFigureOut">
               <a:rPr kumimoji="1" lang="ko-KR" altLang="en-US" smtClean="0"/>
-              <a:t>2021. 3. 24.</a:t>
+              <a:t>2021. 5. 12.</a:t>
             </a:fld>
             <a:endParaRPr kumimoji="1" lang="ko-KR" altLang="en-US"/>
           </a:p>
@@ -2912,7 +2914,7 @@
           <a:p>
             <a:fld id="{55489922-ED5C-DE45-85F1-D26AC85B6B48}" type="datetimeFigureOut">
               <a:rPr kumimoji="1" lang="ko-KR" altLang="en-US" smtClean="0"/>
-              <a:t>2021. 3. 24.</a:t>
+              <a:t>2021. 5. 12.</a:t>
             </a:fld>
             <a:endParaRPr kumimoji="1" lang="ko-KR" altLang="en-US"/>
           </a:p>
@@ -6879,6 +6881,2318 @@
 </p:sld>
 </file>
 
+<file path=ppt/slides/slide5.xml><?xml version="1.0" encoding="utf-8"?>
+<p:sld xmlns:a="http://schemas.openxmlformats.org/drawingml/2006/main" xmlns:r="http://schemas.openxmlformats.org/officeDocument/2006/relationships" xmlns:p="http://schemas.openxmlformats.org/presentationml/2006/main">
+  <p:cSld>
+    <p:spTree>
+      <p:nvGrpSpPr>
+        <p:cNvPr id="1" name=""/>
+        <p:cNvGrpSpPr/>
+        <p:nvPr/>
+      </p:nvGrpSpPr>
+      <p:grpSpPr>
+        <a:xfrm>
+          <a:off x="0" y="0"/>
+          <a:ext cx="0" cy="0"/>
+          <a:chOff x="0" y="0"/>
+          <a:chExt cx="0" cy="0"/>
+        </a:xfrm>
+      </p:grpSpPr>
+      <p:sp>
+        <p:nvSpPr>
+          <p:cNvPr id="4" name="TextBox 3">
+            <a:extLst>
+              <a:ext uri="{FF2B5EF4-FFF2-40B4-BE49-F238E27FC236}">
+                <a16:creationId xmlns:a16="http://schemas.microsoft.com/office/drawing/2014/main" id="{EB9CB21D-C9D6-7A45-A0AF-776F2F1FA34C}"/>
+              </a:ext>
+            </a:extLst>
+          </p:cNvPr>
+          <p:cNvSpPr txBox="1"/>
+          <p:nvPr/>
+        </p:nvSpPr>
+        <p:spPr>
+          <a:xfrm>
+            <a:off x="4544730" y="939206"/>
+            <a:ext cx="2141933" cy="369332"/>
+          </a:xfrm>
+          <a:prstGeom prst="rect">
+            <a:avLst/>
+          </a:prstGeom>
+          <a:noFill/>
+        </p:spPr>
+        <p:txBody>
+          <a:bodyPr wrap="none" rtlCol="0">
+            <a:spAutoFit/>
+          </a:bodyPr>
+          <a:lstStyle/>
+          <a:p>
+            <a:r>
+              <a:rPr kumimoji="1" lang="en-US" altLang="ko-Kore-KR" dirty="0" err="1"/>
+              <a:t>java.lang.Exception</a:t>
+            </a:r>
+            <a:endParaRPr kumimoji="1" lang="ko-Kore-KR" altLang="en-US" dirty="0"/>
+          </a:p>
+        </p:txBody>
+      </p:sp>
+      <p:sp>
+        <p:nvSpPr>
+          <p:cNvPr id="5" name="TextBox 4">
+            <a:extLst>
+              <a:ext uri="{FF2B5EF4-FFF2-40B4-BE49-F238E27FC236}">
+                <a16:creationId xmlns:a16="http://schemas.microsoft.com/office/drawing/2014/main" id="{49D065FF-CA38-B44B-9DA5-9F015209D234}"/>
+              </a:ext>
+            </a:extLst>
+          </p:cNvPr>
+          <p:cNvSpPr txBox="1"/>
+          <p:nvPr/>
+        </p:nvSpPr>
+        <p:spPr>
+          <a:xfrm>
+            <a:off x="898634" y="2475182"/>
+            <a:ext cx="1824538" cy="369332"/>
+          </a:xfrm>
+          <a:prstGeom prst="rect">
+            <a:avLst/>
+          </a:prstGeom>
+          <a:noFill/>
+        </p:spPr>
+        <p:txBody>
+          <a:bodyPr wrap="none" rtlCol="0">
+            <a:spAutoFit/>
+          </a:bodyPr>
+          <a:lstStyle/>
+          <a:p>
+            <a:r>
+              <a:rPr kumimoji="1" lang="en-US" altLang="ko-Kore-KR" dirty="0" err="1"/>
+              <a:t>NoSuchMethod</a:t>
+            </a:r>
+            <a:endParaRPr kumimoji="1" lang="ko-Kore-KR" altLang="en-US" dirty="0"/>
+          </a:p>
+        </p:txBody>
+      </p:sp>
+      <p:sp>
+        <p:nvSpPr>
+          <p:cNvPr id="6" name="TextBox 5">
+            <a:extLst>
+              <a:ext uri="{FF2B5EF4-FFF2-40B4-BE49-F238E27FC236}">
+                <a16:creationId xmlns:a16="http://schemas.microsoft.com/office/drawing/2014/main" id="{B9EAA068-27DB-534B-A6DB-2A41CE64AC28}"/>
+              </a:ext>
+            </a:extLst>
+          </p:cNvPr>
+          <p:cNvSpPr txBox="1"/>
+          <p:nvPr/>
+        </p:nvSpPr>
+        <p:spPr>
+          <a:xfrm>
+            <a:off x="3124745" y="2475182"/>
+            <a:ext cx="1758815" cy="369332"/>
+          </a:xfrm>
+          <a:prstGeom prst="rect">
+            <a:avLst/>
+          </a:prstGeom>
+          <a:noFill/>
+        </p:spPr>
+        <p:txBody>
+          <a:bodyPr wrap="none" rtlCol="0">
+            <a:spAutoFit/>
+          </a:bodyPr>
+          <a:lstStyle/>
+          <a:p>
+            <a:r>
+              <a:rPr kumimoji="1" lang="en-US" altLang="ko-Kore-KR" dirty="0" err="1"/>
+              <a:t>ClassNotFound</a:t>
+            </a:r>
+            <a:endParaRPr kumimoji="1" lang="ko-Kore-KR" altLang="en-US" dirty="0"/>
+          </a:p>
+        </p:txBody>
+      </p:sp>
+      <p:sp>
+        <p:nvSpPr>
+          <p:cNvPr id="7" name="TextBox 6">
+            <a:extLst>
+              <a:ext uri="{FF2B5EF4-FFF2-40B4-BE49-F238E27FC236}">
+                <a16:creationId xmlns:a16="http://schemas.microsoft.com/office/drawing/2014/main" id="{F83AC77A-DBC2-3D40-ABAC-DFFAF2DF8EEA}"/>
+              </a:ext>
+            </a:extLst>
+          </p:cNvPr>
+          <p:cNvSpPr txBox="1"/>
+          <p:nvPr/>
+        </p:nvSpPr>
+        <p:spPr>
+          <a:xfrm>
+            <a:off x="5615697" y="3978159"/>
+            <a:ext cx="1338893" cy="369332"/>
+          </a:xfrm>
+          <a:prstGeom prst="rect">
+            <a:avLst/>
+          </a:prstGeom>
+          <a:noFill/>
+        </p:spPr>
+        <p:txBody>
+          <a:bodyPr wrap="none" rtlCol="0">
+            <a:spAutoFit/>
+          </a:bodyPr>
+          <a:lstStyle/>
+          <a:p>
+            <a:r>
+              <a:rPr kumimoji="1" lang="en-US" altLang="ko-Kore-KR" dirty="0" err="1"/>
+              <a:t>NullPointer</a:t>
+            </a:r>
+            <a:endParaRPr kumimoji="1" lang="ko-Kore-KR" altLang="en-US" dirty="0"/>
+          </a:p>
+        </p:txBody>
+      </p:sp>
+      <p:sp>
+        <p:nvSpPr>
+          <p:cNvPr id="8" name="TextBox 7">
+            <a:extLst>
+              <a:ext uri="{FF2B5EF4-FFF2-40B4-BE49-F238E27FC236}">
+                <a16:creationId xmlns:a16="http://schemas.microsoft.com/office/drawing/2014/main" id="{75E4FAF2-6EE7-B14F-8BE5-3B467B221A9B}"/>
+              </a:ext>
+            </a:extLst>
+          </p:cNvPr>
+          <p:cNvSpPr txBox="1"/>
+          <p:nvPr/>
+        </p:nvSpPr>
+        <p:spPr>
+          <a:xfrm>
+            <a:off x="7896442" y="3978159"/>
+            <a:ext cx="2720617" cy="369332"/>
+          </a:xfrm>
+          <a:prstGeom prst="rect">
+            <a:avLst/>
+          </a:prstGeom>
+          <a:noFill/>
+        </p:spPr>
+        <p:txBody>
+          <a:bodyPr wrap="none" rtlCol="0">
+            <a:spAutoFit/>
+          </a:bodyPr>
+          <a:lstStyle/>
+          <a:p>
+            <a:r>
+              <a:rPr kumimoji="1" lang="en-US" altLang="ko-Kore-KR" dirty="0" err="1"/>
+              <a:t>ArrayIndexOutOfBounds</a:t>
+            </a:r>
+            <a:endParaRPr kumimoji="1" lang="ko-Kore-KR" altLang="en-US" dirty="0"/>
+          </a:p>
+        </p:txBody>
+      </p:sp>
+      <p:sp>
+        <p:nvSpPr>
+          <p:cNvPr id="9" name="TextBox 8">
+            <a:extLst>
+              <a:ext uri="{FF2B5EF4-FFF2-40B4-BE49-F238E27FC236}">
+                <a16:creationId xmlns:a16="http://schemas.microsoft.com/office/drawing/2014/main" id="{CD618F2A-B13C-6645-A360-6413875F13DA}"/>
+              </a:ext>
+            </a:extLst>
+          </p:cNvPr>
+          <p:cNvSpPr txBox="1"/>
+          <p:nvPr/>
+        </p:nvSpPr>
+        <p:spPr>
+          <a:xfrm>
+            <a:off x="6813876" y="2475182"/>
+            <a:ext cx="2056653" cy="369332"/>
+          </a:xfrm>
+          <a:prstGeom prst="rect">
+            <a:avLst/>
+          </a:prstGeom>
+          <a:noFill/>
+        </p:spPr>
+        <p:txBody>
+          <a:bodyPr wrap="none" rtlCol="0">
+            <a:spAutoFit/>
+          </a:bodyPr>
+          <a:lstStyle/>
+          <a:p>
+            <a:r>
+              <a:rPr kumimoji="1" lang="en-US" altLang="ko-Kore-KR" dirty="0" err="1">
+                <a:highlight>
+                  <a:srgbClr val="FFFF00"/>
+                </a:highlight>
+              </a:rPr>
+              <a:t>RuntimeException</a:t>
+            </a:r>
+            <a:endParaRPr kumimoji="1" lang="ko-Kore-KR" altLang="en-US" dirty="0">
+              <a:highlight>
+                <a:srgbClr val="FFFF00"/>
+              </a:highlight>
+            </a:endParaRPr>
+          </a:p>
+        </p:txBody>
+      </p:sp>
+      <p:sp>
+        <p:nvSpPr>
+          <p:cNvPr id="10" name="오른쪽 중괄호[R] 9">
+            <a:extLst>
+              <a:ext uri="{FF2B5EF4-FFF2-40B4-BE49-F238E27FC236}">
+                <a16:creationId xmlns:a16="http://schemas.microsoft.com/office/drawing/2014/main" id="{572A3D2D-AA43-8843-AA50-840233FA6216}"/>
+              </a:ext>
+            </a:extLst>
+          </p:cNvPr>
+          <p:cNvSpPr/>
+          <p:nvPr/>
+        </p:nvSpPr>
+        <p:spPr>
+          <a:xfrm rot="5400000">
+            <a:off x="2744003" y="1710555"/>
+            <a:ext cx="369332" cy="3494689"/>
+          </a:xfrm>
+          <a:prstGeom prst="rightBrace">
+            <a:avLst/>
+          </a:prstGeom>
+          <a:ln>
+            <a:solidFill>
+              <a:srgbClr val="FF0000"/>
+            </a:solidFill>
+          </a:ln>
+        </p:spPr>
+        <p:style>
+          <a:lnRef idx="1">
+            <a:schemeClr val="accent1"/>
+          </a:lnRef>
+          <a:fillRef idx="0">
+            <a:schemeClr val="accent1"/>
+          </a:fillRef>
+          <a:effectRef idx="0">
+            <a:schemeClr val="accent1"/>
+          </a:effectRef>
+          <a:fontRef idx="minor">
+            <a:schemeClr val="tx1"/>
+          </a:fontRef>
+        </p:style>
+        <p:txBody>
+          <a:bodyPr rtlCol="0" anchor="ctr"/>
+          <a:lstStyle/>
+          <a:p>
+            <a:pPr algn="ctr"/>
+            <a:endParaRPr kumimoji="1" lang="ko-Kore-KR" altLang="en-US"/>
+          </a:p>
+        </p:txBody>
+      </p:sp>
+      <p:sp>
+        <p:nvSpPr>
+          <p:cNvPr id="11" name="TextBox 10">
+            <a:extLst>
+              <a:ext uri="{FF2B5EF4-FFF2-40B4-BE49-F238E27FC236}">
+                <a16:creationId xmlns:a16="http://schemas.microsoft.com/office/drawing/2014/main" id="{A8D970B3-511F-674D-81FD-6BD4E6022C1E}"/>
+              </a:ext>
+            </a:extLst>
+          </p:cNvPr>
+          <p:cNvSpPr txBox="1"/>
+          <p:nvPr/>
+        </p:nvSpPr>
+        <p:spPr>
+          <a:xfrm>
+            <a:off x="2401493" y="3765215"/>
+            <a:ext cx="1070999" cy="369332"/>
+          </a:xfrm>
+          <a:prstGeom prst="rect">
+            <a:avLst/>
+          </a:prstGeom>
+          <a:noFill/>
+        </p:spPr>
+        <p:txBody>
+          <a:bodyPr wrap="none" rtlCol="0">
+            <a:spAutoFit/>
+          </a:bodyPr>
+          <a:lstStyle/>
+          <a:p>
+            <a:r>
+              <a:rPr kumimoji="1" lang="en-US" altLang="ko-Kore-KR" dirty="0">
+                <a:solidFill>
+                  <a:srgbClr val="FF0000"/>
+                </a:solidFill>
+              </a:rPr>
+              <a:t>Checked</a:t>
+            </a:r>
+            <a:endParaRPr kumimoji="1" lang="ko-Kore-KR" altLang="en-US" dirty="0">
+              <a:solidFill>
+                <a:srgbClr val="FF0000"/>
+              </a:solidFill>
+            </a:endParaRPr>
+          </a:p>
+        </p:txBody>
+      </p:sp>
+      <p:sp>
+        <p:nvSpPr>
+          <p:cNvPr id="12" name="오른쪽 중괄호[R] 11">
+            <a:extLst>
+              <a:ext uri="{FF2B5EF4-FFF2-40B4-BE49-F238E27FC236}">
+                <a16:creationId xmlns:a16="http://schemas.microsoft.com/office/drawing/2014/main" id="{D9FE012E-95C2-2540-B3E4-053D073C4BE3}"/>
+              </a:ext>
+            </a:extLst>
+          </p:cNvPr>
+          <p:cNvSpPr/>
+          <p:nvPr/>
+        </p:nvSpPr>
+        <p:spPr>
+          <a:xfrm rot="5400000">
+            <a:off x="7758325" y="3021296"/>
+            <a:ext cx="369332" cy="3494689"/>
+          </a:xfrm>
+          <a:prstGeom prst="rightBrace">
+            <a:avLst/>
+          </a:prstGeom>
+          <a:ln>
+            <a:solidFill>
+              <a:srgbClr val="FF0000"/>
+            </a:solidFill>
+          </a:ln>
+        </p:spPr>
+        <p:style>
+          <a:lnRef idx="1">
+            <a:schemeClr val="accent1"/>
+          </a:lnRef>
+          <a:fillRef idx="0">
+            <a:schemeClr val="accent1"/>
+          </a:fillRef>
+          <a:effectRef idx="0">
+            <a:schemeClr val="accent1"/>
+          </a:effectRef>
+          <a:fontRef idx="minor">
+            <a:schemeClr val="tx1"/>
+          </a:fontRef>
+        </p:style>
+        <p:txBody>
+          <a:bodyPr rtlCol="0" anchor="ctr"/>
+          <a:lstStyle/>
+          <a:p>
+            <a:pPr algn="ctr"/>
+            <a:endParaRPr kumimoji="1" lang="ko-Kore-KR" altLang="en-US"/>
+          </a:p>
+        </p:txBody>
+      </p:sp>
+      <p:sp>
+        <p:nvSpPr>
+          <p:cNvPr id="13" name="TextBox 12">
+            <a:extLst>
+              <a:ext uri="{FF2B5EF4-FFF2-40B4-BE49-F238E27FC236}">
+                <a16:creationId xmlns:a16="http://schemas.microsoft.com/office/drawing/2014/main" id="{4FBC4AA3-6D8B-6349-A930-CA7329F93D2C}"/>
+              </a:ext>
+            </a:extLst>
+          </p:cNvPr>
+          <p:cNvSpPr txBox="1"/>
+          <p:nvPr/>
+        </p:nvSpPr>
+        <p:spPr>
+          <a:xfrm>
+            <a:off x="7278450" y="4996077"/>
+            <a:ext cx="1329082" cy="369332"/>
+          </a:xfrm>
+          <a:prstGeom prst="rect">
+            <a:avLst/>
+          </a:prstGeom>
+          <a:noFill/>
+        </p:spPr>
+        <p:txBody>
+          <a:bodyPr wrap="none" rtlCol="0">
+            <a:spAutoFit/>
+          </a:bodyPr>
+          <a:lstStyle/>
+          <a:p>
+            <a:r>
+              <a:rPr kumimoji="1" lang="en-US" altLang="ko-Kore-KR" dirty="0">
+                <a:solidFill>
+                  <a:srgbClr val="FF0000"/>
+                </a:solidFill>
+              </a:rPr>
+              <a:t>Unchecked</a:t>
+            </a:r>
+            <a:endParaRPr kumimoji="1" lang="ko-Kore-KR" altLang="en-US" dirty="0">
+              <a:solidFill>
+                <a:srgbClr val="FF0000"/>
+              </a:solidFill>
+            </a:endParaRPr>
+          </a:p>
+        </p:txBody>
+      </p:sp>
+      <p:sp>
+        <p:nvSpPr>
+          <p:cNvPr id="14" name="모서리가 둥근 직사각형 13">
+            <a:extLst>
+              <a:ext uri="{FF2B5EF4-FFF2-40B4-BE49-F238E27FC236}">
+                <a16:creationId xmlns:a16="http://schemas.microsoft.com/office/drawing/2014/main" id="{6C2379FD-C47C-0748-969F-B4D5F2AE4200}"/>
+              </a:ext>
+            </a:extLst>
+          </p:cNvPr>
+          <p:cNvSpPr/>
+          <p:nvPr/>
+        </p:nvSpPr>
+        <p:spPr>
+          <a:xfrm>
+            <a:off x="4414345" y="888122"/>
+            <a:ext cx="2399531" cy="478221"/>
+          </a:xfrm>
+          <a:prstGeom prst="roundRect">
+            <a:avLst/>
+          </a:prstGeom>
+          <a:noFill/>
+          <a:ln w="28575">
+            <a:solidFill>
+              <a:schemeClr val="bg2">
+                <a:lumMod val="50000"/>
+              </a:schemeClr>
+            </a:solidFill>
+          </a:ln>
+        </p:spPr>
+        <p:style>
+          <a:lnRef idx="2">
+            <a:schemeClr val="accent1">
+              <a:shade val="50000"/>
+            </a:schemeClr>
+          </a:lnRef>
+          <a:fillRef idx="1">
+            <a:schemeClr val="accent1"/>
+          </a:fillRef>
+          <a:effectRef idx="0">
+            <a:schemeClr val="accent1"/>
+          </a:effectRef>
+          <a:fontRef idx="minor">
+            <a:schemeClr val="lt1"/>
+          </a:fontRef>
+        </p:style>
+        <p:txBody>
+          <a:bodyPr rtlCol="0" anchor="ctr"/>
+          <a:lstStyle/>
+          <a:p>
+            <a:pPr algn="ctr"/>
+            <a:endParaRPr kumimoji="1" lang="ko-Kore-KR" altLang="en-US"/>
+          </a:p>
+        </p:txBody>
+      </p:sp>
+      <p:sp>
+        <p:nvSpPr>
+          <p:cNvPr id="15" name="모서리가 둥근 직사각형 14">
+            <a:extLst>
+              <a:ext uri="{FF2B5EF4-FFF2-40B4-BE49-F238E27FC236}">
+                <a16:creationId xmlns:a16="http://schemas.microsoft.com/office/drawing/2014/main" id="{ED0A7842-5534-EF41-96A6-0B8F10B725CF}"/>
+              </a:ext>
+            </a:extLst>
+          </p:cNvPr>
+          <p:cNvSpPr/>
+          <p:nvPr/>
+        </p:nvSpPr>
+        <p:spPr>
+          <a:xfrm>
+            <a:off x="754885" y="2420737"/>
+            <a:ext cx="2112035" cy="478221"/>
+          </a:xfrm>
+          <a:prstGeom prst="roundRect">
+            <a:avLst/>
+          </a:prstGeom>
+          <a:noFill/>
+          <a:ln w="28575">
+            <a:solidFill>
+              <a:schemeClr val="bg2">
+                <a:lumMod val="50000"/>
+              </a:schemeClr>
+            </a:solidFill>
+          </a:ln>
+        </p:spPr>
+        <p:style>
+          <a:lnRef idx="2">
+            <a:schemeClr val="accent1">
+              <a:shade val="50000"/>
+            </a:schemeClr>
+          </a:lnRef>
+          <a:fillRef idx="1">
+            <a:schemeClr val="accent1"/>
+          </a:fillRef>
+          <a:effectRef idx="0">
+            <a:schemeClr val="accent1"/>
+          </a:effectRef>
+          <a:fontRef idx="minor">
+            <a:schemeClr val="lt1"/>
+          </a:fontRef>
+        </p:style>
+        <p:txBody>
+          <a:bodyPr rtlCol="0" anchor="ctr"/>
+          <a:lstStyle/>
+          <a:p>
+            <a:pPr algn="ctr"/>
+            <a:endParaRPr kumimoji="1" lang="ko-Kore-KR" altLang="en-US"/>
+          </a:p>
+        </p:txBody>
+      </p:sp>
+      <p:sp>
+        <p:nvSpPr>
+          <p:cNvPr id="16" name="모서리가 둥근 직사각형 15">
+            <a:extLst>
+              <a:ext uri="{FF2B5EF4-FFF2-40B4-BE49-F238E27FC236}">
+                <a16:creationId xmlns:a16="http://schemas.microsoft.com/office/drawing/2014/main" id="{18D70168-9CB6-014B-82AC-F3F39C65FF9D}"/>
+              </a:ext>
+            </a:extLst>
+          </p:cNvPr>
+          <p:cNvSpPr/>
+          <p:nvPr/>
+        </p:nvSpPr>
+        <p:spPr>
+          <a:xfrm>
+            <a:off x="3010669" y="2420737"/>
+            <a:ext cx="1994118" cy="478221"/>
+          </a:xfrm>
+          <a:prstGeom prst="roundRect">
+            <a:avLst/>
+          </a:prstGeom>
+          <a:noFill/>
+          <a:ln w="28575">
+            <a:solidFill>
+              <a:schemeClr val="bg2">
+                <a:lumMod val="50000"/>
+              </a:schemeClr>
+            </a:solidFill>
+          </a:ln>
+        </p:spPr>
+        <p:style>
+          <a:lnRef idx="2">
+            <a:schemeClr val="accent1">
+              <a:shade val="50000"/>
+            </a:schemeClr>
+          </a:lnRef>
+          <a:fillRef idx="1">
+            <a:schemeClr val="accent1"/>
+          </a:fillRef>
+          <a:effectRef idx="0">
+            <a:schemeClr val="accent1"/>
+          </a:effectRef>
+          <a:fontRef idx="minor">
+            <a:schemeClr val="lt1"/>
+          </a:fontRef>
+        </p:style>
+        <p:txBody>
+          <a:bodyPr rtlCol="0" anchor="ctr"/>
+          <a:lstStyle/>
+          <a:p>
+            <a:pPr algn="ctr"/>
+            <a:endParaRPr kumimoji="1" lang="ko-Kore-KR" altLang="en-US"/>
+          </a:p>
+        </p:txBody>
+      </p:sp>
+      <p:sp>
+        <p:nvSpPr>
+          <p:cNvPr id="17" name="모서리가 둥근 직사각형 16">
+            <a:extLst>
+              <a:ext uri="{FF2B5EF4-FFF2-40B4-BE49-F238E27FC236}">
+                <a16:creationId xmlns:a16="http://schemas.microsoft.com/office/drawing/2014/main" id="{42A62254-C47F-5248-AA5A-BB3A5CA31C7D}"/>
+              </a:ext>
+            </a:extLst>
+          </p:cNvPr>
+          <p:cNvSpPr/>
+          <p:nvPr/>
+        </p:nvSpPr>
+        <p:spPr>
+          <a:xfrm>
+            <a:off x="6686663" y="2420737"/>
+            <a:ext cx="2278661" cy="478221"/>
+          </a:xfrm>
+          <a:prstGeom prst="roundRect">
+            <a:avLst/>
+          </a:prstGeom>
+          <a:noFill/>
+          <a:ln w="28575">
+            <a:solidFill>
+              <a:schemeClr val="bg2">
+                <a:lumMod val="50000"/>
+              </a:schemeClr>
+            </a:solidFill>
+          </a:ln>
+        </p:spPr>
+        <p:style>
+          <a:lnRef idx="2">
+            <a:schemeClr val="accent1">
+              <a:shade val="50000"/>
+            </a:schemeClr>
+          </a:lnRef>
+          <a:fillRef idx="1">
+            <a:schemeClr val="accent1"/>
+          </a:fillRef>
+          <a:effectRef idx="0">
+            <a:schemeClr val="accent1"/>
+          </a:effectRef>
+          <a:fontRef idx="minor">
+            <a:schemeClr val="lt1"/>
+          </a:fontRef>
+        </p:style>
+        <p:txBody>
+          <a:bodyPr rtlCol="0" anchor="ctr"/>
+          <a:lstStyle/>
+          <a:p>
+            <a:pPr algn="ctr"/>
+            <a:endParaRPr kumimoji="1" lang="ko-Kore-KR" altLang="en-US"/>
+          </a:p>
+        </p:txBody>
+      </p:sp>
+      <p:sp>
+        <p:nvSpPr>
+          <p:cNvPr id="18" name="모서리가 둥근 직사각형 17">
+            <a:extLst>
+              <a:ext uri="{FF2B5EF4-FFF2-40B4-BE49-F238E27FC236}">
+                <a16:creationId xmlns:a16="http://schemas.microsoft.com/office/drawing/2014/main" id="{9B41F5EC-D7E5-5C49-95F1-B4E76FF63129}"/>
+              </a:ext>
+            </a:extLst>
+          </p:cNvPr>
+          <p:cNvSpPr/>
+          <p:nvPr/>
+        </p:nvSpPr>
+        <p:spPr>
+          <a:xfrm>
+            <a:off x="5456954" y="3895437"/>
+            <a:ext cx="1700592" cy="478221"/>
+          </a:xfrm>
+          <a:prstGeom prst="roundRect">
+            <a:avLst/>
+          </a:prstGeom>
+          <a:noFill/>
+          <a:ln w="28575">
+            <a:solidFill>
+              <a:schemeClr val="bg2">
+                <a:lumMod val="50000"/>
+              </a:schemeClr>
+            </a:solidFill>
+          </a:ln>
+        </p:spPr>
+        <p:style>
+          <a:lnRef idx="2">
+            <a:schemeClr val="accent1">
+              <a:shade val="50000"/>
+            </a:schemeClr>
+          </a:lnRef>
+          <a:fillRef idx="1">
+            <a:schemeClr val="accent1"/>
+          </a:fillRef>
+          <a:effectRef idx="0">
+            <a:schemeClr val="accent1"/>
+          </a:effectRef>
+          <a:fontRef idx="minor">
+            <a:schemeClr val="lt1"/>
+          </a:fontRef>
+        </p:style>
+        <p:txBody>
+          <a:bodyPr rtlCol="0" anchor="ctr"/>
+          <a:lstStyle/>
+          <a:p>
+            <a:pPr algn="ctr"/>
+            <a:endParaRPr kumimoji="1" lang="ko-Kore-KR" altLang="en-US"/>
+          </a:p>
+        </p:txBody>
+      </p:sp>
+      <p:sp>
+        <p:nvSpPr>
+          <p:cNvPr id="19" name="모서리가 둥근 직사각형 18">
+            <a:extLst>
+              <a:ext uri="{FF2B5EF4-FFF2-40B4-BE49-F238E27FC236}">
+                <a16:creationId xmlns:a16="http://schemas.microsoft.com/office/drawing/2014/main" id="{4090447C-32F1-B843-8A2A-E45F7C0217A8}"/>
+              </a:ext>
+            </a:extLst>
+          </p:cNvPr>
+          <p:cNvSpPr/>
+          <p:nvPr/>
+        </p:nvSpPr>
+        <p:spPr>
+          <a:xfrm>
+            <a:off x="7801809" y="3895437"/>
+            <a:ext cx="2909881" cy="478221"/>
+          </a:xfrm>
+          <a:prstGeom prst="roundRect">
+            <a:avLst/>
+          </a:prstGeom>
+          <a:noFill/>
+          <a:ln w="28575">
+            <a:solidFill>
+              <a:schemeClr val="bg2">
+                <a:lumMod val="50000"/>
+              </a:schemeClr>
+            </a:solidFill>
+          </a:ln>
+        </p:spPr>
+        <p:style>
+          <a:lnRef idx="2">
+            <a:schemeClr val="accent1">
+              <a:shade val="50000"/>
+            </a:schemeClr>
+          </a:lnRef>
+          <a:fillRef idx="1">
+            <a:schemeClr val="accent1"/>
+          </a:fillRef>
+          <a:effectRef idx="0">
+            <a:schemeClr val="accent1"/>
+          </a:effectRef>
+          <a:fontRef idx="minor">
+            <a:schemeClr val="lt1"/>
+          </a:fontRef>
+        </p:style>
+        <p:txBody>
+          <a:bodyPr rtlCol="0" anchor="ctr"/>
+          <a:lstStyle/>
+          <a:p>
+            <a:pPr algn="ctr"/>
+            <a:endParaRPr kumimoji="1" lang="ko-Kore-KR" altLang="en-US"/>
+          </a:p>
+        </p:txBody>
+      </p:sp>
+      <p:cxnSp>
+        <p:nvCxnSpPr>
+          <p:cNvPr id="21" name="직선 연결선[R] 20">
+            <a:extLst>
+              <a:ext uri="{FF2B5EF4-FFF2-40B4-BE49-F238E27FC236}">
+                <a16:creationId xmlns:a16="http://schemas.microsoft.com/office/drawing/2014/main" id="{4683D7B8-4918-034D-9A53-2031178E0229}"/>
+              </a:ext>
+            </a:extLst>
+          </p:cNvPr>
+          <p:cNvCxnSpPr/>
+          <p:nvPr/>
+        </p:nvCxnSpPr>
+        <p:spPr>
+          <a:xfrm>
+            <a:off x="1810903" y="1860330"/>
+            <a:ext cx="6057132" cy="0"/>
+          </a:xfrm>
+          <a:prstGeom prst="line">
+            <a:avLst/>
+          </a:prstGeom>
+          <a:ln w="19050"/>
+        </p:spPr>
+        <p:style>
+          <a:lnRef idx="1">
+            <a:schemeClr val="dk1"/>
+          </a:lnRef>
+          <a:fillRef idx="0">
+            <a:schemeClr val="dk1"/>
+          </a:fillRef>
+          <a:effectRef idx="0">
+            <a:schemeClr val="dk1"/>
+          </a:effectRef>
+          <a:fontRef idx="minor">
+            <a:schemeClr val="tx1"/>
+          </a:fontRef>
+        </p:style>
+      </p:cxnSp>
+      <p:cxnSp>
+        <p:nvCxnSpPr>
+          <p:cNvPr id="22" name="직선 연결선[R] 21">
+            <a:extLst>
+              <a:ext uri="{FF2B5EF4-FFF2-40B4-BE49-F238E27FC236}">
+                <a16:creationId xmlns:a16="http://schemas.microsoft.com/office/drawing/2014/main" id="{AF63BFB7-9B89-1648-A79B-B0AC1B64AF32}"/>
+              </a:ext>
+            </a:extLst>
+          </p:cNvPr>
+          <p:cNvCxnSpPr>
+            <a:cxnSpLocks/>
+          </p:cNvCxnSpPr>
+          <p:nvPr/>
+        </p:nvCxnSpPr>
+        <p:spPr>
+          <a:xfrm>
+            <a:off x="6300749" y="3423744"/>
+            <a:ext cx="2906313" cy="0"/>
+          </a:xfrm>
+          <a:prstGeom prst="line">
+            <a:avLst/>
+          </a:prstGeom>
+          <a:ln w="19050"/>
+        </p:spPr>
+        <p:style>
+          <a:lnRef idx="1">
+            <a:schemeClr val="dk1"/>
+          </a:lnRef>
+          <a:fillRef idx="0">
+            <a:schemeClr val="dk1"/>
+          </a:fillRef>
+          <a:effectRef idx="0">
+            <a:schemeClr val="dk1"/>
+          </a:effectRef>
+          <a:fontRef idx="minor">
+            <a:schemeClr val="tx1"/>
+          </a:fontRef>
+        </p:style>
+      </p:cxnSp>
+      <p:cxnSp>
+        <p:nvCxnSpPr>
+          <p:cNvPr id="25" name="직선 화살표 연결선 24">
+            <a:extLst>
+              <a:ext uri="{FF2B5EF4-FFF2-40B4-BE49-F238E27FC236}">
+                <a16:creationId xmlns:a16="http://schemas.microsoft.com/office/drawing/2014/main" id="{9736A7AC-EF6B-5644-A2E9-7612C21F3F7B}"/>
+              </a:ext>
+            </a:extLst>
+          </p:cNvPr>
+          <p:cNvCxnSpPr>
+            <a:endCxn id="14" idx="2"/>
+          </p:cNvCxnSpPr>
+          <p:nvPr/>
+        </p:nvCxnSpPr>
+        <p:spPr>
+          <a:xfrm flipH="1" flipV="1">
+            <a:off x="5614111" y="1366343"/>
+            <a:ext cx="1586" cy="493987"/>
+          </a:xfrm>
+          <a:prstGeom prst="straightConnector1">
+            <a:avLst/>
+          </a:prstGeom>
+          <a:ln w="19050">
+            <a:tailEnd type="triangle"/>
+          </a:ln>
+        </p:spPr>
+        <p:style>
+          <a:lnRef idx="1">
+            <a:schemeClr val="dk1"/>
+          </a:lnRef>
+          <a:fillRef idx="0">
+            <a:schemeClr val="dk1"/>
+          </a:fillRef>
+          <a:effectRef idx="0">
+            <a:schemeClr val="dk1"/>
+          </a:effectRef>
+          <a:fontRef idx="minor">
+            <a:schemeClr val="tx1"/>
+          </a:fontRef>
+        </p:style>
+      </p:cxnSp>
+      <p:cxnSp>
+        <p:nvCxnSpPr>
+          <p:cNvPr id="27" name="직선 연결선[R] 26">
+            <a:extLst>
+              <a:ext uri="{FF2B5EF4-FFF2-40B4-BE49-F238E27FC236}">
+                <a16:creationId xmlns:a16="http://schemas.microsoft.com/office/drawing/2014/main" id="{4ECB8727-A7CF-3945-93F1-8BA52EF1C899}"/>
+              </a:ext>
+            </a:extLst>
+          </p:cNvPr>
+          <p:cNvCxnSpPr>
+            <a:cxnSpLocks/>
+            <a:endCxn id="15" idx="0"/>
+          </p:cNvCxnSpPr>
+          <p:nvPr/>
+        </p:nvCxnSpPr>
+        <p:spPr>
+          <a:xfrm>
+            <a:off x="1810903" y="1860330"/>
+            <a:ext cx="0" cy="560407"/>
+          </a:xfrm>
+          <a:prstGeom prst="line">
+            <a:avLst/>
+          </a:prstGeom>
+          <a:ln w="19050"/>
+        </p:spPr>
+        <p:style>
+          <a:lnRef idx="1">
+            <a:schemeClr val="dk1"/>
+          </a:lnRef>
+          <a:fillRef idx="0">
+            <a:schemeClr val="dk1"/>
+          </a:fillRef>
+          <a:effectRef idx="0">
+            <a:schemeClr val="dk1"/>
+          </a:effectRef>
+          <a:fontRef idx="minor">
+            <a:schemeClr val="tx1"/>
+          </a:fontRef>
+        </p:style>
+      </p:cxnSp>
+      <p:cxnSp>
+        <p:nvCxnSpPr>
+          <p:cNvPr id="31" name="직선 연결선[R] 30">
+            <a:extLst>
+              <a:ext uri="{FF2B5EF4-FFF2-40B4-BE49-F238E27FC236}">
+                <a16:creationId xmlns:a16="http://schemas.microsoft.com/office/drawing/2014/main" id="{0B7130EF-21BC-654C-8AF8-4579B1EC6ADD}"/>
+              </a:ext>
+            </a:extLst>
+          </p:cNvPr>
+          <p:cNvCxnSpPr>
+            <a:cxnSpLocks/>
+          </p:cNvCxnSpPr>
+          <p:nvPr/>
+        </p:nvCxnSpPr>
+        <p:spPr>
+          <a:xfrm>
+            <a:off x="3986544" y="1860330"/>
+            <a:ext cx="0" cy="560407"/>
+          </a:xfrm>
+          <a:prstGeom prst="line">
+            <a:avLst/>
+          </a:prstGeom>
+          <a:ln w="19050"/>
+        </p:spPr>
+        <p:style>
+          <a:lnRef idx="1">
+            <a:schemeClr val="dk1"/>
+          </a:lnRef>
+          <a:fillRef idx="0">
+            <a:schemeClr val="dk1"/>
+          </a:fillRef>
+          <a:effectRef idx="0">
+            <a:schemeClr val="dk1"/>
+          </a:effectRef>
+          <a:fontRef idx="minor">
+            <a:schemeClr val="tx1"/>
+          </a:fontRef>
+        </p:style>
+      </p:cxnSp>
+      <p:cxnSp>
+        <p:nvCxnSpPr>
+          <p:cNvPr id="32" name="직선 연결선[R] 31">
+            <a:extLst>
+              <a:ext uri="{FF2B5EF4-FFF2-40B4-BE49-F238E27FC236}">
+                <a16:creationId xmlns:a16="http://schemas.microsoft.com/office/drawing/2014/main" id="{25AFCD38-4376-A043-82C8-AB2562A23D7B}"/>
+              </a:ext>
+            </a:extLst>
+          </p:cNvPr>
+          <p:cNvCxnSpPr>
+            <a:cxnSpLocks/>
+          </p:cNvCxnSpPr>
+          <p:nvPr/>
+        </p:nvCxnSpPr>
+        <p:spPr>
+          <a:xfrm>
+            <a:off x="7864869" y="1860330"/>
+            <a:ext cx="0" cy="560407"/>
+          </a:xfrm>
+          <a:prstGeom prst="line">
+            <a:avLst/>
+          </a:prstGeom>
+          <a:ln w="19050"/>
+        </p:spPr>
+        <p:style>
+          <a:lnRef idx="1">
+            <a:schemeClr val="dk1"/>
+          </a:lnRef>
+          <a:fillRef idx="0">
+            <a:schemeClr val="dk1"/>
+          </a:fillRef>
+          <a:effectRef idx="0">
+            <a:schemeClr val="dk1"/>
+          </a:effectRef>
+          <a:fontRef idx="minor">
+            <a:schemeClr val="tx1"/>
+          </a:fontRef>
+        </p:style>
+      </p:cxnSp>
+      <p:cxnSp>
+        <p:nvCxnSpPr>
+          <p:cNvPr id="33" name="직선 연결선[R] 32">
+            <a:extLst>
+              <a:ext uri="{FF2B5EF4-FFF2-40B4-BE49-F238E27FC236}">
+                <a16:creationId xmlns:a16="http://schemas.microsoft.com/office/drawing/2014/main" id="{48831432-3769-4C46-A5A2-B031F3E93B8A}"/>
+              </a:ext>
+            </a:extLst>
+          </p:cNvPr>
+          <p:cNvCxnSpPr>
+            <a:cxnSpLocks/>
+          </p:cNvCxnSpPr>
+          <p:nvPr/>
+        </p:nvCxnSpPr>
+        <p:spPr>
+          <a:xfrm>
+            <a:off x="6309136" y="3423744"/>
+            <a:ext cx="0" cy="471693"/>
+          </a:xfrm>
+          <a:prstGeom prst="line">
+            <a:avLst/>
+          </a:prstGeom>
+          <a:ln w="19050"/>
+        </p:spPr>
+        <p:style>
+          <a:lnRef idx="1">
+            <a:schemeClr val="dk1"/>
+          </a:lnRef>
+          <a:fillRef idx="0">
+            <a:schemeClr val="dk1"/>
+          </a:fillRef>
+          <a:effectRef idx="0">
+            <a:schemeClr val="dk1"/>
+          </a:effectRef>
+          <a:fontRef idx="minor">
+            <a:schemeClr val="tx1"/>
+          </a:fontRef>
+        </p:style>
+      </p:cxnSp>
+      <p:cxnSp>
+        <p:nvCxnSpPr>
+          <p:cNvPr id="36" name="직선 연결선[R] 35">
+            <a:extLst>
+              <a:ext uri="{FF2B5EF4-FFF2-40B4-BE49-F238E27FC236}">
+                <a16:creationId xmlns:a16="http://schemas.microsoft.com/office/drawing/2014/main" id="{98F6A650-EC7E-C54A-8E5C-41C652E1FD68}"/>
+              </a:ext>
+            </a:extLst>
+          </p:cNvPr>
+          <p:cNvCxnSpPr>
+            <a:cxnSpLocks/>
+          </p:cNvCxnSpPr>
+          <p:nvPr/>
+        </p:nvCxnSpPr>
+        <p:spPr>
+          <a:xfrm>
+            <a:off x="9207062" y="3423744"/>
+            <a:ext cx="0" cy="471693"/>
+          </a:xfrm>
+          <a:prstGeom prst="line">
+            <a:avLst/>
+          </a:prstGeom>
+          <a:ln w="19050"/>
+        </p:spPr>
+        <p:style>
+          <a:lnRef idx="1">
+            <a:schemeClr val="dk1"/>
+          </a:lnRef>
+          <a:fillRef idx="0">
+            <a:schemeClr val="dk1"/>
+          </a:fillRef>
+          <a:effectRef idx="0">
+            <a:schemeClr val="dk1"/>
+          </a:effectRef>
+          <a:fontRef idx="minor">
+            <a:schemeClr val="tx1"/>
+          </a:fontRef>
+        </p:style>
+      </p:cxnSp>
+      <p:cxnSp>
+        <p:nvCxnSpPr>
+          <p:cNvPr id="37" name="직선 연결선[R] 36">
+            <a:extLst>
+              <a:ext uri="{FF2B5EF4-FFF2-40B4-BE49-F238E27FC236}">
+                <a16:creationId xmlns:a16="http://schemas.microsoft.com/office/drawing/2014/main" id="{4818760C-D0D3-3943-9619-C937EC450A56}"/>
+              </a:ext>
+            </a:extLst>
+          </p:cNvPr>
+          <p:cNvCxnSpPr>
+            <a:cxnSpLocks/>
+          </p:cNvCxnSpPr>
+          <p:nvPr/>
+        </p:nvCxnSpPr>
+        <p:spPr>
+          <a:xfrm>
+            <a:off x="7864869" y="2898958"/>
+            <a:ext cx="0" cy="524786"/>
+          </a:xfrm>
+          <a:prstGeom prst="line">
+            <a:avLst/>
+          </a:prstGeom>
+          <a:ln w="19050"/>
+        </p:spPr>
+        <p:style>
+          <a:lnRef idx="1">
+            <a:schemeClr val="dk1"/>
+          </a:lnRef>
+          <a:fillRef idx="0">
+            <a:schemeClr val="dk1"/>
+          </a:fillRef>
+          <a:effectRef idx="0">
+            <a:schemeClr val="dk1"/>
+          </a:effectRef>
+          <a:fontRef idx="minor">
+            <a:schemeClr val="tx1"/>
+          </a:fontRef>
+        </p:style>
+      </p:cxnSp>
+    </p:spTree>
+    <p:extLst>
+      <p:ext uri="{BB962C8B-B14F-4D97-AF65-F5344CB8AC3E}">
+        <p14:creationId xmlns:p14="http://schemas.microsoft.com/office/powerpoint/2010/main" val="2549703995"/>
+      </p:ext>
+    </p:extLst>
+  </p:cSld>
+  <p:clrMapOvr>
+    <a:masterClrMapping/>
+  </p:clrMapOvr>
+</p:sld>
+</file>
+
+<file path=ppt/slides/slide6.xml><?xml version="1.0" encoding="utf-8"?>
+<p:sld xmlns:a="http://schemas.openxmlformats.org/drawingml/2006/main" xmlns:r="http://schemas.openxmlformats.org/officeDocument/2006/relationships" xmlns:p="http://schemas.openxmlformats.org/presentationml/2006/main">
+  <p:cSld>
+    <p:spTree>
+      <p:nvGrpSpPr>
+        <p:cNvPr id="1" name=""/>
+        <p:cNvGrpSpPr/>
+        <p:nvPr/>
+      </p:nvGrpSpPr>
+      <p:grpSpPr>
+        <a:xfrm>
+          <a:off x="0" y="0"/>
+          <a:ext cx="0" cy="0"/>
+          <a:chOff x="0" y="0"/>
+          <a:chExt cx="0" cy="0"/>
+        </a:xfrm>
+      </p:grpSpPr>
+      <p:sp>
+        <p:nvSpPr>
+          <p:cNvPr id="28" name="모서리가 둥근 직사각형 27">
+            <a:extLst>
+              <a:ext uri="{FF2B5EF4-FFF2-40B4-BE49-F238E27FC236}">
+                <a16:creationId xmlns:a16="http://schemas.microsoft.com/office/drawing/2014/main" id="{7F559FD1-C241-3C42-A96D-9C20EB7A0A45}"/>
+              </a:ext>
+            </a:extLst>
+          </p:cNvPr>
+          <p:cNvSpPr/>
+          <p:nvPr/>
+        </p:nvSpPr>
+        <p:spPr>
+          <a:xfrm>
+            <a:off x="3360978" y="471364"/>
+            <a:ext cx="2452176" cy="453509"/>
+          </a:xfrm>
+          <a:prstGeom prst="roundRect">
+            <a:avLst/>
+          </a:prstGeom>
+          <a:noFill/>
+          <a:ln w="28575">
+            <a:solidFill>
+              <a:schemeClr val="bg2">
+                <a:lumMod val="25000"/>
+              </a:schemeClr>
+            </a:solidFill>
+          </a:ln>
+        </p:spPr>
+        <p:style>
+          <a:lnRef idx="2">
+            <a:schemeClr val="accent1">
+              <a:shade val="50000"/>
+            </a:schemeClr>
+          </a:lnRef>
+          <a:fillRef idx="1">
+            <a:schemeClr val="accent1"/>
+          </a:fillRef>
+          <a:effectRef idx="0">
+            <a:schemeClr val="accent1"/>
+          </a:effectRef>
+          <a:fontRef idx="minor">
+            <a:schemeClr val="lt1"/>
+          </a:fontRef>
+        </p:style>
+        <p:txBody>
+          <a:bodyPr rtlCol="0" anchor="ctr"/>
+          <a:lstStyle/>
+          <a:p>
+            <a:pPr algn="ctr"/>
+            <a:r>
+              <a:rPr kumimoji="1" lang="en-US" altLang="en-US" dirty="0">
+                <a:solidFill>
+                  <a:schemeClr val="tx1"/>
+                </a:solidFill>
+              </a:rPr>
+              <a:t>Object</a:t>
+            </a:r>
+            <a:endParaRPr kumimoji="1" lang="ko-Kore-KR" altLang="en-US">
+              <a:solidFill>
+                <a:schemeClr val="tx1"/>
+              </a:solidFill>
+            </a:endParaRPr>
+          </a:p>
+        </p:txBody>
+      </p:sp>
+      <p:sp>
+        <p:nvSpPr>
+          <p:cNvPr id="30" name="모서리가 둥근 직사각형 29">
+            <a:extLst>
+              <a:ext uri="{FF2B5EF4-FFF2-40B4-BE49-F238E27FC236}">
+                <a16:creationId xmlns:a16="http://schemas.microsoft.com/office/drawing/2014/main" id="{2CA276CA-B97F-6147-AA80-0ED040BE7AF8}"/>
+              </a:ext>
+            </a:extLst>
+          </p:cNvPr>
+          <p:cNvSpPr/>
+          <p:nvPr/>
+        </p:nvSpPr>
+        <p:spPr>
+          <a:xfrm>
+            <a:off x="3360978" y="1421537"/>
+            <a:ext cx="2452176" cy="453509"/>
+          </a:xfrm>
+          <a:prstGeom prst="roundRect">
+            <a:avLst/>
+          </a:prstGeom>
+          <a:noFill/>
+          <a:ln w="28575">
+            <a:solidFill>
+              <a:schemeClr val="bg2">
+                <a:lumMod val="25000"/>
+              </a:schemeClr>
+            </a:solidFill>
+          </a:ln>
+        </p:spPr>
+        <p:style>
+          <a:lnRef idx="2">
+            <a:schemeClr val="accent1">
+              <a:shade val="50000"/>
+            </a:schemeClr>
+          </a:lnRef>
+          <a:fillRef idx="1">
+            <a:schemeClr val="accent1"/>
+          </a:fillRef>
+          <a:effectRef idx="0">
+            <a:schemeClr val="accent1"/>
+          </a:effectRef>
+          <a:fontRef idx="minor">
+            <a:schemeClr val="lt1"/>
+          </a:fontRef>
+        </p:style>
+        <p:txBody>
+          <a:bodyPr rtlCol="0" anchor="ctr"/>
+          <a:lstStyle/>
+          <a:p>
+            <a:pPr algn="ctr"/>
+            <a:r>
+              <a:rPr kumimoji="1" lang="en-US" altLang="en-US" dirty="0">
+                <a:solidFill>
+                  <a:schemeClr val="tx1"/>
+                </a:solidFill>
+              </a:rPr>
+              <a:t>Throwable</a:t>
+            </a:r>
+            <a:endParaRPr kumimoji="1" lang="ko-Kore-KR" altLang="en-US">
+              <a:solidFill>
+                <a:schemeClr val="tx1"/>
+              </a:solidFill>
+            </a:endParaRPr>
+          </a:p>
+        </p:txBody>
+      </p:sp>
+      <p:sp>
+        <p:nvSpPr>
+          <p:cNvPr id="34" name="모서리가 둥근 직사각형 33">
+            <a:extLst>
+              <a:ext uri="{FF2B5EF4-FFF2-40B4-BE49-F238E27FC236}">
+                <a16:creationId xmlns:a16="http://schemas.microsoft.com/office/drawing/2014/main" id="{9DCA4924-76D5-5147-BD31-47DF57B6DA0C}"/>
+              </a:ext>
+            </a:extLst>
+          </p:cNvPr>
+          <p:cNvSpPr/>
+          <p:nvPr/>
+        </p:nvSpPr>
+        <p:spPr>
+          <a:xfrm>
+            <a:off x="1117542" y="2800184"/>
+            <a:ext cx="2452176" cy="453509"/>
+          </a:xfrm>
+          <a:prstGeom prst="roundRect">
+            <a:avLst/>
+          </a:prstGeom>
+          <a:noFill/>
+          <a:ln w="28575">
+            <a:solidFill>
+              <a:schemeClr val="bg2">
+                <a:lumMod val="25000"/>
+              </a:schemeClr>
+            </a:solidFill>
+          </a:ln>
+        </p:spPr>
+        <p:style>
+          <a:lnRef idx="2">
+            <a:schemeClr val="accent1">
+              <a:shade val="50000"/>
+            </a:schemeClr>
+          </a:lnRef>
+          <a:fillRef idx="1">
+            <a:schemeClr val="accent1"/>
+          </a:fillRef>
+          <a:effectRef idx="0">
+            <a:schemeClr val="accent1"/>
+          </a:effectRef>
+          <a:fontRef idx="minor">
+            <a:schemeClr val="lt1"/>
+          </a:fontRef>
+        </p:style>
+        <p:txBody>
+          <a:bodyPr rtlCol="0" anchor="ctr"/>
+          <a:lstStyle/>
+          <a:p>
+            <a:pPr algn="ctr"/>
+            <a:r>
+              <a:rPr kumimoji="1" lang="en-US" altLang="en-US" dirty="0">
+                <a:solidFill>
+                  <a:schemeClr val="tx1"/>
+                </a:solidFill>
+              </a:rPr>
+              <a:t>Error</a:t>
+            </a:r>
+            <a:endParaRPr kumimoji="1" lang="ko-Kore-KR" altLang="en-US">
+              <a:solidFill>
+                <a:schemeClr val="tx1"/>
+              </a:solidFill>
+            </a:endParaRPr>
+          </a:p>
+        </p:txBody>
+      </p:sp>
+      <p:sp>
+        <p:nvSpPr>
+          <p:cNvPr id="35" name="모서리가 둥근 직사각형 34">
+            <a:extLst>
+              <a:ext uri="{FF2B5EF4-FFF2-40B4-BE49-F238E27FC236}">
+                <a16:creationId xmlns:a16="http://schemas.microsoft.com/office/drawing/2014/main" id="{093F979F-8D68-7F48-8097-F962E9DCB0D7}"/>
+              </a:ext>
+            </a:extLst>
+          </p:cNvPr>
+          <p:cNvSpPr/>
+          <p:nvPr/>
+        </p:nvSpPr>
+        <p:spPr>
+          <a:xfrm>
+            <a:off x="5788440" y="2803191"/>
+            <a:ext cx="2452176" cy="453509"/>
+          </a:xfrm>
+          <a:prstGeom prst="roundRect">
+            <a:avLst/>
+          </a:prstGeom>
+          <a:noFill/>
+          <a:ln w="28575">
+            <a:solidFill>
+              <a:schemeClr val="bg2">
+                <a:lumMod val="25000"/>
+              </a:schemeClr>
+            </a:solidFill>
+          </a:ln>
+        </p:spPr>
+        <p:style>
+          <a:lnRef idx="2">
+            <a:schemeClr val="accent1">
+              <a:shade val="50000"/>
+            </a:schemeClr>
+          </a:lnRef>
+          <a:fillRef idx="1">
+            <a:schemeClr val="accent1"/>
+          </a:fillRef>
+          <a:effectRef idx="0">
+            <a:schemeClr val="accent1"/>
+          </a:effectRef>
+          <a:fontRef idx="minor">
+            <a:schemeClr val="lt1"/>
+          </a:fontRef>
+        </p:style>
+        <p:txBody>
+          <a:bodyPr rtlCol="0" anchor="ctr"/>
+          <a:lstStyle/>
+          <a:p>
+            <a:pPr algn="ctr"/>
+            <a:r>
+              <a:rPr kumimoji="1" lang="en-US" altLang="en-US" dirty="0">
+                <a:solidFill>
+                  <a:schemeClr val="tx1"/>
+                </a:solidFill>
+              </a:rPr>
+              <a:t>Exception</a:t>
+            </a:r>
+            <a:endParaRPr kumimoji="1" lang="ko-Kore-KR" altLang="en-US">
+              <a:solidFill>
+                <a:schemeClr val="tx1"/>
+              </a:solidFill>
+            </a:endParaRPr>
+          </a:p>
+        </p:txBody>
+      </p:sp>
+      <p:sp>
+        <p:nvSpPr>
+          <p:cNvPr id="38" name="모서리가 둥근 직사각형 37">
+            <a:extLst>
+              <a:ext uri="{FF2B5EF4-FFF2-40B4-BE49-F238E27FC236}">
+                <a16:creationId xmlns:a16="http://schemas.microsoft.com/office/drawing/2014/main" id="{5B94D494-174D-9A48-962B-4839C33B44D0}"/>
+              </a:ext>
+            </a:extLst>
+          </p:cNvPr>
+          <p:cNvSpPr/>
+          <p:nvPr/>
+        </p:nvSpPr>
+        <p:spPr>
+          <a:xfrm>
+            <a:off x="8495376" y="4465940"/>
+            <a:ext cx="2909179" cy="453509"/>
+          </a:xfrm>
+          <a:prstGeom prst="roundRect">
+            <a:avLst/>
+          </a:prstGeom>
+          <a:noFill/>
+          <a:ln w="28575">
+            <a:solidFill>
+              <a:schemeClr val="bg2">
+                <a:lumMod val="25000"/>
+              </a:schemeClr>
+            </a:solidFill>
+          </a:ln>
+        </p:spPr>
+        <p:style>
+          <a:lnRef idx="2">
+            <a:schemeClr val="accent1">
+              <a:shade val="50000"/>
+            </a:schemeClr>
+          </a:lnRef>
+          <a:fillRef idx="1">
+            <a:schemeClr val="accent1"/>
+          </a:fillRef>
+          <a:effectRef idx="0">
+            <a:schemeClr val="accent1"/>
+          </a:effectRef>
+          <a:fontRef idx="minor">
+            <a:schemeClr val="lt1"/>
+          </a:fontRef>
+        </p:style>
+        <p:txBody>
+          <a:bodyPr rtlCol="0" anchor="ctr"/>
+          <a:lstStyle/>
+          <a:p>
+            <a:pPr algn="ctr"/>
+            <a:r>
+              <a:rPr kumimoji="1" lang="en-US" altLang="en-US" dirty="0" err="1">
+                <a:solidFill>
+                  <a:schemeClr val="tx1"/>
+                </a:solidFill>
+              </a:rPr>
+              <a:t>NullPointerException</a:t>
+            </a:r>
+            <a:endParaRPr kumimoji="1" lang="ko-Kore-KR" altLang="en-US">
+              <a:solidFill>
+                <a:schemeClr val="tx1"/>
+              </a:solidFill>
+            </a:endParaRPr>
+          </a:p>
+        </p:txBody>
+      </p:sp>
+      <p:sp>
+        <p:nvSpPr>
+          <p:cNvPr id="39" name="모서리가 둥근 직사각형 38">
+            <a:extLst>
+              <a:ext uri="{FF2B5EF4-FFF2-40B4-BE49-F238E27FC236}">
+                <a16:creationId xmlns:a16="http://schemas.microsoft.com/office/drawing/2014/main" id="{F9DE806A-66AC-4941-B8AA-062DE455432F}"/>
+              </a:ext>
+            </a:extLst>
+          </p:cNvPr>
+          <p:cNvSpPr/>
+          <p:nvPr/>
+        </p:nvSpPr>
+        <p:spPr>
+          <a:xfrm>
+            <a:off x="8495377" y="5357992"/>
+            <a:ext cx="2909180" cy="453509"/>
+          </a:xfrm>
+          <a:prstGeom prst="roundRect">
+            <a:avLst/>
+          </a:prstGeom>
+          <a:noFill/>
+          <a:ln w="28575">
+            <a:solidFill>
+              <a:schemeClr val="bg2">
+                <a:lumMod val="50000"/>
+              </a:schemeClr>
+            </a:solidFill>
+          </a:ln>
+        </p:spPr>
+        <p:style>
+          <a:lnRef idx="2">
+            <a:schemeClr val="accent1">
+              <a:shade val="50000"/>
+            </a:schemeClr>
+          </a:lnRef>
+          <a:fillRef idx="1">
+            <a:schemeClr val="accent1"/>
+          </a:fillRef>
+          <a:effectRef idx="0">
+            <a:schemeClr val="accent1"/>
+          </a:effectRef>
+          <a:fontRef idx="minor">
+            <a:schemeClr val="lt1"/>
+          </a:fontRef>
+        </p:style>
+        <p:txBody>
+          <a:bodyPr rtlCol="0" anchor="ctr"/>
+          <a:lstStyle/>
+          <a:p>
+            <a:pPr algn="ctr"/>
+            <a:r>
+              <a:rPr kumimoji="1" lang="en-US" altLang="ko-Kore-KR" dirty="0" err="1">
+                <a:solidFill>
+                  <a:schemeClr val="tx1"/>
+                </a:solidFill>
+              </a:rPr>
+              <a:t>ArrayIndexOutOfBounds</a:t>
+            </a:r>
+            <a:endParaRPr kumimoji="1" lang="ko-Kore-KR" altLang="en-US">
+              <a:solidFill>
+                <a:schemeClr val="tx1"/>
+              </a:solidFill>
+            </a:endParaRPr>
+          </a:p>
+        </p:txBody>
+      </p:sp>
+      <p:sp>
+        <p:nvSpPr>
+          <p:cNvPr id="40" name="모서리가 둥근 직사각형 39">
+            <a:extLst>
+              <a:ext uri="{FF2B5EF4-FFF2-40B4-BE49-F238E27FC236}">
+                <a16:creationId xmlns:a16="http://schemas.microsoft.com/office/drawing/2014/main" id="{88097E0B-0BCB-4641-9139-AEF1DD519ADC}"/>
+              </a:ext>
+            </a:extLst>
+          </p:cNvPr>
+          <p:cNvSpPr/>
+          <p:nvPr/>
+        </p:nvSpPr>
+        <p:spPr>
+          <a:xfrm>
+            <a:off x="3451009" y="5352580"/>
+            <a:ext cx="2927202" cy="453509"/>
+          </a:xfrm>
+          <a:prstGeom prst="roundRect">
+            <a:avLst/>
+          </a:prstGeom>
+          <a:noFill/>
+          <a:ln w="28575">
+            <a:solidFill>
+              <a:schemeClr val="bg2">
+                <a:lumMod val="25000"/>
+              </a:schemeClr>
+            </a:solidFill>
+          </a:ln>
+        </p:spPr>
+        <p:style>
+          <a:lnRef idx="2">
+            <a:schemeClr val="accent1">
+              <a:shade val="50000"/>
+            </a:schemeClr>
+          </a:lnRef>
+          <a:fillRef idx="1">
+            <a:schemeClr val="accent1"/>
+          </a:fillRef>
+          <a:effectRef idx="0">
+            <a:schemeClr val="accent1"/>
+          </a:effectRef>
+          <a:fontRef idx="minor">
+            <a:schemeClr val="lt1"/>
+          </a:fontRef>
+        </p:style>
+        <p:txBody>
+          <a:bodyPr rtlCol="0" anchor="ctr"/>
+          <a:lstStyle/>
+          <a:p>
+            <a:pPr algn="ctr"/>
+            <a:r>
+              <a:rPr kumimoji="1" lang="en-US" altLang="en-US" dirty="0" err="1">
+                <a:solidFill>
+                  <a:schemeClr val="tx1"/>
+                </a:solidFill>
+              </a:rPr>
+              <a:t>NoSuchMethodExeption</a:t>
+            </a:r>
+            <a:endParaRPr kumimoji="1" lang="ko-Kore-KR" altLang="en-US">
+              <a:solidFill>
+                <a:schemeClr val="tx1"/>
+              </a:solidFill>
+            </a:endParaRPr>
+          </a:p>
+        </p:txBody>
+      </p:sp>
+      <p:sp>
+        <p:nvSpPr>
+          <p:cNvPr id="41" name="모서리가 둥근 직사각형 40">
+            <a:extLst>
+              <a:ext uri="{FF2B5EF4-FFF2-40B4-BE49-F238E27FC236}">
+                <a16:creationId xmlns:a16="http://schemas.microsoft.com/office/drawing/2014/main" id="{9C6B7FC0-8810-9048-A0FB-F8B38245E5F3}"/>
+              </a:ext>
+            </a:extLst>
+          </p:cNvPr>
+          <p:cNvSpPr/>
+          <p:nvPr/>
+        </p:nvSpPr>
+        <p:spPr>
+          <a:xfrm>
+            <a:off x="3451009" y="4507344"/>
+            <a:ext cx="2927202" cy="453509"/>
+          </a:xfrm>
+          <a:prstGeom prst="roundRect">
+            <a:avLst/>
+          </a:prstGeom>
+          <a:noFill/>
+          <a:ln w="28575">
+            <a:solidFill>
+              <a:schemeClr val="bg2">
+                <a:lumMod val="25000"/>
+              </a:schemeClr>
+            </a:solidFill>
+          </a:ln>
+        </p:spPr>
+        <p:style>
+          <a:lnRef idx="2">
+            <a:schemeClr val="accent1">
+              <a:shade val="50000"/>
+            </a:schemeClr>
+          </a:lnRef>
+          <a:fillRef idx="1">
+            <a:schemeClr val="accent1"/>
+          </a:fillRef>
+          <a:effectRef idx="0">
+            <a:schemeClr val="accent1"/>
+          </a:effectRef>
+          <a:fontRef idx="minor">
+            <a:schemeClr val="lt1"/>
+          </a:fontRef>
+        </p:style>
+        <p:txBody>
+          <a:bodyPr rtlCol="0" anchor="ctr"/>
+          <a:lstStyle/>
+          <a:p>
+            <a:pPr algn="ctr"/>
+            <a:r>
+              <a:rPr kumimoji="1" lang="en-US" altLang="en-US" dirty="0" err="1">
+                <a:solidFill>
+                  <a:schemeClr val="tx1"/>
+                </a:solidFill>
+              </a:rPr>
+              <a:t>ClassNotFoundException</a:t>
+            </a:r>
+            <a:endParaRPr kumimoji="1" lang="ko-Kore-KR" altLang="en-US">
+              <a:solidFill>
+                <a:schemeClr val="tx1"/>
+              </a:solidFill>
+            </a:endParaRPr>
+          </a:p>
+        </p:txBody>
+      </p:sp>
+      <p:sp>
+        <p:nvSpPr>
+          <p:cNvPr id="42" name="모서리가 둥근 직사각형 41">
+            <a:extLst>
+              <a:ext uri="{FF2B5EF4-FFF2-40B4-BE49-F238E27FC236}">
+                <a16:creationId xmlns:a16="http://schemas.microsoft.com/office/drawing/2014/main" id="{5C89F337-61B3-2E47-8BC7-0437D4990C55}"/>
+              </a:ext>
+            </a:extLst>
+          </p:cNvPr>
+          <p:cNvSpPr/>
+          <p:nvPr/>
+        </p:nvSpPr>
+        <p:spPr>
+          <a:xfrm>
+            <a:off x="7497789" y="3556886"/>
+            <a:ext cx="2452176" cy="453509"/>
+          </a:xfrm>
+          <a:prstGeom prst="roundRect">
+            <a:avLst/>
+          </a:prstGeom>
+          <a:noFill/>
+          <a:ln w="28575">
+            <a:solidFill>
+              <a:schemeClr val="bg2">
+                <a:lumMod val="25000"/>
+              </a:schemeClr>
+            </a:solidFill>
+          </a:ln>
+        </p:spPr>
+        <p:style>
+          <a:lnRef idx="2">
+            <a:schemeClr val="accent1">
+              <a:shade val="50000"/>
+            </a:schemeClr>
+          </a:lnRef>
+          <a:fillRef idx="1">
+            <a:schemeClr val="accent1"/>
+          </a:fillRef>
+          <a:effectRef idx="0">
+            <a:schemeClr val="accent1"/>
+          </a:effectRef>
+          <a:fontRef idx="minor">
+            <a:schemeClr val="lt1"/>
+          </a:fontRef>
+        </p:style>
+        <p:txBody>
+          <a:bodyPr rtlCol="0" anchor="ctr"/>
+          <a:lstStyle/>
+          <a:p>
+            <a:pPr algn="ctr"/>
+            <a:r>
+              <a:rPr kumimoji="1" lang="en-US" altLang="en-US" dirty="0" err="1">
+                <a:solidFill>
+                  <a:schemeClr val="tx1"/>
+                </a:solidFill>
+              </a:rPr>
+              <a:t>RuntimeException</a:t>
+            </a:r>
+            <a:endParaRPr kumimoji="1" lang="ko-Kore-KR" altLang="en-US">
+              <a:solidFill>
+                <a:schemeClr val="tx1"/>
+              </a:solidFill>
+            </a:endParaRPr>
+          </a:p>
+        </p:txBody>
+      </p:sp>
+      <p:cxnSp>
+        <p:nvCxnSpPr>
+          <p:cNvPr id="26" name="직선 화살표 연결선 25">
+            <a:extLst>
+              <a:ext uri="{FF2B5EF4-FFF2-40B4-BE49-F238E27FC236}">
+                <a16:creationId xmlns:a16="http://schemas.microsoft.com/office/drawing/2014/main" id="{9C3DC2D5-29A8-9147-AC49-DA4DF445534A}"/>
+              </a:ext>
+            </a:extLst>
+          </p:cNvPr>
+          <p:cNvCxnSpPr>
+            <a:stCxn id="30" idx="0"/>
+            <a:endCxn id="28" idx="2"/>
+          </p:cNvCxnSpPr>
+          <p:nvPr/>
+        </p:nvCxnSpPr>
+        <p:spPr>
+          <a:xfrm flipV="1">
+            <a:off x="4587066" y="924873"/>
+            <a:ext cx="0" cy="496664"/>
+          </a:xfrm>
+          <a:prstGeom prst="straightConnector1">
+            <a:avLst/>
+          </a:prstGeom>
+          <a:ln w="31750">
+            <a:solidFill>
+              <a:schemeClr val="tx1"/>
+            </a:solidFill>
+            <a:tailEnd type="triangle"/>
+          </a:ln>
+        </p:spPr>
+        <p:style>
+          <a:lnRef idx="1">
+            <a:schemeClr val="accent1"/>
+          </a:lnRef>
+          <a:fillRef idx="0">
+            <a:schemeClr val="accent1"/>
+          </a:fillRef>
+          <a:effectRef idx="0">
+            <a:schemeClr val="accent1"/>
+          </a:effectRef>
+          <a:fontRef idx="minor">
+            <a:schemeClr val="tx1"/>
+          </a:fontRef>
+        </p:style>
+      </p:cxnSp>
+      <p:sp>
+        <p:nvSpPr>
+          <p:cNvPr id="44" name="왼쪽 대괄호[L] 43">
+            <a:extLst>
+              <a:ext uri="{FF2B5EF4-FFF2-40B4-BE49-F238E27FC236}">
+                <a16:creationId xmlns:a16="http://schemas.microsoft.com/office/drawing/2014/main" id="{94CFD387-272E-3F44-BAE9-7E50616C56EE}"/>
+              </a:ext>
+            </a:extLst>
+          </p:cNvPr>
+          <p:cNvSpPr/>
+          <p:nvPr/>
+        </p:nvSpPr>
+        <p:spPr>
+          <a:xfrm rot="5400000">
+            <a:off x="4452523" y="254469"/>
+            <a:ext cx="432487" cy="4650277"/>
+          </a:xfrm>
+          <a:prstGeom prst="leftBracket">
+            <a:avLst>
+              <a:gd name="adj" fmla="val 0"/>
+            </a:avLst>
+          </a:prstGeom>
+          <a:ln w="31750">
+            <a:solidFill>
+              <a:schemeClr val="tx1"/>
+            </a:solidFill>
+          </a:ln>
+        </p:spPr>
+        <p:style>
+          <a:lnRef idx="1">
+            <a:schemeClr val="accent1"/>
+          </a:lnRef>
+          <a:fillRef idx="0">
+            <a:schemeClr val="accent1"/>
+          </a:fillRef>
+          <a:effectRef idx="0">
+            <a:schemeClr val="accent1"/>
+          </a:effectRef>
+          <a:fontRef idx="minor">
+            <a:schemeClr val="tx1"/>
+          </a:fontRef>
+        </p:style>
+        <p:txBody>
+          <a:bodyPr rtlCol="0" anchor="ctr"/>
+          <a:lstStyle/>
+          <a:p>
+            <a:pPr algn="ctr"/>
+            <a:endParaRPr kumimoji="1" lang="ko-KR" altLang="en-US"/>
+          </a:p>
+        </p:txBody>
+      </p:sp>
+      <p:cxnSp>
+        <p:nvCxnSpPr>
+          <p:cNvPr id="46" name="직선 화살표 연결선 45">
+            <a:extLst>
+              <a:ext uri="{FF2B5EF4-FFF2-40B4-BE49-F238E27FC236}">
+                <a16:creationId xmlns:a16="http://schemas.microsoft.com/office/drawing/2014/main" id="{79932BD1-91E3-8342-BA60-1B1B80E3E5BE}"/>
+              </a:ext>
+            </a:extLst>
+          </p:cNvPr>
+          <p:cNvCxnSpPr/>
+          <p:nvPr/>
+        </p:nvCxnSpPr>
+        <p:spPr>
+          <a:xfrm flipV="1">
+            <a:off x="4587066" y="1875046"/>
+            <a:ext cx="0" cy="496664"/>
+          </a:xfrm>
+          <a:prstGeom prst="straightConnector1">
+            <a:avLst/>
+          </a:prstGeom>
+          <a:ln w="31750">
+            <a:solidFill>
+              <a:schemeClr val="tx1"/>
+            </a:solidFill>
+            <a:tailEnd type="triangle"/>
+          </a:ln>
+        </p:spPr>
+        <p:style>
+          <a:lnRef idx="1">
+            <a:schemeClr val="accent1"/>
+          </a:lnRef>
+          <a:fillRef idx="0">
+            <a:schemeClr val="accent1"/>
+          </a:fillRef>
+          <a:effectRef idx="0">
+            <a:schemeClr val="accent1"/>
+          </a:effectRef>
+          <a:fontRef idx="minor">
+            <a:schemeClr val="tx1"/>
+          </a:fontRef>
+        </p:style>
+      </p:cxnSp>
+      <p:sp>
+        <p:nvSpPr>
+          <p:cNvPr id="47" name="왼쪽 대괄호[L] 46">
+            <a:extLst>
+              <a:ext uri="{FF2B5EF4-FFF2-40B4-BE49-F238E27FC236}">
+                <a16:creationId xmlns:a16="http://schemas.microsoft.com/office/drawing/2014/main" id="{AABB73F7-A554-114C-8A7A-0BBACED3E4DE}"/>
+              </a:ext>
+            </a:extLst>
+          </p:cNvPr>
+          <p:cNvSpPr/>
+          <p:nvPr/>
+        </p:nvSpPr>
+        <p:spPr>
+          <a:xfrm rot="10800000">
+            <a:off x="6380835" y="4707923"/>
+            <a:ext cx="267100" cy="871410"/>
+          </a:xfrm>
+          <a:prstGeom prst="leftBracket">
+            <a:avLst>
+              <a:gd name="adj" fmla="val 0"/>
+            </a:avLst>
+          </a:prstGeom>
+          <a:ln w="31750">
+            <a:solidFill>
+              <a:schemeClr val="tx1"/>
+            </a:solidFill>
+          </a:ln>
+        </p:spPr>
+        <p:style>
+          <a:lnRef idx="1">
+            <a:schemeClr val="accent1"/>
+          </a:lnRef>
+          <a:fillRef idx="0">
+            <a:schemeClr val="accent1"/>
+          </a:fillRef>
+          <a:effectRef idx="0">
+            <a:schemeClr val="accent1"/>
+          </a:effectRef>
+          <a:fontRef idx="minor">
+            <a:schemeClr val="tx1"/>
+          </a:fontRef>
+        </p:style>
+        <p:txBody>
+          <a:bodyPr rtlCol="0" anchor="ctr"/>
+          <a:lstStyle/>
+          <a:p>
+            <a:pPr algn="ctr"/>
+            <a:endParaRPr kumimoji="1" lang="ko-KR" altLang="en-US"/>
+          </a:p>
+        </p:txBody>
+      </p:sp>
+      <p:cxnSp>
+        <p:nvCxnSpPr>
+          <p:cNvPr id="48" name="직선 화살표 연결선 47">
+            <a:extLst>
+              <a:ext uri="{FF2B5EF4-FFF2-40B4-BE49-F238E27FC236}">
+                <a16:creationId xmlns:a16="http://schemas.microsoft.com/office/drawing/2014/main" id="{2CE87A9F-B806-5248-99BE-1448A1E54952}"/>
+              </a:ext>
+            </a:extLst>
+          </p:cNvPr>
+          <p:cNvCxnSpPr>
+            <a:cxnSpLocks/>
+          </p:cNvCxnSpPr>
+          <p:nvPr/>
+        </p:nvCxnSpPr>
+        <p:spPr>
+          <a:xfrm flipV="1">
+            <a:off x="6647935" y="3253693"/>
+            <a:ext cx="0" cy="2325641"/>
+          </a:xfrm>
+          <a:prstGeom prst="straightConnector1">
+            <a:avLst/>
+          </a:prstGeom>
+          <a:ln w="31750">
+            <a:solidFill>
+              <a:schemeClr val="tx1"/>
+            </a:solidFill>
+            <a:tailEnd type="triangle"/>
+          </a:ln>
+        </p:spPr>
+        <p:style>
+          <a:lnRef idx="1">
+            <a:schemeClr val="accent1"/>
+          </a:lnRef>
+          <a:fillRef idx="0">
+            <a:schemeClr val="accent1"/>
+          </a:fillRef>
+          <a:effectRef idx="0">
+            <a:schemeClr val="accent1"/>
+          </a:effectRef>
+          <a:fontRef idx="minor">
+            <a:schemeClr val="tx1"/>
+          </a:fontRef>
+        </p:style>
+      </p:cxnSp>
+      <p:cxnSp>
+        <p:nvCxnSpPr>
+          <p:cNvPr id="50" name="직선 화살표 연결선 49">
+            <a:extLst>
+              <a:ext uri="{FF2B5EF4-FFF2-40B4-BE49-F238E27FC236}">
+                <a16:creationId xmlns:a16="http://schemas.microsoft.com/office/drawing/2014/main" id="{C8CE91F9-9327-AC4C-96AB-2341CB1E7BE9}"/>
+              </a:ext>
+            </a:extLst>
+          </p:cNvPr>
+          <p:cNvCxnSpPr>
+            <a:cxnSpLocks/>
+          </p:cNvCxnSpPr>
+          <p:nvPr/>
+        </p:nvCxnSpPr>
+        <p:spPr>
+          <a:xfrm flipV="1">
+            <a:off x="7727092" y="3266051"/>
+            <a:ext cx="0" cy="280713"/>
+          </a:xfrm>
+          <a:prstGeom prst="straightConnector1">
+            <a:avLst/>
+          </a:prstGeom>
+          <a:ln w="31750">
+            <a:solidFill>
+              <a:schemeClr val="tx1"/>
+            </a:solidFill>
+            <a:tailEnd type="triangle"/>
+          </a:ln>
+        </p:spPr>
+        <p:style>
+          <a:lnRef idx="1">
+            <a:schemeClr val="accent1"/>
+          </a:lnRef>
+          <a:fillRef idx="0">
+            <a:schemeClr val="accent1"/>
+          </a:fillRef>
+          <a:effectRef idx="0">
+            <a:schemeClr val="accent1"/>
+          </a:effectRef>
+          <a:fontRef idx="minor">
+            <a:schemeClr val="tx1"/>
+          </a:fontRef>
+        </p:style>
+      </p:cxnSp>
+      <p:sp>
+        <p:nvSpPr>
+          <p:cNvPr id="53" name="왼쪽 대괄호[L] 52">
+            <a:extLst>
+              <a:ext uri="{FF2B5EF4-FFF2-40B4-BE49-F238E27FC236}">
+                <a16:creationId xmlns:a16="http://schemas.microsoft.com/office/drawing/2014/main" id="{81291C85-43FB-9846-BE7F-FA6E92DC5772}"/>
+              </a:ext>
+            </a:extLst>
+          </p:cNvPr>
+          <p:cNvSpPr/>
+          <p:nvPr/>
+        </p:nvSpPr>
+        <p:spPr>
+          <a:xfrm>
+            <a:off x="8225651" y="4737315"/>
+            <a:ext cx="267100" cy="871410"/>
+          </a:xfrm>
+          <a:prstGeom prst="leftBracket">
+            <a:avLst>
+              <a:gd name="adj" fmla="val 0"/>
+            </a:avLst>
+          </a:prstGeom>
+          <a:ln w="31750">
+            <a:solidFill>
+              <a:schemeClr val="tx1"/>
+            </a:solidFill>
+          </a:ln>
+        </p:spPr>
+        <p:style>
+          <a:lnRef idx="1">
+            <a:schemeClr val="accent1"/>
+          </a:lnRef>
+          <a:fillRef idx="0">
+            <a:schemeClr val="accent1"/>
+          </a:fillRef>
+          <a:effectRef idx="0">
+            <a:schemeClr val="accent1"/>
+          </a:effectRef>
+          <a:fontRef idx="minor">
+            <a:schemeClr val="tx1"/>
+          </a:fontRef>
+        </p:style>
+        <p:txBody>
+          <a:bodyPr rtlCol="0" anchor="ctr"/>
+          <a:lstStyle/>
+          <a:p>
+            <a:pPr algn="ctr"/>
+            <a:endParaRPr kumimoji="1" lang="ko-KR" altLang="en-US"/>
+          </a:p>
+        </p:txBody>
+      </p:sp>
+      <p:cxnSp>
+        <p:nvCxnSpPr>
+          <p:cNvPr id="54" name="직선 화살표 연결선 53">
+            <a:extLst>
+              <a:ext uri="{FF2B5EF4-FFF2-40B4-BE49-F238E27FC236}">
+                <a16:creationId xmlns:a16="http://schemas.microsoft.com/office/drawing/2014/main" id="{CD9D443C-26F7-9446-998E-2787A29CEFEF}"/>
+              </a:ext>
+            </a:extLst>
+          </p:cNvPr>
+          <p:cNvCxnSpPr>
+            <a:cxnSpLocks/>
+          </p:cNvCxnSpPr>
+          <p:nvPr/>
+        </p:nvCxnSpPr>
+        <p:spPr>
+          <a:xfrm flipV="1">
+            <a:off x="8232378" y="4005522"/>
+            <a:ext cx="0" cy="1615560"/>
+          </a:xfrm>
+          <a:prstGeom prst="straightConnector1">
+            <a:avLst/>
+          </a:prstGeom>
+          <a:ln w="31750">
+            <a:solidFill>
+              <a:schemeClr val="tx1"/>
+            </a:solidFill>
+            <a:tailEnd type="triangle"/>
+          </a:ln>
+        </p:spPr>
+        <p:style>
+          <a:lnRef idx="1">
+            <a:schemeClr val="accent1"/>
+          </a:lnRef>
+          <a:fillRef idx="0">
+            <a:schemeClr val="accent1"/>
+          </a:fillRef>
+          <a:effectRef idx="0">
+            <a:schemeClr val="accent1"/>
+          </a:effectRef>
+          <a:fontRef idx="minor">
+            <a:schemeClr val="tx1"/>
+          </a:fontRef>
+        </p:style>
+      </p:cxnSp>
+      <p:sp>
+        <p:nvSpPr>
+          <p:cNvPr id="56" name="모서리가 둥근 직사각형 55">
+            <a:extLst>
+              <a:ext uri="{FF2B5EF4-FFF2-40B4-BE49-F238E27FC236}">
+                <a16:creationId xmlns:a16="http://schemas.microsoft.com/office/drawing/2014/main" id="{D1E6D9B0-B0F5-5842-9885-FFF00B8D476E}"/>
+              </a:ext>
+            </a:extLst>
+          </p:cNvPr>
+          <p:cNvSpPr/>
+          <p:nvPr/>
+        </p:nvSpPr>
+        <p:spPr>
+          <a:xfrm>
+            <a:off x="3239503" y="4295690"/>
+            <a:ext cx="3326341" cy="1754660"/>
+          </a:xfrm>
+          <a:prstGeom prst="roundRect">
+            <a:avLst>
+              <a:gd name="adj" fmla="val 4695"/>
+            </a:avLst>
+          </a:prstGeom>
+          <a:noFill/>
+          <a:ln w="25400">
+            <a:solidFill>
+              <a:srgbClr val="00B0F0"/>
+            </a:solidFill>
+            <a:prstDash val="sysDash"/>
+          </a:ln>
+        </p:spPr>
+        <p:style>
+          <a:lnRef idx="2">
+            <a:schemeClr val="accent1">
+              <a:shade val="50000"/>
+            </a:schemeClr>
+          </a:lnRef>
+          <a:fillRef idx="1">
+            <a:schemeClr val="accent1"/>
+          </a:fillRef>
+          <a:effectRef idx="0">
+            <a:schemeClr val="accent1"/>
+          </a:effectRef>
+          <a:fontRef idx="minor">
+            <a:schemeClr val="lt1"/>
+          </a:fontRef>
+        </p:style>
+        <p:txBody>
+          <a:bodyPr rtlCol="0" anchor="ctr"/>
+          <a:lstStyle/>
+          <a:p>
+            <a:pPr algn="ctr"/>
+            <a:endParaRPr kumimoji="1" lang="ko-KR" altLang="en-US"/>
+          </a:p>
+        </p:txBody>
+      </p:sp>
+      <p:sp>
+        <p:nvSpPr>
+          <p:cNvPr id="57" name="모서리가 둥근 직사각형 56">
+            <a:extLst>
+              <a:ext uri="{FF2B5EF4-FFF2-40B4-BE49-F238E27FC236}">
+                <a16:creationId xmlns:a16="http://schemas.microsoft.com/office/drawing/2014/main" id="{2D6C9F0B-5A89-6A40-B684-7D7B86FA4609}"/>
+              </a:ext>
+            </a:extLst>
+          </p:cNvPr>
+          <p:cNvSpPr/>
+          <p:nvPr/>
+        </p:nvSpPr>
+        <p:spPr>
+          <a:xfrm>
+            <a:off x="8359201" y="4310581"/>
+            <a:ext cx="3326341" cy="1754660"/>
+          </a:xfrm>
+          <a:prstGeom prst="roundRect">
+            <a:avLst>
+              <a:gd name="adj" fmla="val 4695"/>
+            </a:avLst>
+          </a:prstGeom>
+          <a:noFill/>
+          <a:ln w="25400">
+            <a:solidFill>
+              <a:srgbClr val="00B0F0"/>
+            </a:solidFill>
+            <a:prstDash val="sysDash"/>
+          </a:ln>
+        </p:spPr>
+        <p:style>
+          <a:lnRef idx="2">
+            <a:schemeClr val="accent1">
+              <a:shade val="50000"/>
+            </a:schemeClr>
+          </a:lnRef>
+          <a:fillRef idx="1">
+            <a:schemeClr val="accent1"/>
+          </a:fillRef>
+          <a:effectRef idx="0">
+            <a:schemeClr val="accent1"/>
+          </a:effectRef>
+          <a:fontRef idx="minor">
+            <a:schemeClr val="lt1"/>
+          </a:fontRef>
+        </p:style>
+        <p:txBody>
+          <a:bodyPr rtlCol="0" anchor="ctr"/>
+          <a:lstStyle/>
+          <a:p>
+            <a:pPr algn="ctr"/>
+            <a:endParaRPr kumimoji="1" lang="ko-KR" altLang="en-US"/>
+          </a:p>
+        </p:txBody>
+      </p:sp>
+      <p:sp>
+        <p:nvSpPr>
+          <p:cNvPr id="58" name="TextBox 57">
+            <a:extLst>
+              <a:ext uri="{FF2B5EF4-FFF2-40B4-BE49-F238E27FC236}">
+                <a16:creationId xmlns:a16="http://schemas.microsoft.com/office/drawing/2014/main" id="{62ED7E53-A888-B540-8226-BC5A05031A3B}"/>
+              </a:ext>
+            </a:extLst>
+          </p:cNvPr>
+          <p:cNvSpPr txBox="1"/>
+          <p:nvPr/>
+        </p:nvSpPr>
+        <p:spPr>
+          <a:xfrm>
+            <a:off x="3789415" y="6077338"/>
+            <a:ext cx="2314824" cy="369332"/>
+          </a:xfrm>
+          <a:prstGeom prst="rect">
+            <a:avLst/>
+          </a:prstGeom>
+          <a:noFill/>
+        </p:spPr>
+        <p:txBody>
+          <a:bodyPr wrap="square" rtlCol="0">
+            <a:spAutoFit/>
+          </a:bodyPr>
+          <a:lstStyle/>
+          <a:p>
+            <a:pPr algn="ctr"/>
+            <a:r>
+              <a:rPr kumimoji="1" lang="en-US" altLang="ko-KR" dirty="0">
+                <a:solidFill>
+                  <a:srgbClr val="00A3DF"/>
+                </a:solidFill>
+              </a:rPr>
+              <a:t>Checked Exception</a:t>
+            </a:r>
+            <a:endParaRPr kumimoji="1" lang="ko-KR" altLang="en-US" dirty="0">
+              <a:solidFill>
+                <a:srgbClr val="00A3DF"/>
+              </a:solidFill>
+            </a:endParaRPr>
+          </a:p>
+        </p:txBody>
+      </p:sp>
+      <p:sp>
+        <p:nvSpPr>
+          <p:cNvPr id="59" name="TextBox 58">
+            <a:extLst>
+              <a:ext uri="{FF2B5EF4-FFF2-40B4-BE49-F238E27FC236}">
+                <a16:creationId xmlns:a16="http://schemas.microsoft.com/office/drawing/2014/main" id="{6FCEF5DA-5B72-584F-A77F-8260596A7F7B}"/>
+              </a:ext>
+            </a:extLst>
+          </p:cNvPr>
+          <p:cNvSpPr txBox="1"/>
+          <p:nvPr/>
+        </p:nvSpPr>
+        <p:spPr>
+          <a:xfrm>
+            <a:off x="8723877" y="6065378"/>
+            <a:ext cx="2780731" cy="369332"/>
+          </a:xfrm>
+          <a:prstGeom prst="rect">
+            <a:avLst/>
+          </a:prstGeom>
+          <a:noFill/>
+        </p:spPr>
+        <p:txBody>
+          <a:bodyPr wrap="square" rtlCol="0">
+            <a:spAutoFit/>
+          </a:bodyPr>
+          <a:lstStyle/>
+          <a:p>
+            <a:pPr algn="ctr"/>
+            <a:r>
+              <a:rPr kumimoji="1" lang="en-US" altLang="ko-KR" dirty="0">
+                <a:solidFill>
+                  <a:srgbClr val="00A3DF"/>
+                </a:solidFill>
+              </a:rPr>
+              <a:t>Unchecked Exception</a:t>
+            </a:r>
+            <a:endParaRPr kumimoji="1" lang="ko-KR" altLang="en-US" dirty="0">
+              <a:solidFill>
+                <a:srgbClr val="00A3DF"/>
+              </a:solidFill>
+            </a:endParaRPr>
+          </a:p>
+        </p:txBody>
+      </p:sp>
+    </p:spTree>
+    <p:extLst>
+      <p:ext uri="{BB962C8B-B14F-4D97-AF65-F5344CB8AC3E}">
+        <p14:creationId xmlns:p14="http://schemas.microsoft.com/office/powerpoint/2010/main" val="1046803327"/>
+      </p:ext>
+    </p:extLst>
+  </p:cSld>
+  <p:clrMapOvr>
+    <a:masterClrMapping/>
+  </p:clrMapOvr>
+</p:sld>
+</file>
+
 <file path=ppt/theme/theme1.xml><?xml version="1.0" encoding="utf-8"?>
 <a:theme xmlns:a="http://schemas.openxmlformats.org/drawingml/2006/main" name="Office 테마">
   <a:themeElements>

</xml_diff>